<commit_message>
adicionar imagens e texto
</commit_message>
<xml_diff>
--- a/relatorio_preliminar/presentation.pptx
+++ b/relatorio_preliminar/presentation.pptx
@@ -5,10 +5,10 @@
     <p:sldMasterId id="2147483648" r:id="rId4"/>
   </p:sldMasterIdLst>
   <p:notesMasterIdLst>
-    <p:notesMasterId r:id="rId25"/>
+    <p:notesMasterId r:id="rId26"/>
   </p:notesMasterIdLst>
   <p:handoutMasterIdLst>
-    <p:handoutMasterId r:id="rId26"/>
+    <p:handoutMasterId r:id="rId27"/>
   </p:handoutMasterIdLst>
   <p:sldIdLst>
     <p:sldId id="256" r:id="rId5"/>
@@ -29,8 +29,9 @@
     <p:sldId id="295" r:id="rId20"/>
     <p:sldId id="299" r:id="rId21"/>
     <p:sldId id="301" r:id="rId22"/>
-    <p:sldId id="296" r:id="rId23"/>
-    <p:sldId id="269" r:id="rId24"/>
+    <p:sldId id="302" r:id="rId23"/>
+    <p:sldId id="296" r:id="rId24"/>
+    <p:sldId id="269" r:id="rId25"/>
   </p:sldIdLst>
   <p:sldSz cx="12192000" cy="6858000"/>
   <p:notesSz cx="6858000" cy="9144000"/>
@@ -178,7 +179,7 @@
           <p:cNvPr id="2" name="Header Placeholder 1">
             <a:extLst>
               <a:ext uri="{FF2B5EF4-FFF2-40B4-BE49-F238E27FC236}">
-                <a16:creationId xmlns="" xmlns:a16="http://schemas.microsoft.com/office/drawing/2014/main" id="{E62FF6B6-4F8A-40F7-B5F4-FC3996824D73}"/>
+                <a16:creationId xmlns:a16="http://schemas.microsoft.com/office/drawing/2014/main" xmlns="" id="{E62FF6B6-4F8A-40F7-B5F4-FC3996824D73}"/>
               </a:ext>
             </a:extLst>
           </p:cNvPr>
@@ -215,7 +216,7 @@
           <p:cNvPr id="3" name="Date Placeholder 2">
             <a:extLst>
               <a:ext uri="{FF2B5EF4-FFF2-40B4-BE49-F238E27FC236}">
-                <a16:creationId xmlns="" xmlns:a16="http://schemas.microsoft.com/office/drawing/2014/main" id="{8910A999-F365-48DF-976A-0517FE045440}"/>
+                <a16:creationId xmlns:a16="http://schemas.microsoft.com/office/drawing/2014/main" xmlns="" id="{8910A999-F365-48DF-976A-0517FE045440}"/>
               </a:ext>
             </a:extLst>
           </p:cNvPr>
@@ -245,7 +246,7 @@
           <a:p>
             <a:fld id="{1CA5457B-CDAE-4DEB-AEC8-C82DE2312E37}" type="datetimeFigureOut">
               <a:rPr lang="en-US" smtClean="0"/>
-              <a:t>2/19/2022</a:t>
+              <a:t>2/21/2022</a:t>
             </a:fld>
             <a:endParaRPr lang="en-US" dirty="0"/>
           </a:p>
@@ -256,7 +257,7 @@
           <p:cNvPr id="4" name="Footer Placeholder 3">
             <a:extLst>
               <a:ext uri="{FF2B5EF4-FFF2-40B4-BE49-F238E27FC236}">
-                <a16:creationId xmlns="" xmlns:a16="http://schemas.microsoft.com/office/drawing/2014/main" id="{F8735C90-ADBF-4B9E-BE88-E1C8F83EB4D2}"/>
+                <a16:creationId xmlns:a16="http://schemas.microsoft.com/office/drawing/2014/main" xmlns="" id="{F8735C90-ADBF-4B9E-BE88-E1C8F83EB4D2}"/>
               </a:ext>
             </a:extLst>
           </p:cNvPr>
@@ -293,7 +294,7 @@
           <p:cNvPr id="5" name="Slide Number Placeholder 4">
             <a:extLst>
               <a:ext uri="{FF2B5EF4-FFF2-40B4-BE49-F238E27FC236}">
-                <a16:creationId xmlns="" xmlns:a16="http://schemas.microsoft.com/office/drawing/2014/main" id="{82506A01-6D0A-45EF-A584-05A3361D66F7}"/>
+                <a16:creationId xmlns:a16="http://schemas.microsoft.com/office/drawing/2014/main" xmlns="" id="{82506A01-6D0A-45EF-A584-05A3361D66F7}"/>
               </a:ext>
             </a:extLst>
           </p:cNvPr>
@@ -422,7 +423,7 @@
           <a:p>
             <a:fld id="{090B78EA-28CE-41D8-9043-90E391E5F567}" type="datetimeFigureOut">
               <a:rPr lang="en-US" noProof="0" smtClean="0"/>
-              <a:t>2/19/2022</a:t>
+              <a:t>2/21/2022</a:t>
             </a:fld>
             <a:endParaRPr lang="en-US" noProof="0" dirty="0"/>
           </a:p>
@@ -711,7 +712,7 @@
           <p:cNvPr id="21" name="Rectangle 20">
             <a:extLst>
               <a:ext uri="{FF2B5EF4-FFF2-40B4-BE49-F238E27FC236}">
-                <a16:creationId xmlns="" xmlns:a16="http://schemas.microsoft.com/office/drawing/2014/main" id="{6E739168-A5E8-443A-B392-7AD4CF8977AD}"/>
+                <a16:creationId xmlns:a16="http://schemas.microsoft.com/office/drawing/2014/main" xmlns="" id="{6E739168-A5E8-443A-B392-7AD4CF8977AD}"/>
               </a:ext>
             </a:extLst>
           </p:cNvPr>
@@ -763,7 +764,7 @@
           <p:cNvPr id="7" name="Group 6">
             <a:extLst>
               <a:ext uri="{FF2B5EF4-FFF2-40B4-BE49-F238E27FC236}">
-                <a16:creationId xmlns="" xmlns:a16="http://schemas.microsoft.com/office/drawing/2014/main" id="{4CA15AFD-4983-47DD-9ED0-D3B27E5A096F}"/>
+                <a16:creationId xmlns:a16="http://schemas.microsoft.com/office/drawing/2014/main" xmlns="" id="{4CA15AFD-4983-47DD-9ED0-D3B27E5A096F}"/>
               </a:ext>
             </a:extLst>
           </p:cNvPr>
@@ -783,7 +784,7 @@
             <p:cNvPr id="8" name="Group 7">
               <a:extLst>
                 <a:ext uri="{FF2B5EF4-FFF2-40B4-BE49-F238E27FC236}">
-                  <a16:creationId xmlns="" xmlns:a16="http://schemas.microsoft.com/office/drawing/2014/main" id="{2222D5E2-E9B4-4180-98B8-4E514C9ADB28}"/>
+                  <a16:creationId xmlns:a16="http://schemas.microsoft.com/office/drawing/2014/main" xmlns="" id="{2222D5E2-E9B4-4180-98B8-4E514C9ADB28}"/>
                 </a:ext>
               </a:extLst>
             </p:cNvPr>
@@ -803,7 +804,7 @@
               <p:cNvPr id="15" name="Freeform: Shape 14">
                 <a:extLst>
                   <a:ext uri="{FF2B5EF4-FFF2-40B4-BE49-F238E27FC236}">
-                    <a16:creationId xmlns="" xmlns:a16="http://schemas.microsoft.com/office/drawing/2014/main" id="{41E10E1E-5268-4F03-BA64-07E19DE26739}"/>
+                    <a16:creationId xmlns:a16="http://schemas.microsoft.com/office/drawing/2014/main" xmlns="" id="{41E10E1E-5268-4F03-BA64-07E19DE26739}"/>
                   </a:ext>
                 </a:extLst>
               </p:cNvPr>
@@ -940,7 +941,7 @@
               <p:cNvPr id="16" name="Freeform: Shape 15">
                 <a:extLst>
                   <a:ext uri="{FF2B5EF4-FFF2-40B4-BE49-F238E27FC236}">
-                    <a16:creationId xmlns="" xmlns:a16="http://schemas.microsoft.com/office/drawing/2014/main" id="{B989C45D-BDFF-418F-BE79-03FF70015770}"/>
+                    <a16:creationId xmlns:a16="http://schemas.microsoft.com/office/drawing/2014/main" xmlns="" id="{B989C45D-BDFF-418F-BE79-03FF70015770}"/>
                   </a:ext>
                 </a:extLst>
               </p:cNvPr>
@@ -1104,7 +1105,7 @@
               <p:cNvPr id="17" name="Right Triangle 16">
                 <a:extLst>
                   <a:ext uri="{FF2B5EF4-FFF2-40B4-BE49-F238E27FC236}">
-                    <a16:creationId xmlns="" xmlns:a16="http://schemas.microsoft.com/office/drawing/2014/main" id="{8DCD5806-2A2F-4ABF-8057-245681C498E6}"/>
+                    <a16:creationId xmlns:a16="http://schemas.microsoft.com/office/drawing/2014/main" xmlns="" id="{8DCD5806-2A2F-4ABF-8057-245681C498E6}"/>
                   </a:ext>
                 </a:extLst>
               </p:cNvPr>
@@ -1158,7 +1159,7 @@
               <p:cNvPr id="18" name="Right Triangle 17">
                 <a:extLst>
                   <a:ext uri="{FF2B5EF4-FFF2-40B4-BE49-F238E27FC236}">
-                    <a16:creationId xmlns="" xmlns:a16="http://schemas.microsoft.com/office/drawing/2014/main" id="{3A93038F-E9E4-4FFD-B3DF-28DB7C2C1490}"/>
+                    <a16:creationId xmlns:a16="http://schemas.microsoft.com/office/drawing/2014/main" xmlns="" id="{3A93038F-E9E4-4FFD-B3DF-28DB7C2C1490}"/>
                   </a:ext>
                 </a:extLst>
               </p:cNvPr>
@@ -1215,7 +1216,7 @@
               <p:cNvPr id="19" name="Right Triangle 18">
                 <a:extLst>
                   <a:ext uri="{FF2B5EF4-FFF2-40B4-BE49-F238E27FC236}">
-                    <a16:creationId xmlns="" xmlns:a16="http://schemas.microsoft.com/office/drawing/2014/main" id="{5DEA1E02-BBD0-4AE3-AF22-433B90272178}"/>
+                    <a16:creationId xmlns:a16="http://schemas.microsoft.com/office/drawing/2014/main" xmlns="" id="{5DEA1E02-BBD0-4AE3-AF22-433B90272178}"/>
                   </a:ext>
                 </a:extLst>
               </p:cNvPr>
@@ -1269,7 +1270,7 @@
               <p:cNvPr id="20" name="Freeform: Shape 19">
                 <a:extLst>
                   <a:ext uri="{FF2B5EF4-FFF2-40B4-BE49-F238E27FC236}">
-                    <a16:creationId xmlns="" xmlns:a16="http://schemas.microsoft.com/office/drawing/2014/main" id="{0027A677-9ACB-4264-B148-4806678FB83F}"/>
+                    <a16:creationId xmlns:a16="http://schemas.microsoft.com/office/drawing/2014/main" xmlns="" id="{0027A677-9ACB-4264-B148-4806678FB83F}"/>
                   </a:ext>
                 </a:extLst>
               </p:cNvPr>
@@ -1432,7 +1433,7 @@
             <p:cNvPr id="9" name="Freeform: Shape 12">
               <a:extLst>
                 <a:ext uri="{FF2B5EF4-FFF2-40B4-BE49-F238E27FC236}">
-                  <a16:creationId xmlns="" xmlns:a16="http://schemas.microsoft.com/office/drawing/2014/main" id="{E3AAB79D-382D-4A95-965E-526B6A681DA7}"/>
+                  <a16:creationId xmlns:a16="http://schemas.microsoft.com/office/drawing/2014/main" xmlns="" id="{E3AAB79D-382D-4A95-965E-526B6A681DA7}"/>
                 </a:ext>
               </a:extLst>
             </p:cNvPr>
@@ -1522,7 +1523,7 @@
             <p:cNvPr id="10" name="Freeform: Shape 9">
               <a:extLst>
                 <a:ext uri="{FF2B5EF4-FFF2-40B4-BE49-F238E27FC236}">
-                  <a16:creationId xmlns="" xmlns:a16="http://schemas.microsoft.com/office/drawing/2014/main" id="{C0A22127-2B4A-4B15-B0A9-F019A30347A1}"/>
+                  <a16:creationId xmlns:a16="http://schemas.microsoft.com/office/drawing/2014/main" xmlns="" id="{C0A22127-2B4A-4B15-B0A9-F019A30347A1}"/>
                 </a:ext>
               </a:extLst>
             </p:cNvPr>
@@ -1625,7 +1626,7 @@
             <p:cNvPr id="11" name="Freeform: Shape 12">
               <a:extLst>
                 <a:ext uri="{FF2B5EF4-FFF2-40B4-BE49-F238E27FC236}">
-                  <a16:creationId xmlns="" xmlns:a16="http://schemas.microsoft.com/office/drawing/2014/main" id="{F04D9FDC-1B67-4254-9535-CD32E81F0C3E}"/>
+                  <a16:creationId xmlns:a16="http://schemas.microsoft.com/office/drawing/2014/main" xmlns="" id="{F04D9FDC-1B67-4254-9535-CD32E81F0C3E}"/>
                 </a:ext>
               </a:extLst>
             </p:cNvPr>
@@ -1723,7 +1724,7 @@
             <p:cNvPr id="12" name="Group 11">
               <a:extLst>
                 <a:ext uri="{FF2B5EF4-FFF2-40B4-BE49-F238E27FC236}">
-                  <a16:creationId xmlns="" xmlns:a16="http://schemas.microsoft.com/office/drawing/2014/main" id="{0A86C4EA-4CF8-4531-845D-4FCB1E2F7422}"/>
+                  <a16:creationId xmlns:a16="http://schemas.microsoft.com/office/drawing/2014/main" xmlns="" id="{0A86C4EA-4CF8-4531-845D-4FCB1E2F7422}"/>
                 </a:ext>
               </a:extLst>
             </p:cNvPr>
@@ -1743,7 +1744,7 @@
               <p:cNvPr id="13" name="Freeform: Shape 12">
                 <a:extLst>
                   <a:ext uri="{FF2B5EF4-FFF2-40B4-BE49-F238E27FC236}">
-                    <a16:creationId xmlns="" xmlns:a16="http://schemas.microsoft.com/office/drawing/2014/main" id="{1101B195-C112-4D20-8D19-4D22479B150D}"/>
+                    <a16:creationId xmlns:a16="http://schemas.microsoft.com/office/drawing/2014/main" xmlns="" id="{1101B195-C112-4D20-8D19-4D22479B150D}"/>
                   </a:ext>
                 </a:extLst>
               </p:cNvPr>
@@ -1833,7 +1834,7 @@
               <p:cNvPr id="14" name="Freeform: Shape 12">
                 <a:extLst>
                   <a:ext uri="{FF2B5EF4-FFF2-40B4-BE49-F238E27FC236}">
-                    <a16:creationId xmlns="" xmlns:a16="http://schemas.microsoft.com/office/drawing/2014/main" id="{CA755F1F-9955-4CBB-8F34-F7801CA44CE7}"/>
+                    <a16:creationId xmlns:a16="http://schemas.microsoft.com/office/drawing/2014/main" xmlns="" id="{CA755F1F-9955-4CBB-8F34-F7801CA44CE7}"/>
                   </a:ext>
                 </a:extLst>
               </p:cNvPr>
@@ -1933,7 +1934,7 @@
           <p:cNvPr id="2" name="Title 1">
             <a:extLst>
               <a:ext uri="{FF2B5EF4-FFF2-40B4-BE49-F238E27FC236}">
-                <a16:creationId xmlns="" xmlns:a16="http://schemas.microsoft.com/office/drawing/2014/main" id="{9E597736-C478-4C26-9BAF-205FE31E977C}"/>
+                <a16:creationId xmlns:a16="http://schemas.microsoft.com/office/drawing/2014/main" xmlns="" id="{9E597736-C478-4C26-9BAF-205FE31E977C}"/>
               </a:ext>
             </a:extLst>
           </p:cNvPr>
@@ -1980,7 +1981,7 @@
           <p:cNvPr id="3" name="Subtitle 2">
             <a:extLst>
               <a:ext uri="{FF2B5EF4-FFF2-40B4-BE49-F238E27FC236}">
-                <a16:creationId xmlns="" xmlns:a16="http://schemas.microsoft.com/office/drawing/2014/main" id="{C3D2DEF0-A0B0-4CFE-B67D-A9D75E2368DC}"/>
+                <a16:creationId xmlns:a16="http://schemas.microsoft.com/office/drawing/2014/main" xmlns="" id="{C3D2DEF0-A0B0-4CFE-B67D-A9D75E2368DC}"/>
               </a:ext>
             </a:extLst>
           </p:cNvPr>
@@ -2033,11 +2034,11 @@
   <p:clrMapOvr>
     <a:masterClrMapping/>
   </p:clrMapOvr>
-  <mc:AlternateContent xmlns:mc="http://schemas.openxmlformats.org/markup-compatibility/2006">
-    <mc:Choice xmlns:p14="http://schemas.microsoft.com/office/powerpoint/2010/main" Requires="p14">
+  <mc:AlternateContent xmlns:mc="http://schemas.openxmlformats.org/markup-compatibility/2006" xmlns:p14="http://schemas.microsoft.com/office/powerpoint/2010/main">
+    <mc:Choice Requires="p14">
       <p:transition p14:dur="0"/>
     </mc:Choice>
-    <mc:Fallback>
+    <mc:Fallback xmlns="">
       <p:transition/>
     </mc:Fallback>
   </mc:AlternateContent>
@@ -2074,7 +2075,7 @@
           <p:cNvPr id="11" name="Rectangle 10">
             <a:extLst>
               <a:ext uri="{FF2B5EF4-FFF2-40B4-BE49-F238E27FC236}">
-                <a16:creationId xmlns="" xmlns:a16="http://schemas.microsoft.com/office/drawing/2014/main" id="{EB3E033F-4449-40FA-BC85-BD2712D313DD}"/>
+                <a16:creationId xmlns:a16="http://schemas.microsoft.com/office/drawing/2014/main" xmlns="" id="{EB3E033F-4449-40FA-BC85-BD2712D313DD}"/>
               </a:ext>
             </a:extLst>
           </p:cNvPr>
@@ -2128,7 +2129,7 @@
           <p:cNvPr id="10" name="Freeform: Shape 9">
             <a:extLst>
               <a:ext uri="{FF2B5EF4-FFF2-40B4-BE49-F238E27FC236}">
-                <a16:creationId xmlns="" xmlns:a16="http://schemas.microsoft.com/office/drawing/2014/main" id="{63D26743-0505-444C-80B3-E88EE87DF72B}"/>
+                <a16:creationId xmlns:a16="http://schemas.microsoft.com/office/drawing/2014/main" xmlns="" id="{63D26743-0505-444C-80B3-E88EE87DF72B}"/>
               </a:ext>
             </a:extLst>
           </p:cNvPr>
@@ -2251,7 +2252,7 @@
           <p:cNvPr id="18" name="Freeform: Shape 17">
             <a:extLst>
               <a:ext uri="{FF2B5EF4-FFF2-40B4-BE49-F238E27FC236}">
-                <a16:creationId xmlns="" xmlns:a16="http://schemas.microsoft.com/office/drawing/2014/main" id="{E37145E9-AC61-47D5-9288-8789940F81B6}"/>
+                <a16:creationId xmlns:a16="http://schemas.microsoft.com/office/drawing/2014/main" xmlns="" id="{E37145E9-AC61-47D5-9288-8789940F81B6}"/>
               </a:ext>
             </a:extLst>
           </p:cNvPr>
@@ -2403,7 +2404,7 @@
           <p:cNvPr id="12" name="Freeform: Shape 11">
             <a:extLst>
               <a:ext uri="{FF2B5EF4-FFF2-40B4-BE49-F238E27FC236}">
-                <a16:creationId xmlns="" xmlns:a16="http://schemas.microsoft.com/office/drawing/2014/main" id="{A5E2B3ED-9A49-40A7-B8A3-62595FE513F9}"/>
+                <a16:creationId xmlns:a16="http://schemas.microsoft.com/office/drawing/2014/main" xmlns="" id="{A5E2B3ED-9A49-40A7-B8A3-62595FE513F9}"/>
               </a:ext>
             </a:extLst>
           </p:cNvPr>
@@ -2553,7 +2554,7 @@
           <p:cNvPr id="8" name="Freeform: Shape 7">
             <a:extLst>
               <a:ext uri="{FF2B5EF4-FFF2-40B4-BE49-F238E27FC236}">
-                <a16:creationId xmlns="" xmlns:a16="http://schemas.microsoft.com/office/drawing/2014/main" id="{1599AF7E-3E34-4597-AA72-9373A7FDB020}"/>
+                <a16:creationId xmlns:a16="http://schemas.microsoft.com/office/drawing/2014/main" xmlns="" id="{1599AF7E-3E34-4597-AA72-9373A7FDB020}"/>
               </a:ext>
             </a:extLst>
           </p:cNvPr>
@@ -2699,7 +2700,7 @@
           <p:cNvPr id="2" name="Title 1">
             <a:extLst>
               <a:ext uri="{FF2B5EF4-FFF2-40B4-BE49-F238E27FC236}">
-                <a16:creationId xmlns="" xmlns:a16="http://schemas.microsoft.com/office/drawing/2014/main" id="{4A2DF563-7FAC-46B3-B24C-7E45CD89DA2B}"/>
+                <a16:creationId xmlns:a16="http://schemas.microsoft.com/office/drawing/2014/main" xmlns="" id="{4A2DF563-7FAC-46B3-B24C-7E45CD89DA2B}"/>
               </a:ext>
             </a:extLst>
           </p:cNvPr>
@@ -2745,7 +2746,7 @@
           <p:cNvPr id="15" name="Group 14">
             <a:extLst>
               <a:ext uri="{FF2B5EF4-FFF2-40B4-BE49-F238E27FC236}">
-                <a16:creationId xmlns="" xmlns:a16="http://schemas.microsoft.com/office/drawing/2014/main" id="{7732E1E7-45E3-4264-8F26-66758696DD1E}"/>
+                <a16:creationId xmlns:a16="http://schemas.microsoft.com/office/drawing/2014/main" xmlns="" id="{7732E1E7-45E3-4264-8F26-66758696DD1E}"/>
               </a:ext>
             </a:extLst>
           </p:cNvPr>
@@ -2765,7 +2766,7 @@
             <p:cNvPr id="16" name="Freeform: Shape 15">
               <a:extLst>
                 <a:ext uri="{FF2B5EF4-FFF2-40B4-BE49-F238E27FC236}">
-                  <a16:creationId xmlns="" xmlns:a16="http://schemas.microsoft.com/office/drawing/2014/main" id="{2E3DF883-8093-49FA-81E1-E5D77F086A25}"/>
+                  <a16:creationId xmlns:a16="http://schemas.microsoft.com/office/drawing/2014/main" xmlns="" id="{2E3DF883-8093-49FA-81E1-E5D77F086A25}"/>
                 </a:ext>
               </a:extLst>
             </p:cNvPr>
@@ -2855,7 +2856,7 @@
             <p:cNvPr id="17" name="Freeform: Shape 16">
               <a:extLst>
                 <a:ext uri="{FF2B5EF4-FFF2-40B4-BE49-F238E27FC236}">
-                  <a16:creationId xmlns="" xmlns:a16="http://schemas.microsoft.com/office/drawing/2014/main" id="{18944C90-37E5-4BBE-89FF-060627168050}"/>
+                  <a16:creationId xmlns:a16="http://schemas.microsoft.com/office/drawing/2014/main" xmlns="" id="{18944C90-37E5-4BBE-89FF-060627168050}"/>
                 </a:ext>
               </a:extLst>
             </p:cNvPr>
@@ -2954,7 +2955,7 @@
           <p:cNvPr id="6" name="Group 5">
             <a:extLst>
               <a:ext uri="{FF2B5EF4-FFF2-40B4-BE49-F238E27FC236}">
-                <a16:creationId xmlns="" xmlns:a16="http://schemas.microsoft.com/office/drawing/2014/main" id="{D9EBF8BB-A805-4DDB-B459-082F99815B95}"/>
+                <a16:creationId xmlns:a16="http://schemas.microsoft.com/office/drawing/2014/main" xmlns="" id="{D9EBF8BB-A805-4DDB-B459-082F99815B95}"/>
               </a:ext>
             </a:extLst>
           </p:cNvPr>
@@ -2974,7 +2975,7 @@
             <p:cNvPr id="19" name="Rectangle: Single Corner Snipped 18">
               <a:extLst>
                 <a:ext uri="{FF2B5EF4-FFF2-40B4-BE49-F238E27FC236}">
-                  <a16:creationId xmlns="" xmlns:a16="http://schemas.microsoft.com/office/drawing/2014/main" id="{5D638788-DD47-45E7-939A-FA108A818173}"/>
+                  <a16:creationId xmlns:a16="http://schemas.microsoft.com/office/drawing/2014/main" xmlns="" id="{5D638788-DD47-45E7-939A-FA108A818173}"/>
                 </a:ext>
               </a:extLst>
             </p:cNvPr>
@@ -3040,7 +3041,7 @@
             <p:cNvPr id="3" name="Rectangle: Single Corner Snipped 2">
               <a:extLst>
                 <a:ext uri="{FF2B5EF4-FFF2-40B4-BE49-F238E27FC236}">
-                  <a16:creationId xmlns="" xmlns:a16="http://schemas.microsoft.com/office/drawing/2014/main" id="{74BDECEF-EEFE-4332-B3B2-BDE4F82C10FC}"/>
+                  <a16:creationId xmlns:a16="http://schemas.microsoft.com/office/drawing/2014/main" xmlns="" id="{74BDECEF-EEFE-4332-B3B2-BDE4F82C10FC}"/>
                 </a:ext>
               </a:extLst>
             </p:cNvPr>
@@ -3097,7 +3098,7 @@
           <p:cNvPr id="24" name="Freeform: Shape 23">
             <a:extLst>
               <a:ext uri="{FF2B5EF4-FFF2-40B4-BE49-F238E27FC236}">
-                <a16:creationId xmlns="" xmlns:a16="http://schemas.microsoft.com/office/drawing/2014/main" id="{18103E00-7E4A-44CD-81AC-06433CAE1110}"/>
+                <a16:creationId xmlns:a16="http://schemas.microsoft.com/office/drawing/2014/main" xmlns="" id="{18103E00-7E4A-44CD-81AC-06433CAE1110}"/>
               </a:ext>
             </a:extLst>
           </p:cNvPr>
@@ -3192,7 +3193,7 @@
           <p:cNvPr id="5" name="Slide Number Placeholder 4">
             <a:extLst>
               <a:ext uri="{FF2B5EF4-FFF2-40B4-BE49-F238E27FC236}">
-                <a16:creationId xmlns="" xmlns:a16="http://schemas.microsoft.com/office/drawing/2014/main" id="{87B51822-97FF-47A7-8E4E-A0F79B4EB237}"/>
+                <a16:creationId xmlns:a16="http://schemas.microsoft.com/office/drawing/2014/main" xmlns="" id="{87B51822-97FF-47A7-8E4E-A0F79B4EB237}"/>
               </a:ext>
             </a:extLst>
           </p:cNvPr>
@@ -3236,7 +3237,7 @@
           <p:cNvPr id="20" name="Content Placeholder 2">
             <a:extLst>
               <a:ext uri="{FF2B5EF4-FFF2-40B4-BE49-F238E27FC236}">
-                <a16:creationId xmlns="" xmlns:a16="http://schemas.microsoft.com/office/drawing/2014/main" id="{FE796BFF-6E5F-4DE7-B193-F501FC094D63}"/>
+                <a16:creationId xmlns:a16="http://schemas.microsoft.com/office/drawing/2014/main" xmlns="" id="{FE796BFF-6E5F-4DE7-B193-F501FC094D63}"/>
               </a:ext>
             </a:extLst>
           </p:cNvPr>
@@ -3347,7 +3348,7 @@
           <p:cNvPr id="21" name="Content Placeholder 3">
             <a:extLst>
               <a:ext uri="{FF2B5EF4-FFF2-40B4-BE49-F238E27FC236}">
-                <a16:creationId xmlns="" xmlns:a16="http://schemas.microsoft.com/office/drawing/2014/main" id="{78622754-CA4D-4C27-A37F-B26E7B4C9CA2}"/>
+                <a16:creationId xmlns:a16="http://schemas.microsoft.com/office/drawing/2014/main" xmlns="" id="{78622754-CA4D-4C27-A37F-B26E7B4C9CA2}"/>
               </a:ext>
             </a:extLst>
           </p:cNvPr>
@@ -3453,11 +3454,11 @@
   <p:clrMapOvr>
     <a:masterClrMapping/>
   </p:clrMapOvr>
-  <mc:AlternateContent xmlns:mc="http://schemas.openxmlformats.org/markup-compatibility/2006">
-    <mc:Choice xmlns:p14="http://schemas.microsoft.com/office/powerpoint/2010/main" Requires="p14">
+  <mc:AlternateContent xmlns:mc="http://schemas.openxmlformats.org/markup-compatibility/2006" xmlns:p14="http://schemas.microsoft.com/office/powerpoint/2010/main">
+    <mc:Choice Requires="p14">
       <p:transition p14:dur="0"/>
     </mc:Choice>
-    <mc:Fallback>
+    <mc:Fallback xmlns="">
       <p:transition/>
     </mc:Fallback>
   </mc:AlternateContent>
@@ -3494,7 +3495,7 @@
           <p:cNvPr id="11" name="Rectangle 10">
             <a:extLst>
               <a:ext uri="{FF2B5EF4-FFF2-40B4-BE49-F238E27FC236}">
-                <a16:creationId xmlns="" xmlns:a16="http://schemas.microsoft.com/office/drawing/2014/main" id="{EB3E033F-4449-40FA-BC85-BD2712D313DD}"/>
+                <a16:creationId xmlns:a16="http://schemas.microsoft.com/office/drawing/2014/main" xmlns="" id="{EB3E033F-4449-40FA-BC85-BD2712D313DD}"/>
               </a:ext>
             </a:extLst>
           </p:cNvPr>
@@ -3548,7 +3549,7 @@
           <p:cNvPr id="10" name="Freeform: Shape 9">
             <a:extLst>
               <a:ext uri="{FF2B5EF4-FFF2-40B4-BE49-F238E27FC236}">
-                <a16:creationId xmlns="" xmlns:a16="http://schemas.microsoft.com/office/drawing/2014/main" id="{63D26743-0505-444C-80B3-E88EE87DF72B}"/>
+                <a16:creationId xmlns:a16="http://schemas.microsoft.com/office/drawing/2014/main" xmlns="" id="{63D26743-0505-444C-80B3-E88EE87DF72B}"/>
               </a:ext>
             </a:extLst>
           </p:cNvPr>
@@ -3671,7 +3672,7 @@
           <p:cNvPr id="18" name="Freeform: Shape 17">
             <a:extLst>
               <a:ext uri="{FF2B5EF4-FFF2-40B4-BE49-F238E27FC236}">
-                <a16:creationId xmlns="" xmlns:a16="http://schemas.microsoft.com/office/drawing/2014/main" id="{E37145E9-AC61-47D5-9288-8789940F81B6}"/>
+                <a16:creationId xmlns:a16="http://schemas.microsoft.com/office/drawing/2014/main" xmlns="" id="{E37145E9-AC61-47D5-9288-8789940F81B6}"/>
               </a:ext>
             </a:extLst>
           </p:cNvPr>
@@ -3823,7 +3824,7 @@
           <p:cNvPr id="12" name="Freeform: Shape 11">
             <a:extLst>
               <a:ext uri="{FF2B5EF4-FFF2-40B4-BE49-F238E27FC236}">
-                <a16:creationId xmlns="" xmlns:a16="http://schemas.microsoft.com/office/drawing/2014/main" id="{A5E2B3ED-9A49-40A7-B8A3-62595FE513F9}"/>
+                <a16:creationId xmlns:a16="http://schemas.microsoft.com/office/drawing/2014/main" xmlns="" id="{A5E2B3ED-9A49-40A7-B8A3-62595FE513F9}"/>
               </a:ext>
             </a:extLst>
           </p:cNvPr>
@@ -3973,7 +3974,7 @@
           <p:cNvPr id="8" name="Freeform: Shape 7">
             <a:extLst>
               <a:ext uri="{FF2B5EF4-FFF2-40B4-BE49-F238E27FC236}">
-                <a16:creationId xmlns="" xmlns:a16="http://schemas.microsoft.com/office/drawing/2014/main" id="{1599AF7E-3E34-4597-AA72-9373A7FDB020}"/>
+                <a16:creationId xmlns:a16="http://schemas.microsoft.com/office/drawing/2014/main" xmlns="" id="{1599AF7E-3E34-4597-AA72-9373A7FDB020}"/>
               </a:ext>
             </a:extLst>
           </p:cNvPr>
@@ -4119,7 +4120,7 @@
           <p:cNvPr id="2" name="Title 1">
             <a:extLst>
               <a:ext uri="{FF2B5EF4-FFF2-40B4-BE49-F238E27FC236}">
-                <a16:creationId xmlns="" xmlns:a16="http://schemas.microsoft.com/office/drawing/2014/main" id="{4A2DF563-7FAC-46B3-B24C-7E45CD89DA2B}"/>
+                <a16:creationId xmlns:a16="http://schemas.microsoft.com/office/drawing/2014/main" xmlns="" id="{4A2DF563-7FAC-46B3-B24C-7E45CD89DA2B}"/>
               </a:ext>
             </a:extLst>
           </p:cNvPr>
@@ -4165,7 +4166,7 @@
           <p:cNvPr id="15" name="Group 14">
             <a:extLst>
               <a:ext uri="{FF2B5EF4-FFF2-40B4-BE49-F238E27FC236}">
-                <a16:creationId xmlns="" xmlns:a16="http://schemas.microsoft.com/office/drawing/2014/main" id="{7732E1E7-45E3-4264-8F26-66758696DD1E}"/>
+                <a16:creationId xmlns:a16="http://schemas.microsoft.com/office/drawing/2014/main" xmlns="" id="{7732E1E7-45E3-4264-8F26-66758696DD1E}"/>
               </a:ext>
             </a:extLst>
           </p:cNvPr>
@@ -4185,7 +4186,7 @@
             <p:cNvPr id="16" name="Freeform: Shape 15">
               <a:extLst>
                 <a:ext uri="{FF2B5EF4-FFF2-40B4-BE49-F238E27FC236}">
-                  <a16:creationId xmlns="" xmlns:a16="http://schemas.microsoft.com/office/drawing/2014/main" id="{2E3DF883-8093-49FA-81E1-E5D77F086A25}"/>
+                  <a16:creationId xmlns:a16="http://schemas.microsoft.com/office/drawing/2014/main" xmlns="" id="{2E3DF883-8093-49FA-81E1-E5D77F086A25}"/>
                 </a:ext>
               </a:extLst>
             </p:cNvPr>
@@ -4275,7 +4276,7 @@
             <p:cNvPr id="17" name="Freeform: Shape 16">
               <a:extLst>
                 <a:ext uri="{FF2B5EF4-FFF2-40B4-BE49-F238E27FC236}">
-                  <a16:creationId xmlns="" xmlns:a16="http://schemas.microsoft.com/office/drawing/2014/main" id="{18944C90-37E5-4BBE-89FF-060627168050}"/>
+                  <a16:creationId xmlns:a16="http://schemas.microsoft.com/office/drawing/2014/main" xmlns="" id="{18944C90-37E5-4BBE-89FF-060627168050}"/>
                 </a:ext>
               </a:extLst>
             </p:cNvPr>
@@ -4374,7 +4375,7 @@
           <p:cNvPr id="6" name="Group 5">
             <a:extLst>
               <a:ext uri="{FF2B5EF4-FFF2-40B4-BE49-F238E27FC236}">
-                <a16:creationId xmlns="" xmlns:a16="http://schemas.microsoft.com/office/drawing/2014/main" id="{D9EBF8BB-A805-4DDB-B459-082F99815B95}"/>
+                <a16:creationId xmlns:a16="http://schemas.microsoft.com/office/drawing/2014/main" xmlns="" id="{D9EBF8BB-A805-4DDB-B459-082F99815B95}"/>
               </a:ext>
             </a:extLst>
           </p:cNvPr>
@@ -4394,7 +4395,7 @@
             <p:cNvPr id="19" name="Rectangle: Single Corner Snipped 18">
               <a:extLst>
                 <a:ext uri="{FF2B5EF4-FFF2-40B4-BE49-F238E27FC236}">
-                  <a16:creationId xmlns="" xmlns:a16="http://schemas.microsoft.com/office/drawing/2014/main" id="{5D638788-DD47-45E7-939A-FA108A818173}"/>
+                  <a16:creationId xmlns:a16="http://schemas.microsoft.com/office/drawing/2014/main" xmlns="" id="{5D638788-DD47-45E7-939A-FA108A818173}"/>
                 </a:ext>
               </a:extLst>
             </p:cNvPr>
@@ -4455,7 +4456,7 @@
             <p:cNvPr id="3" name="Rectangle: Single Corner Snipped 2">
               <a:extLst>
                 <a:ext uri="{FF2B5EF4-FFF2-40B4-BE49-F238E27FC236}">
-                  <a16:creationId xmlns="" xmlns:a16="http://schemas.microsoft.com/office/drawing/2014/main" id="{74BDECEF-EEFE-4332-B3B2-BDE4F82C10FC}"/>
+                  <a16:creationId xmlns:a16="http://schemas.microsoft.com/office/drawing/2014/main" xmlns="" id="{74BDECEF-EEFE-4332-B3B2-BDE4F82C10FC}"/>
                 </a:ext>
               </a:extLst>
             </p:cNvPr>
@@ -4512,7 +4513,7 @@
           <p:cNvPr id="20" name="Picture Placeholder 8">
             <a:extLst>
               <a:ext uri="{FF2B5EF4-FFF2-40B4-BE49-F238E27FC236}">
-                <a16:creationId xmlns="" xmlns:a16="http://schemas.microsoft.com/office/drawing/2014/main" id="{6D00E6B4-1CBE-404E-B943-5F1832320C1C}"/>
+                <a16:creationId xmlns:a16="http://schemas.microsoft.com/office/drawing/2014/main" xmlns="" id="{6D00E6B4-1CBE-404E-B943-5F1832320C1C}"/>
               </a:ext>
             </a:extLst>
           </p:cNvPr>
@@ -4575,7 +4576,7 @@
           <p:cNvPr id="21" name="Picture Placeholder 8">
             <a:extLst>
               <a:ext uri="{FF2B5EF4-FFF2-40B4-BE49-F238E27FC236}">
-                <a16:creationId xmlns="" xmlns:a16="http://schemas.microsoft.com/office/drawing/2014/main" id="{7CD59BFD-62BE-4E33-92A5-B84A2A9A8D3B}"/>
+                <a16:creationId xmlns:a16="http://schemas.microsoft.com/office/drawing/2014/main" xmlns="" id="{7CD59BFD-62BE-4E33-92A5-B84A2A9A8D3B}"/>
               </a:ext>
             </a:extLst>
           </p:cNvPr>
@@ -4638,7 +4639,7 @@
           <p:cNvPr id="22" name="Picture Placeholder 8">
             <a:extLst>
               <a:ext uri="{FF2B5EF4-FFF2-40B4-BE49-F238E27FC236}">
-                <a16:creationId xmlns="" xmlns:a16="http://schemas.microsoft.com/office/drawing/2014/main" id="{60DC5978-55B8-421D-91B4-29F8210A7B2C}"/>
+                <a16:creationId xmlns:a16="http://schemas.microsoft.com/office/drawing/2014/main" xmlns="" id="{60DC5978-55B8-421D-91B4-29F8210A7B2C}"/>
               </a:ext>
             </a:extLst>
           </p:cNvPr>
@@ -4701,7 +4702,7 @@
           <p:cNvPr id="23" name="Picture Placeholder 8">
             <a:extLst>
               <a:ext uri="{FF2B5EF4-FFF2-40B4-BE49-F238E27FC236}">
-                <a16:creationId xmlns="" xmlns:a16="http://schemas.microsoft.com/office/drawing/2014/main" id="{BE3FB8C3-2C7E-4C59-8BD5-53FA2772DB56}"/>
+                <a16:creationId xmlns:a16="http://schemas.microsoft.com/office/drawing/2014/main" xmlns="" id="{BE3FB8C3-2C7E-4C59-8BD5-53FA2772DB56}"/>
               </a:ext>
             </a:extLst>
           </p:cNvPr>
@@ -4764,7 +4765,7 @@
           <p:cNvPr id="24" name="Picture Placeholder 8">
             <a:extLst>
               <a:ext uri="{FF2B5EF4-FFF2-40B4-BE49-F238E27FC236}">
-                <a16:creationId xmlns="" xmlns:a16="http://schemas.microsoft.com/office/drawing/2014/main" id="{FD8FA9DA-C36B-4889-B88F-28B5829E53E2}"/>
+                <a16:creationId xmlns:a16="http://schemas.microsoft.com/office/drawing/2014/main" xmlns="" id="{FD8FA9DA-C36B-4889-B88F-28B5829E53E2}"/>
               </a:ext>
             </a:extLst>
           </p:cNvPr>
@@ -4827,7 +4828,7 @@
           <p:cNvPr id="26" name="Text Placeholder 22">
             <a:extLst>
               <a:ext uri="{FF2B5EF4-FFF2-40B4-BE49-F238E27FC236}">
-                <a16:creationId xmlns="" xmlns:a16="http://schemas.microsoft.com/office/drawing/2014/main" id="{2A19101D-7C37-42BF-8167-5391EA65EC3A}"/>
+                <a16:creationId xmlns:a16="http://schemas.microsoft.com/office/drawing/2014/main" xmlns="" id="{2A19101D-7C37-42BF-8167-5391EA65EC3A}"/>
               </a:ext>
             </a:extLst>
           </p:cNvPr>
@@ -4937,7 +4938,7 @@
           <p:cNvPr id="27" name="Text Placeholder 22">
             <a:extLst>
               <a:ext uri="{FF2B5EF4-FFF2-40B4-BE49-F238E27FC236}">
-                <a16:creationId xmlns="" xmlns:a16="http://schemas.microsoft.com/office/drawing/2014/main" id="{05F72315-51A9-431C-B80A-45E4FB1D6BD6}"/>
+                <a16:creationId xmlns:a16="http://schemas.microsoft.com/office/drawing/2014/main" xmlns="" id="{05F72315-51A9-431C-B80A-45E4FB1D6BD6}"/>
               </a:ext>
             </a:extLst>
           </p:cNvPr>
@@ -5047,7 +5048,7 @@
           <p:cNvPr id="28" name="Text Placeholder 22">
             <a:extLst>
               <a:ext uri="{FF2B5EF4-FFF2-40B4-BE49-F238E27FC236}">
-                <a16:creationId xmlns="" xmlns:a16="http://schemas.microsoft.com/office/drawing/2014/main" id="{883D1F0C-34F1-46E1-B178-E4AB82B14631}"/>
+                <a16:creationId xmlns:a16="http://schemas.microsoft.com/office/drawing/2014/main" xmlns="" id="{883D1F0C-34F1-46E1-B178-E4AB82B14631}"/>
               </a:ext>
             </a:extLst>
           </p:cNvPr>
@@ -5157,7 +5158,7 @@
           <p:cNvPr id="29" name="Text Placeholder 22">
             <a:extLst>
               <a:ext uri="{FF2B5EF4-FFF2-40B4-BE49-F238E27FC236}">
-                <a16:creationId xmlns="" xmlns:a16="http://schemas.microsoft.com/office/drawing/2014/main" id="{7202A849-DF14-40E7-B38D-1185F72603EC}"/>
+                <a16:creationId xmlns:a16="http://schemas.microsoft.com/office/drawing/2014/main" xmlns="" id="{7202A849-DF14-40E7-B38D-1185F72603EC}"/>
               </a:ext>
             </a:extLst>
           </p:cNvPr>
@@ -5267,7 +5268,7 @@
           <p:cNvPr id="30" name="Text Placeholder 22">
             <a:extLst>
               <a:ext uri="{FF2B5EF4-FFF2-40B4-BE49-F238E27FC236}">
-                <a16:creationId xmlns="" xmlns:a16="http://schemas.microsoft.com/office/drawing/2014/main" id="{CCFC1ADF-AC11-4CCD-AC2D-478B6FFEA5EA}"/>
+                <a16:creationId xmlns:a16="http://schemas.microsoft.com/office/drawing/2014/main" xmlns="" id="{CCFC1ADF-AC11-4CCD-AC2D-478B6FFEA5EA}"/>
               </a:ext>
             </a:extLst>
           </p:cNvPr>
@@ -5377,7 +5378,7 @@
           <p:cNvPr id="7" name="Straight Connector 6">
             <a:extLst>
               <a:ext uri="{FF2B5EF4-FFF2-40B4-BE49-F238E27FC236}">
-                <a16:creationId xmlns="" xmlns:a16="http://schemas.microsoft.com/office/drawing/2014/main" id="{2B4CB326-DA0E-488E-B236-7017E8438FBB}"/>
+                <a16:creationId xmlns:a16="http://schemas.microsoft.com/office/drawing/2014/main" xmlns="" id="{2B4CB326-DA0E-488E-B236-7017E8438FBB}"/>
               </a:ext>
             </a:extLst>
           </p:cNvPr>
@@ -5418,7 +5419,7 @@
           <p:cNvPr id="31" name="Straight Connector 30">
             <a:extLst>
               <a:ext uri="{FF2B5EF4-FFF2-40B4-BE49-F238E27FC236}">
-                <a16:creationId xmlns="" xmlns:a16="http://schemas.microsoft.com/office/drawing/2014/main" id="{9366B533-7212-4A36-9CE2-D6302E721F8F}"/>
+                <a16:creationId xmlns:a16="http://schemas.microsoft.com/office/drawing/2014/main" xmlns="" id="{9366B533-7212-4A36-9CE2-D6302E721F8F}"/>
               </a:ext>
             </a:extLst>
           </p:cNvPr>
@@ -5459,7 +5460,7 @@
           <p:cNvPr id="32" name="Straight Connector 31">
             <a:extLst>
               <a:ext uri="{FF2B5EF4-FFF2-40B4-BE49-F238E27FC236}">
-                <a16:creationId xmlns="" xmlns:a16="http://schemas.microsoft.com/office/drawing/2014/main" id="{AD7474CD-E230-4E14-8274-5E20F673F401}"/>
+                <a16:creationId xmlns:a16="http://schemas.microsoft.com/office/drawing/2014/main" xmlns="" id="{AD7474CD-E230-4E14-8274-5E20F673F401}"/>
               </a:ext>
             </a:extLst>
           </p:cNvPr>
@@ -5500,7 +5501,7 @@
           <p:cNvPr id="33" name="Straight Connector 32">
             <a:extLst>
               <a:ext uri="{FF2B5EF4-FFF2-40B4-BE49-F238E27FC236}">
-                <a16:creationId xmlns="" xmlns:a16="http://schemas.microsoft.com/office/drawing/2014/main" id="{6BF71FCE-6F39-4D2F-82BE-7D9F1D2ED59F}"/>
+                <a16:creationId xmlns:a16="http://schemas.microsoft.com/office/drawing/2014/main" xmlns="" id="{6BF71FCE-6F39-4D2F-82BE-7D9F1D2ED59F}"/>
               </a:ext>
             </a:extLst>
           </p:cNvPr>
@@ -5541,7 +5542,7 @@
           <p:cNvPr id="34" name="Straight Connector 33">
             <a:extLst>
               <a:ext uri="{FF2B5EF4-FFF2-40B4-BE49-F238E27FC236}">
-                <a16:creationId xmlns="" xmlns:a16="http://schemas.microsoft.com/office/drawing/2014/main" id="{AE97AC7A-17D9-4F42-9DD0-94FE4FC6BF19}"/>
+                <a16:creationId xmlns:a16="http://schemas.microsoft.com/office/drawing/2014/main" xmlns="" id="{AE97AC7A-17D9-4F42-9DD0-94FE4FC6BF19}"/>
               </a:ext>
             </a:extLst>
           </p:cNvPr>
@@ -5582,7 +5583,7 @@
           <p:cNvPr id="35" name="Freeform: Shape 34">
             <a:extLst>
               <a:ext uri="{FF2B5EF4-FFF2-40B4-BE49-F238E27FC236}">
-                <a16:creationId xmlns="" xmlns:a16="http://schemas.microsoft.com/office/drawing/2014/main" id="{62EEBF51-DCAD-4335-85E9-52801031A1BF}"/>
+                <a16:creationId xmlns:a16="http://schemas.microsoft.com/office/drawing/2014/main" xmlns="" id="{62EEBF51-DCAD-4335-85E9-52801031A1BF}"/>
               </a:ext>
             </a:extLst>
           </p:cNvPr>
@@ -5677,7 +5678,7 @@
           <p:cNvPr id="5" name="Slide Number Placeholder 4">
             <a:extLst>
               <a:ext uri="{FF2B5EF4-FFF2-40B4-BE49-F238E27FC236}">
-                <a16:creationId xmlns="" xmlns:a16="http://schemas.microsoft.com/office/drawing/2014/main" id="{87B51822-97FF-47A7-8E4E-A0F79B4EB237}"/>
+                <a16:creationId xmlns:a16="http://schemas.microsoft.com/office/drawing/2014/main" xmlns="" id="{87B51822-97FF-47A7-8E4E-A0F79B4EB237}"/>
               </a:ext>
             </a:extLst>
           </p:cNvPr>
@@ -5726,11 +5727,11 @@
   <p:clrMapOvr>
     <a:masterClrMapping/>
   </p:clrMapOvr>
-  <mc:AlternateContent xmlns:mc="http://schemas.openxmlformats.org/markup-compatibility/2006">
-    <mc:Choice xmlns:p14="http://schemas.microsoft.com/office/powerpoint/2010/main" Requires="p14">
+  <mc:AlternateContent xmlns:mc="http://schemas.openxmlformats.org/markup-compatibility/2006" xmlns:p14="http://schemas.microsoft.com/office/powerpoint/2010/main">
+    <mc:Choice Requires="p14">
       <p:transition p14:dur="0"/>
     </mc:Choice>
-    <mc:Fallback>
+    <mc:Fallback xmlns="">
       <p:transition/>
     </mc:Fallback>
   </mc:AlternateContent>
@@ -5767,7 +5768,7 @@
           <p:cNvPr id="11" name="Rectangle 10">
             <a:extLst>
               <a:ext uri="{FF2B5EF4-FFF2-40B4-BE49-F238E27FC236}">
-                <a16:creationId xmlns="" xmlns:a16="http://schemas.microsoft.com/office/drawing/2014/main" id="{EB3E033F-4449-40FA-BC85-BD2712D313DD}"/>
+                <a16:creationId xmlns:a16="http://schemas.microsoft.com/office/drawing/2014/main" xmlns="" id="{EB3E033F-4449-40FA-BC85-BD2712D313DD}"/>
               </a:ext>
             </a:extLst>
           </p:cNvPr>
@@ -5821,7 +5822,7 @@
           <p:cNvPr id="10" name="Freeform: Shape 9">
             <a:extLst>
               <a:ext uri="{FF2B5EF4-FFF2-40B4-BE49-F238E27FC236}">
-                <a16:creationId xmlns="" xmlns:a16="http://schemas.microsoft.com/office/drawing/2014/main" id="{63D26743-0505-444C-80B3-E88EE87DF72B}"/>
+                <a16:creationId xmlns:a16="http://schemas.microsoft.com/office/drawing/2014/main" xmlns="" id="{63D26743-0505-444C-80B3-E88EE87DF72B}"/>
               </a:ext>
             </a:extLst>
           </p:cNvPr>
@@ -5944,7 +5945,7 @@
           <p:cNvPr id="18" name="Freeform: Shape 17">
             <a:extLst>
               <a:ext uri="{FF2B5EF4-FFF2-40B4-BE49-F238E27FC236}">
-                <a16:creationId xmlns="" xmlns:a16="http://schemas.microsoft.com/office/drawing/2014/main" id="{E37145E9-AC61-47D5-9288-8789940F81B6}"/>
+                <a16:creationId xmlns:a16="http://schemas.microsoft.com/office/drawing/2014/main" xmlns="" id="{E37145E9-AC61-47D5-9288-8789940F81B6}"/>
               </a:ext>
             </a:extLst>
           </p:cNvPr>
@@ -6096,7 +6097,7 @@
           <p:cNvPr id="12" name="Freeform: Shape 11">
             <a:extLst>
               <a:ext uri="{FF2B5EF4-FFF2-40B4-BE49-F238E27FC236}">
-                <a16:creationId xmlns="" xmlns:a16="http://schemas.microsoft.com/office/drawing/2014/main" id="{A5E2B3ED-9A49-40A7-B8A3-62595FE513F9}"/>
+                <a16:creationId xmlns:a16="http://schemas.microsoft.com/office/drawing/2014/main" xmlns="" id="{A5E2B3ED-9A49-40A7-B8A3-62595FE513F9}"/>
               </a:ext>
             </a:extLst>
           </p:cNvPr>
@@ -6246,7 +6247,7 @@
           <p:cNvPr id="8" name="Freeform: Shape 7">
             <a:extLst>
               <a:ext uri="{FF2B5EF4-FFF2-40B4-BE49-F238E27FC236}">
-                <a16:creationId xmlns="" xmlns:a16="http://schemas.microsoft.com/office/drawing/2014/main" id="{1599AF7E-3E34-4597-AA72-9373A7FDB020}"/>
+                <a16:creationId xmlns:a16="http://schemas.microsoft.com/office/drawing/2014/main" xmlns="" id="{1599AF7E-3E34-4597-AA72-9373A7FDB020}"/>
               </a:ext>
             </a:extLst>
           </p:cNvPr>
@@ -6392,7 +6393,7 @@
           <p:cNvPr id="2" name="Title 1">
             <a:extLst>
               <a:ext uri="{FF2B5EF4-FFF2-40B4-BE49-F238E27FC236}">
-                <a16:creationId xmlns="" xmlns:a16="http://schemas.microsoft.com/office/drawing/2014/main" id="{4A2DF563-7FAC-46B3-B24C-7E45CD89DA2B}"/>
+                <a16:creationId xmlns:a16="http://schemas.microsoft.com/office/drawing/2014/main" xmlns="" id="{4A2DF563-7FAC-46B3-B24C-7E45CD89DA2B}"/>
               </a:ext>
             </a:extLst>
           </p:cNvPr>
@@ -6438,7 +6439,7 @@
           <p:cNvPr id="15" name="Group 14">
             <a:extLst>
               <a:ext uri="{FF2B5EF4-FFF2-40B4-BE49-F238E27FC236}">
-                <a16:creationId xmlns="" xmlns:a16="http://schemas.microsoft.com/office/drawing/2014/main" id="{7732E1E7-45E3-4264-8F26-66758696DD1E}"/>
+                <a16:creationId xmlns:a16="http://schemas.microsoft.com/office/drawing/2014/main" xmlns="" id="{7732E1E7-45E3-4264-8F26-66758696DD1E}"/>
               </a:ext>
             </a:extLst>
           </p:cNvPr>
@@ -6458,7 +6459,7 @@
             <p:cNvPr id="16" name="Freeform: Shape 15">
               <a:extLst>
                 <a:ext uri="{FF2B5EF4-FFF2-40B4-BE49-F238E27FC236}">
-                  <a16:creationId xmlns="" xmlns:a16="http://schemas.microsoft.com/office/drawing/2014/main" id="{2E3DF883-8093-49FA-81E1-E5D77F086A25}"/>
+                  <a16:creationId xmlns:a16="http://schemas.microsoft.com/office/drawing/2014/main" xmlns="" id="{2E3DF883-8093-49FA-81E1-E5D77F086A25}"/>
                 </a:ext>
               </a:extLst>
             </p:cNvPr>
@@ -6548,7 +6549,7 @@
             <p:cNvPr id="17" name="Freeform: Shape 16">
               <a:extLst>
                 <a:ext uri="{FF2B5EF4-FFF2-40B4-BE49-F238E27FC236}">
-                  <a16:creationId xmlns="" xmlns:a16="http://schemas.microsoft.com/office/drawing/2014/main" id="{18944C90-37E5-4BBE-89FF-060627168050}"/>
+                  <a16:creationId xmlns:a16="http://schemas.microsoft.com/office/drawing/2014/main" xmlns="" id="{18944C90-37E5-4BBE-89FF-060627168050}"/>
                 </a:ext>
               </a:extLst>
             </p:cNvPr>
@@ -6647,7 +6648,7 @@
           <p:cNvPr id="6" name="Group 5">
             <a:extLst>
               <a:ext uri="{FF2B5EF4-FFF2-40B4-BE49-F238E27FC236}">
-                <a16:creationId xmlns="" xmlns:a16="http://schemas.microsoft.com/office/drawing/2014/main" id="{D9EBF8BB-A805-4DDB-B459-082F99815B95}"/>
+                <a16:creationId xmlns:a16="http://schemas.microsoft.com/office/drawing/2014/main" xmlns="" id="{D9EBF8BB-A805-4DDB-B459-082F99815B95}"/>
               </a:ext>
             </a:extLst>
           </p:cNvPr>
@@ -6667,7 +6668,7 @@
             <p:cNvPr id="19" name="Rectangle: Single Corner Snipped 18">
               <a:extLst>
                 <a:ext uri="{FF2B5EF4-FFF2-40B4-BE49-F238E27FC236}">
-                  <a16:creationId xmlns="" xmlns:a16="http://schemas.microsoft.com/office/drawing/2014/main" id="{5D638788-DD47-45E7-939A-FA108A818173}"/>
+                  <a16:creationId xmlns:a16="http://schemas.microsoft.com/office/drawing/2014/main" xmlns="" id="{5D638788-DD47-45E7-939A-FA108A818173}"/>
                 </a:ext>
               </a:extLst>
             </p:cNvPr>
@@ -6728,7 +6729,7 @@
             <p:cNvPr id="3" name="Rectangle: Single Corner Snipped 2">
               <a:extLst>
                 <a:ext uri="{FF2B5EF4-FFF2-40B4-BE49-F238E27FC236}">
-                  <a16:creationId xmlns="" xmlns:a16="http://schemas.microsoft.com/office/drawing/2014/main" id="{74BDECEF-EEFE-4332-B3B2-BDE4F82C10FC}"/>
+                  <a16:creationId xmlns:a16="http://schemas.microsoft.com/office/drawing/2014/main" xmlns="" id="{74BDECEF-EEFE-4332-B3B2-BDE4F82C10FC}"/>
                 </a:ext>
               </a:extLst>
             </p:cNvPr>
@@ -6785,7 +6786,7 @@
           <p:cNvPr id="26" name="Text Placeholder 22">
             <a:extLst>
               <a:ext uri="{FF2B5EF4-FFF2-40B4-BE49-F238E27FC236}">
-                <a16:creationId xmlns="" xmlns:a16="http://schemas.microsoft.com/office/drawing/2014/main" id="{2A19101D-7C37-42BF-8167-5391EA65EC3A}"/>
+                <a16:creationId xmlns:a16="http://schemas.microsoft.com/office/drawing/2014/main" xmlns="" id="{2A19101D-7C37-42BF-8167-5391EA65EC3A}"/>
               </a:ext>
             </a:extLst>
           </p:cNvPr>
@@ -6895,7 +6896,7 @@
           <p:cNvPr id="35" name="Freeform: Shape 34">
             <a:extLst>
               <a:ext uri="{FF2B5EF4-FFF2-40B4-BE49-F238E27FC236}">
-                <a16:creationId xmlns="" xmlns:a16="http://schemas.microsoft.com/office/drawing/2014/main" id="{62EEBF51-DCAD-4335-85E9-52801031A1BF}"/>
+                <a16:creationId xmlns:a16="http://schemas.microsoft.com/office/drawing/2014/main" xmlns="" id="{62EEBF51-DCAD-4335-85E9-52801031A1BF}"/>
               </a:ext>
             </a:extLst>
           </p:cNvPr>
@@ -6990,7 +6991,7 @@
           <p:cNvPr id="5" name="Slide Number Placeholder 4">
             <a:extLst>
               <a:ext uri="{FF2B5EF4-FFF2-40B4-BE49-F238E27FC236}">
-                <a16:creationId xmlns="" xmlns:a16="http://schemas.microsoft.com/office/drawing/2014/main" id="{87B51822-97FF-47A7-8E4E-A0F79B4EB237}"/>
+                <a16:creationId xmlns:a16="http://schemas.microsoft.com/office/drawing/2014/main" xmlns="" id="{87B51822-97FF-47A7-8E4E-A0F79B4EB237}"/>
               </a:ext>
             </a:extLst>
           </p:cNvPr>
@@ -7034,7 +7035,7 @@
           <p:cNvPr id="13" name="Picture Placeholder 12">
             <a:extLst>
               <a:ext uri="{FF2B5EF4-FFF2-40B4-BE49-F238E27FC236}">
-                <a16:creationId xmlns="" xmlns:a16="http://schemas.microsoft.com/office/drawing/2014/main" id="{231B97CF-FD24-4932-8459-893B1AC73D33}"/>
+                <a16:creationId xmlns:a16="http://schemas.microsoft.com/office/drawing/2014/main" xmlns="" id="{231B97CF-FD24-4932-8459-893B1AC73D33}"/>
               </a:ext>
             </a:extLst>
           </p:cNvPr>
@@ -7079,7 +7080,7 @@
           <p:cNvPr id="36" name="Text Placeholder 22">
             <a:extLst>
               <a:ext uri="{FF2B5EF4-FFF2-40B4-BE49-F238E27FC236}">
-                <a16:creationId xmlns="" xmlns:a16="http://schemas.microsoft.com/office/drawing/2014/main" id="{642D3CE0-C3B4-4F3F-A650-AB452B3AD4BA}"/>
+                <a16:creationId xmlns:a16="http://schemas.microsoft.com/office/drawing/2014/main" xmlns="" id="{642D3CE0-C3B4-4F3F-A650-AB452B3AD4BA}"/>
               </a:ext>
             </a:extLst>
           </p:cNvPr>
@@ -7189,7 +7190,7 @@
           <p:cNvPr id="37" name="Text Placeholder 22">
             <a:extLst>
               <a:ext uri="{FF2B5EF4-FFF2-40B4-BE49-F238E27FC236}">
-                <a16:creationId xmlns="" xmlns:a16="http://schemas.microsoft.com/office/drawing/2014/main" id="{DBED2BB0-CDAD-40EE-8B35-C66DF45EE29D}"/>
+                <a16:creationId xmlns:a16="http://schemas.microsoft.com/office/drawing/2014/main" xmlns="" id="{DBED2BB0-CDAD-40EE-8B35-C66DF45EE29D}"/>
               </a:ext>
             </a:extLst>
           </p:cNvPr>
@@ -7304,11 +7305,11 @@
   <p:clrMapOvr>
     <a:masterClrMapping/>
   </p:clrMapOvr>
-  <mc:AlternateContent xmlns:mc="http://schemas.openxmlformats.org/markup-compatibility/2006">
-    <mc:Choice xmlns:p14="http://schemas.microsoft.com/office/powerpoint/2010/main" Requires="p14">
+  <mc:AlternateContent xmlns:mc="http://schemas.openxmlformats.org/markup-compatibility/2006" xmlns:p14="http://schemas.microsoft.com/office/powerpoint/2010/main">
+    <mc:Choice Requires="p14">
       <p:transition p14:dur="0"/>
     </mc:Choice>
-    <mc:Fallback>
+    <mc:Fallback xmlns="">
       <p:transition/>
     </mc:Fallback>
   </mc:AlternateContent>
@@ -7345,7 +7346,7 @@
           <p:cNvPr id="11" name="Rectangle 10">
             <a:extLst>
               <a:ext uri="{FF2B5EF4-FFF2-40B4-BE49-F238E27FC236}">
-                <a16:creationId xmlns="" xmlns:a16="http://schemas.microsoft.com/office/drawing/2014/main" id="{EB3E033F-4449-40FA-BC85-BD2712D313DD}"/>
+                <a16:creationId xmlns:a16="http://schemas.microsoft.com/office/drawing/2014/main" xmlns="" id="{EB3E033F-4449-40FA-BC85-BD2712D313DD}"/>
               </a:ext>
             </a:extLst>
           </p:cNvPr>
@@ -7399,7 +7400,7 @@
           <p:cNvPr id="10" name="Freeform: Shape 9">
             <a:extLst>
               <a:ext uri="{FF2B5EF4-FFF2-40B4-BE49-F238E27FC236}">
-                <a16:creationId xmlns="" xmlns:a16="http://schemas.microsoft.com/office/drawing/2014/main" id="{63D26743-0505-444C-80B3-E88EE87DF72B}"/>
+                <a16:creationId xmlns:a16="http://schemas.microsoft.com/office/drawing/2014/main" xmlns="" id="{63D26743-0505-444C-80B3-E88EE87DF72B}"/>
               </a:ext>
             </a:extLst>
           </p:cNvPr>
@@ -7522,7 +7523,7 @@
           <p:cNvPr id="18" name="Freeform: Shape 17">
             <a:extLst>
               <a:ext uri="{FF2B5EF4-FFF2-40B4-BE49-F238E27FC236}">
-                <a16:creationId xmlns="" xmlns:a16="http://schemas.microsoft.com/office/drawing/2014/main" id="{E37145E9-AC61-47D5-9288-8789940F81B6}"/>
+                <a16:creationId xmlns:a16="http://schemas.microsoft.com/office/drawing/2014/main" xmlns="" id="{E37145E9-AC61-47D5-9288-8789940F81B6}"/>
               </a:ext>
             </a:extLst>
           </p:cNvPr>
@@ -7674,7 +7675,7 @@
           <p:cNvPr id="12" name="Freeform: Shape 11">
             <a:extLst>
               <a:ext uri="{FF2B5EF4-FFF2-40B4-BE49-F238E27FC236}">
-                <a16:creationId xmlns="" xmlns:a16="http://schemas.microsoft.com/office/drawing/2014/main" id="{A5E2B3ED-9A49-40A7-B8A3-62595FE513F9}"/>
+                <a16:creationId xmlns:a16="http://schemas.microsoft.com/office/drawing/2014/main" xmlns="" id="{A5E2B3ED-9A49-40A7-B8A3-62595FE513F9}"/>
               </a:ext>
             </a:extLst>
           </p:cNvPr>
@@ -7824,7 +7825,7 @@
           <p:cNvPr id="8" name="Freeform: Shape 7">
             <a:extLst>
               <a:ext uri="{FF2B5EF4-FFF2-40B4-BE49-F238E27FC236}">
-                <a16:creationId xmlns="" xmlns:a16="http://schemas.microsoft.com/office/drawing/2014/main" id="{1599AF7E-3E34-4597-AA72-9373A7FDB020}"/>
+                <a16:creationId xmlns:a16="http://schemas.microsoft.com/office/drawing/2014/main" xmlns="" id="{1599AF7E-3E34-4597-AA72-9373A7FDB020}"/>
               </a:ext>
             </a:extLst>
           </p:cNvPr>
@@ -7970,7 +7971,7 @@
           <p:cNvPr id="2" name="Title 1">
             <a:extLst>
               <a:ext uri="{FF2B5EF4-FFF2-40B4-BE49-F238E27FC236}">
-                <a16:creationId xmlns="" xmlns:a16="http://schemas.microsoft.com/office/drawing/2014/main" id="{4A2DF563-7FAC-46B3-B24C-7E45CD89DA2B}"/>
+                <a16:creationId xmlns:a16="http://schemas.microsoft.com/office/drawing/2014/main" xmlns="" id="{4A2DF563-7FAC-46B3-B24C-7E45CD89DA2B}"/>
               </a:ext>
             </a:extLst>
           </p:cNvPr>
@@ -8016,7 +8017,7 @@
           <p:cNvPr id="15" name="Group 14">
             <a:extLst>
               <a:ext uri="{FF2B5EF4-FFF2-40B4-BE49-F238E27FC236}">
-                <a16:creationId xmlns="" xmlns:a16="http://schemas.microsoft.com/office/drawing/2014/main" id="{7732E1E7-45E3-4264-8F26-66758696DD1E}"/>
+                <a16:creationId xmlns:a16="http://schemas.microsoft.com/office/drawing/2014/main" xmlns="" id="{7732E1E7-45E3-4264-8F26-66758696DD1E}"/>
               </a:ext>
             </a:extLst>
           </p:cNvPr>
@@ -8036,7 +8037,7 @@
             <p:cNvPr id="16" name="Freeform: Shape 15">
               <a:extLst>
                 <a:ext uri="{FF2B5EF4-FFF2-40B4-BE49-F238E27FC236}">
-                  <a16:creationId xmlns="" xmlns:a16="http://schemas.microsoft.com/office/drawing/2014/main" id="{2E3DF883-8093-49FA-81E1-E5D77F086A25}"/>
+                  <a16:creationId xmlns:a16="http://schemas.microsoft.com/office/drawing/2014/main" xmlns="" id="{2E3DF883-8093-49FA-81E1-E5D77F086A25}"/>
                 </a:ext>
               </a:extLst>
             </p:cNvPr>
@@ -8126,7 +8127,7 @@
             <p:cNvPr id="17" name="Freeform: Shape 16">
               <a:extLst>
                 <a:ext uri="{FF2B5EF4-FFF2-40B4-BE49-F238E27FC236}">
-                  <a16:creationId xmlns="" xmlns:a16="http://schemas.microsoft.com/office/drawing/2014/main" id="{18944C90-37E5-4BBE-89FF-060627168050}"/>
+                  <a16:creationId xmlns:a16="http://schemas.microsoft.com/office/drawing/2014/main" xmlns="" id="{18944C90-37E5-4BBE-89FF-060627168050}"/>
                 </a:ext>
               </a:extLst>
             </p:cNvPr>
@@ -8225,7 +8226,7 @@
           <p:cNvPr id="6" name="Group 5">
             <a:extLst>
               <a:ext uri="{FF2B5EF4-FFF2-40B4-BE49-F238E27FC236}">
-                <a16:creationId xmlns="" xmlns:a16="http://schemas.microsoft.com/office/drawing/2014/main" id="{D9EBF8BB-A805-4DDB-B459-082F99815B95}"/>
+                <a16:creationId xmlns:a16="http://schemas.microsoft.com/office/drawing/2014/main" xmlns="" id="{D9EBF8BB-A805-4DDB-B459-082F99815B95}"/>
               </a:ext>
             </a:extLst>
           </p:cNvPr>
@@ -8245,7 +8246,7 @@
             <p:cNvPr id="19" name="Rectangle: Single Corner Snipped 18">
               <a:extLst>
                 <a:ext uri="{FF2B5EF4-FFF2-40B4-BE49-F238E27FC236}">
-                  <a16:creationId xmlns="" xmlns:a16="http://schemas.microsoft.com/office/drawing/2014/main" id="{5D638788-DD47-45E7-939A-FA108A818173}"/>
+                  <a16:creationId xmlns:a16="http://schemas.microsoft.com/office/drawing/2014/main" xmlns="" id="{5D638788-DD47-45E7-939A-FA108A818173}"/>
                 </a:ext>
               </a:extLst>
             </p:cNvPr>
@@ -8306,7 +8307,7 @@
             <p:cNvPr id="3" name="Rectangle: Single Corner Snipped 2">
               <a:extLst>
                 <a:ext uri="{FF2B5EF4-FFF2-40B4-BE49-F238E27FC236}">
-                  <a16:creationId xmlns="" xmlns:a16="http://schemas.microsoft.com/office/drawing/2014/main" id="{74BDECEF-EEFE-4332-B3B2-BDE4F82C10FC}"/>
+                  <a16:creationId xmlns:a16="http://schemas.microsoft.com/office/drawing/2014/main" xmlns="" id="{74BDECEF-EEFE-4332-B3B2-BDE4F82C10FC}"/>
                 </a:ext>
               </a:extLst>
             </p:cNvPr>
@@ -8363,7 +8364,7 @@
           <p:cNvPr id="26" name="Text Placeholder 22">
             <a:extLst>
               <a:ext uri="{FF2B5EF4-FFF2-40B4-BE49-F238E27FC236}">
-                <a16:creationId xmlns="" xmlns:a16="http://schemas.microsoft.com/office/drawing/2014/main" id="{2A19101D-7C37-42BF-8167-5391EA65EC3A}"/>
+                <a16:creationId xmlns:a16="http://schemas.microsoft.com/office/drawing/2014/main" xmlns="" id="{2A19101D-7C37-42BF-8167-5391EA65EC3A}"/>
               </a:ext>
             </a:extLst>
           </p:cNvPr>
@@ -8473,7 +8474,7 @@
           <p:cNvPr id="35" name="Freeform: Shape 34">
             <a:extLst>
               <a:ext uri="{FF2B5EF4-FFF2-40B4-BE49-F238E27FC236}">
-                <a16:creationId xmlns="" xmlns:a16="http://schemas.microsoft.com/office/drawing/2014/main" id="{62EEBF51-DCAD-4335-85E9-52801031A1BF}"/>
+                <a16:creationId xmlns:a16="http://schemas.microsoft.com/office/drawing/2014/main" xmlns="" id="{62EEBF51-DCAD-4335-85E9-52801031A1BF}"/>
               </a:ext>
             </a:extLst>
           </p:cNvPr>
@@ -8568,7 +8569,7 @@
           <p:cNvPr id="5" name="Slide Number Placeholder 4">
             <a:extLst>
               <a:ext uri="{FF2B5EF4-FFF2-40B4-BE49-F238E27FC236}">
-                <a16:creationId xmlns="" xmlns:a16="http://schemas.microsoft.com/office/drawing/2014/main" id="{87B51822-97FF-47A7-8E4E-A0F79B4EB237}"/>
+                <a16:creationId xmlns:a16="http://schemas.microsoft.com/office/drawing/2014/main" xmlns="" id="{87B51822-97FF-47A7-8E4E-A0F79B4EB237}"/>
               </a:ext>
             </a:extLst>
           </p:cNvPr>
@@ -8612,7 +8613,7 @@
           <p:cNvPr id="13" name="Picture Placeholder 12">
             <a:extLst>
               <a:ext uri="{FF2B5EF4-FFF2-40B4-BE49-F238E27FC236}">
-                <a16:creationId xmlns="" xmlns:a16="http://schemas.microsoft.com/office/drawing/2014/main" id="{231B97CF-FD24-4932-8459-893B1AC73D33}"/>
+                <a16:creationId xmlns:a16="http://schemas.microsoft.com/office/drawing/2014/main" xmlns="" id="{231B97CF-FD24-4932-8459-893B1AC73D33}"/>
               </a:ext>
             </a:extLst>
           </p:cNvPr>
@@ -8662,11 +8663,11 @@
   <p:clrMapOvr>
     <a:masterClrMapping/>
   </p:clrMapOvr>
-  <mc:AlternateContent xmlns:mc="http://schemas.openxmlformats.org/markup-compatibility/2006">
-    <mc:Choice xmlns:p14="http://schemas.microsoft.com/office/powerpoint/2010/main" Requires="p14">
+  <mc:AlternateContent xmlns:mc="http://schemas.openxmlformats.org/markup-compatibility/2006" xmlns:p14="http://schemas.microsoft.com/office/powerpoint/2010/main">
+    <mc:Choice Requires="p14">
       <p:transition p14:dur="0"/>
     </mc:Choice>
-    <mc:Fallback>
+    <mc:Fallback xmlns="">
       <p:transition/>
     </mc:Fallback>
   </mc:AlternateContent>
@@ -8703,7 +8704,7 @@
           <p:cNvPr id="11" name="Rectangle 10">
             <a:extLst>
               <a:ext uri="{FF2B5EF4-FFF2-40B4-BE49-F238E27FC236}">
-                <a16:creationId xmlns="" xmlns:a16="http://schemas.microsoft.com/office/drawing/2014/main" id="{EB3E033F-4449-40FA-BC85-BD2712D313DD}"/>
+                <a16:creationId xmlns:a16="http://schemas.microsoft.com/office/drawing/2014/main" xmlns="" id="{EB3E033F-4449-40FA-BC85-BD2712D313DD}"/>
               </a:ext>
             </a:extLst>
           </p:cNvPr>
@@ -8757,7 +8758,7 @@
           <p:cNvPr id="10" name="Freeform: Shape 9">
             <a:extLst>
               <a:ext uri="{FF2B5EF4-FFF2-40B4-BE49-F238E27FC236}">
-                <a16:creationId xmlns="" xmlns:a16="http://schemas.microsoft.com/office/drawing/2014/main" id="{63D26743-0505-444C-80B3-E88EE87DF72B}"/>
+                <a16:creationId xmlns:a16="http://schemas.microsoft.com/office/drawing/2014/main" xmlns="" id="{63D26743-0505-444C-80B3-E88EE87DF72B}"/>
               </a:ext>
             </a:extLst>
           </p:cNvPr>
@@ -8880,7 +8881,7 @@
           <p:cNvPr id="18" name="Freeform: Shape 17">
             <a:extLst>
               <a:ext uri="{FF2B5EF4-FFF2-40B4-BE49-F238E27FC236}">
-                <a16:creationId xmlns="" xmlns:a16="http://schemas.microsoft.com/office/drawing/2014/main" id="{E37145E9-AC61-47D5-9288-8789940F81B6}"/>
+                <a16:creationId xmlns:a16="http://schemas.microsoft.com/office/drawing/2014/main" xmlns="" id="{E37145E9-AC61-47D5-9288-8789940F81B6}"/>
               </a:ext>
             </a:extLst>
           </p:cNvPr>
@@ -9032,7 +9033,7 @@
           <p:cNvPr id="12" name="Freeform: Shape 11">
             <a:extLst>
               <a:ext uri="{FF2B5EF4-FFF2-40B4-BE49-F238E27FC236}">
-                <a16:creationId xmlns="" xmlns:a16="http://schemas.microsoft.com/office/drawing/2014/main" id="{A5E2B3ED-9A49-40A7-B8A3-62595FE513F9}"/>
+                <a16:creationId xmlns:a16="http://schemas.microsoft.com/office/drawing/2014/main" xmlns="" id="{A5E2B3ED-9A49-40A7-B8A3-62595FE513F9}"/>
               </a:ext>
             </a:extLst>
           </p:cNvPr>
@@ -9182,7 +9183,7 @@
           <p:cNvPr id="8" name="Freeform: Shape 7">
             <a:extLst>
               <a:ext uri="{FF2B5EF4-FFF2-40B4-BE49-F238E27FC236}">
-                <a16:creationId xmlns="" xmlns:a16="http://schemas.microsoft.com/office/drawing/2014/main" id="{1599AF7E-3E34-4597-AA72-9373A7FDB020}"/>
+                <a16:creationId xmlns:a16="http://schemas.microsoft.com/office/drawing/2014/main" xmlns="" id="{1599AF7E-3E34-4597-AA72-9373A7FDB020}"/>
               </a:ext>
             </a:extLst>
           </p:cNvPr>
@@ -9328,7 +9329,7 @@
           <p:cNvPr id="2" name="Title 1">
             <a:extLst>
               <a:ext uri="{FF2B5EF4-FFF2-40B4-BE49-F238E27FC236}">
-                <a16:creationId xmlns="" xmlns:a16="http://schemas.microsoft.com/office/drawing/2014/main" id="{4A2DF563-7FAC-46B3-B24C-7E45CD89DA2B}"/>
+                <a16:creationId xmlns:a16="http://schemas.microsoft.com/office/drawing/2014/main" xmlns="" id="{4A2DF563-7FAC-46B3-B24C-7E45CD89DA2B}"/>
               </a:ext>
             </a:extLst>
           </p:cNvPr>
@@ -9374,7 +9375,7 @@
           <p:cNvPr id="15" name="Group 14">
             <a:extLst>
               <a:ext uri="{FF2B5EF4-FFF2-40B4-BE49-F238E27FC236}">
-                <a16:creationId xmlns="" xmlns:a16="http://schemas.microsoft.com/office/drawing/2014/main" id="{7732E1E7-45E3-4264-8F26-66758696DD1E}"/>
+                <a16:creationId xmlns:a16="http://schemas.microsoft.com/office/drawing/2014/main" xmlns="" id="{7732E1E7-45E3-4264-8F26-66758696DD1E}"/>
               </a:ext>
             </a:extLst>
           </p:cNvPr>
@@ -9394,7 +9395,7 @@
             <p:cNvPr id="16" name="Freeform: Shape 15">
               <a:extLst>
                 <a:ext uri="{FF2B5EF4-FFF2-40B4-BE49-F238E27FC236}">
-                  <a16:creationId xmlns="" xmlns:a16="http://schemas.microsoft.com/office/drawing/2014/main" id="{2E3DF883-8093-49FA-81E1-E5D77F086A25}"/>
+                  <a16:creationId xmlns:a16="http://schemas.microsoft.com/office/drawing/2014/main" xmlns="" id="{2E3DF883-8093-49FA-81E1-E5D77F086A25}"/>
                 </a:ext>
               </a:extLst>
             </p:cNvPr>
@@ -9484,7 +9485,7 @@
             <p:cNvPr id="17" name="Freeform: Shape 16">
               <a:extLst>
                 <a:ext uri="{FF2B5EF4-FFF2-40B4-BE49-F238E27FC236}">
-                  <a16:creationId xmlns="" xmlns:a16="http://schemas.microsoft.com/office/drawing/2014/main" id="{18944C90-37E5-4BBE-89FF-060627168050}"/>
+                  <a16:creationId xmlns:a16="http://schemas.microsoft.com/office/drawing/2014/main" xmlns="" id="{18944C90-37E5-4BBE-89FF-060627168050}"/>
                 </a:ext>
               </a:extLst>
             </p:cNvPr>
@@ -9583,7 +9584,7 @@
           <p:cNvPr id="6" name="Group 5">
             <a:extLst>
               <a:ext uri="{FF2B5EF4-FFF2-40B4-BE49-F238E27FC236}">
-                <a16:creationId xmlns="" xmlns:a16="http://schemas.microsoft.com/office/drawing/2014/main" id="{D9EBF8BB-A805-4DDB-B459-082F99815B95}"/>
+                <a16:creationId xmlns:a16="http://schemas.microsoft.com/office/drawing/2014/main" xmlns="" id="{D9EBF8BB-A805-4DDB-B459-082F99815B95}"/>
               </a:ext>
             </a:extLst>
           </p:cNvPr>
@@ -9603,7 +9604,7 @@
             <p:cNvPr id="19" name="Rectangle: Single Corner Snipped 18">
               <a:extLst>
                 <a:ext uri="{FF2B5EF4-FFF2-40B4-BE49-F238E27FC236}">
-                  <a16:creationId xmlns="" xmlns:a16="http://schemas.microsoft.com/office/drawing/2014/main" id="{5D638788-DD47-45E7-939A-FA108A818173}"/>
+                  <a16:creationId xmlns:a16="http://schemas.microsoft.com/office/drawing/2014/main" xmlns="" id="{5D638788-DD47-45E7-939A-FA108A818173}"/>
                 </a:ext>
               </a:extLst>
             </p:cNvPr>
@@ -9664,7 +9665,7 @@
             <p:cNvPr id="3" name="Rectangle: Single Corner Snipped 2">
               <a:extLst>
                 <a:ext uri="{FF2B5EF4-FFF2-40B4-BE49-F238E27FC236}">
-                  <a16:creationId xmlns="" xmlns:a16="http://schemas.microsoft.com/office/drawing/2014/main" id="{74BDECEF-EEFE-4332-B3B2-BDE4F82C10FC}"/>
+                  <a16:creationId xmlns:a16="http://schemas.microsoft.com/office/drawing/2014/main" xmlns="" id="{74BDECEF-EEFE-4332-B3B2-BDE4F82C10FC}"/>
                 </a:ext>
               </a:extLst>
             </p:cNvPr>
@@ -9721,7 +9722,7 @@
           <p:cNvPr id="35" name="Freeform: Shape 34">
             <a:extLst>
               <a:ext uri="{FF2B5EF4-FFF2-40B4-BE49-F238E27FC236}">
-                <a16:creationId xmlns="" xmlns:a16="http://schemas.microsoft.com/office/drawing/2014/main" id="{62EEBF51-DCAD-4335-85E9-52801031A1BF}"/>
+                <a16:creationId xmlns:a16="http://schemas.microsoft.com/office/drawing/2014/main" xmlns="" id="{62EEBF51-DCAD-4335-85E9-52801031A1BF}"/>
               </a:ext>
             </a:extLst>
           </p:cNvPr>
@@ -9816,7 +9817,7 @@
           <p:cNvPr id="5" name="Slide Number Placeholder 4">
             <a:extLst>
               <a:ext uri="{FF2B5EF4-FFF2-40B4-BE49-F238E27FC236}">
-                <a16:creationId xmlns="" xmlns:a16="http://schemas.microsoft.com/office/drawing/2014/main" id="{87B51822-97FF-47A7-8E4E-A0F79B4EB237}"/>
+                <a16:creationId xmlns:a16="http://schemas.microsoft.com/office/drawing/2014/main" xmlns="" id="{87B51822-97FF-47A7-8E4E-A0F79B4EB237}"/>
               </a:ext>
             </a:extLst>
           </p:cNvPr>
@@ -9860,7 +9861,7 @@
           <p:cNvPr id="20" name="Picture Placeholder 2">
             <a:extLst>
               <a:ext uri="{FF2B5EF4-FFF2-40B4-BE49-F238E27FC236}">
-                <a16:creationId xmlns="" xmlns:a16="http://schemas.microsoft.com/office/drawing/2014/main" id="{30B3A574-7940-4E35-857E-5CA35A5910E5}"/>
+                <a16:creationId xmlns:a16="http://schemas.microsoft.com/office/drawing/2014/main" xmlns="" id="{30B3A574-7940-4E35-857E-5CA35A5910E5}"/>
               </a:ext>
             </a:extLst>
           </p:cNvPr>
@@ -9937,7 +9938,7 @@
           <p:cNvPr id="21" name="Text Placeholder 3">
             <a:extLst>
               <a:ext uri="{FF2B5EF4-FFF2-40B4-BE49-F238E27FC236}">
-                <a16:creationId xmlns="" xmlns:a16="http://schemas.microsoft.com/office/drawing/2014/main" id="{912B51EA-3E6F-4BF6-BE48-62128AF32B85}"/>
+                <a16:creationId xmlns:a16="http://schemas.microsoft.com/office/drawing/2014/main" xmlns="" id="{912B51EA-3E6F-4BF6-BE48-62128AF32B85}"/>
               </a:ext>
             </a:extLst>
           </p:cNvPr>
@@ -10018,11 +10019,11 @@
   <p:clrMapOvr>
     <a:masterClrMapping/>
   </p:clrMapOvr>
-  <mc:AlternateContent xmlns:mc="http://schemas.openxmlformats.org/markup-compatibility/2006">
-    <mc:Choice xmlns:p14="http://schemas.microsoft.com/office/powerpoint/2010/main" Requires="p14">
+  <mc:AlternateContent xmlns:mc="http://schemas.openxmlformats.org/markup-compatibility/2006" xmlns:p14="http://schemas.microsoft.com/office/powerpoint/2010/main">
+    <mc:Choice Requires="p14">
       <p:transition p14:dur="0"/>
     </mc:Choice>
-    <mc:Fallback>
+    <mc:Fallback xmlns="">
       <p:transition/>
     </mc:Fallback>
   </mc:AlternateContent>
@@ -10059,7 +10060,7 @@
           <p:cNvPr id="11" name="Rectangle 10">
             <a:extLst>
               <a:ext uri="{FF2B5EF4-FFF2-40B4-BE49-F238E27FC236}">
-                <a16:creationId xmlns="" xmlns:a16="http://schemas.microsoft.com/office/drawing/2014/main" id="{EB3E033F-4449-40FA-BC85-BD2712D313DD}"/>
+                <a16:creationId xmlns:a16="http://schemas.microsoft.com/office/drawing/2014/main" xmlns="" id="{EB3E033F-4449-40FA-BC85-BD2712D313DD}"/>
               </a:ext>
             </a:extLst>
           </p:cNvPr>
@@ -10113,7 +10114,7 @@
           <p:cNvPr id="10" name="Freeform: Shape 9">
             <a:extLst>
               <a:ext uri="{FF2B5EF4-FFF2-40B4-BE49-F238E27FC236}">
-                <a16:creationId xmlns="" xmlns:a16="http://schemas.microsoft.com/office/drawing/2014/main" id="{63D26743-0505-444C-80B3-E88EE87DF72B}"/>
+                <a16:creationId xmlns:a16="http://schemas.microsoft.com/office/drawing/2014/main" xmlns="" id="{63D26743-0505-444C-80B3-E88EE87DF72B}"/>
               </a:ext>
             </a:extLst>
           </p:cNvPr>
@@ -10236,7 +10237,7 @@
           <p:cNvPr id="18" name="Freeform: Shape 17">
             <a:extLst>
               <a:ext uri="{FF2B5EF4-FFF2-40B4-BE49-F238E27FC236}">
-                <a16:creationId xmlns="" xmlns:a16="http://schemas.microsoft.com/office/drawing/2014/main" id="{E37145E9-AC61-47D5-9288-8789940F81B6}"/>
+                <a16:creationId xmlns:a16="http://schemas.microsoft.com/office/drawing/2014/main" xmlns="" id="{E37145E9-AC61-47D5-9288-8789940F81B6}"/>
               </a:ext>
             </a:extLst>
           </p:cNvPr>
@@ -10388,7 +10389,7 @@
           <p:cNvPr id="12" name="Freeform: Shape 11">
             <a:extLst>
               <a:ext uri="{FF2B5EF4-FFF2-40B4-BE49-F238E27FC236}">
-                <a16:creationId xmlns="" xmlns:a16="http://schemas.microsoft.com/office/drawing/2014/main" id="{A5E2B3ED-9A49-40A7-B8A3-62595FE513F9}"/>
+                <a16:creationId xmlns:a16="http://schemas.microsoft.com/office/drawing/2014/main" xmlns="" id="{A5E2B3ED-9A49-40A7-B8A3-62595FE513F9}"/>
               </a:ext>
             </a:extLst>
           </p:cNvPr>
@@ -10538,7 +10539,7 @@
           <p:cNvPr id="8" name="Freeform: Shape 7">
             <a:extLst>
               <a:ext uri="{FF2B5EF4-FFF2-40B4-BE49-F238E27FC236}">
-                <a16:creationId xmlns="" xmlns:a16="http://schemas.microsoft.com/office/drawing/2014/main" id="{1599AF7E-3E34-4597-AA72-9373A7FDB020}"/>
+                <a16:creationId xmlns:a16="http://schemas.microsoft.com/office/drawing/2014/main" xmlns="" id="{1599AF7E-3E34-4597-AA72-9373A7FDB020}"/>
               </a:ext>
             </a:extLst>
           </p:cNvPr>
@@ -10684,7 +10685,7 @@
           <p:cNvPr id="2" name="Title 1">
             <a:extLst>
               <a:ext uri="{FF2B5EF4-FFF2-40B4-BE49-F238E27FC236}">
-                <a16:creationId xmlns="" xmlns:a16="http://schemas.microsoft.com/office/drawing/2014/main" id="{4A2DF563-7FAC-46B3-B24C-7E45CD89DA2B}"/>
+                <a16:creationId xmlns:a16="http://schemas.microsoft.com/office/drawing/2014/main" xmlns="" id="{4A2DF563-7FAC-46B3-B24C-7E45CD89DA2B}"/>
               </a:ext>
             </a:extLst>
           </p:cNvPr>
@@ -10730,7 +10731,7 @@
           <p:cNvPr id="15" name="Group 14">
             <a:extLst>
               <a:ext uri="{FF2B5EF4-FFF2-40B4-BE49-F238E27FC236}">
-                <a16:creationId xmlns="" xmlns:a16="http://schemas.microsoft.com/office/drawing/2014/main" id="{7732E1E7-45E3-4264-8F26-66758696DD1E}"/>
+                <a16:creationId xmlns:a16="http://schemas.microsoft.com/office/drawing/2014/main" xmlns="" id="{7732E1E7-45E3-4264-8F26-66758696DD1E}"/>
               </a:ext>
             </a:extLst>
           </p:cNvPr>
@@ -10750,7 +10751,7 @@
             <p:cNvPr id="16" name="Freeform: Shape 15">
               <a:extLst>
                 <a:ext uri="{FF2B5EF4-FFF2-40B4-BE49-F238E27FC236}">
-                  <a16:creationId xmlns="" xmlns:a16="http://schemas.microsoft.com/office/drawing/2014/main" id="{2E3DF883-8093-49FA-81E1-E5D77F086A25}"/>
+                  <a16:creationId xmlns:a16="http://schemas.microsoft.com/office/drawing/2014/main" xmlns="" id="{2E3DF883-8093-49FA-81E1-E5D77F086A25}"/>
                 </a:ext>
               </a:extLst>
             </p:cNvPr>
@@ -10840,7 +10841,7 @@
             <p:cNvPr id="17" name="Freeform: Shape 16">
               <a:extLst>
                 <a:ext uri="{FF2B5EF4-FFF2-40B4-BE49-F238E27FC236}">
-                  <a16:creationId xmlns="" xmlns:a16="http://schemas.microsoft.com/office/drawing/2014/main" id="{18944C90-37E5-4BBE-89FF-060627168050}"/>
+                  <a16:creationId xmlns:a16="http://schemas.microsoft.com/office/drawing/2014/main" xmlns="" id="{18944C90-37E5-4BBE-89FF-060627168050}"/>
                 </a:ext>
               </a:extLst>
             </p:cNvPr>
@@ -10939,7 +10940,7 @@
           <p:cNvPr id="6" name="Group 5">
             <a:extLst>
               <a:ext uri="{FF2B5EF4-FFF2-40B4-BE49-F238E27FC236}">
-                <a16:creationId xmlns="" xmlns:a16="http://schemas.microsoft.com/office/drawing/2014/main" id="{D9EBF8BB-A805-4DDB-B459-082F99815B95}"/>
+                <a16:creationId xmlns:a16="http://schemas.microsoft.com/office/drawing/2014/main" xmlns="" id="{D9EBF8BB-A805-4DDB-B459-082F99815B95}"/>
               </a:ext>
             </a:extLst>
           </p:cNvPr>
@@ -10959,7 +10960,7 @@
             <p:cNvPr id="19" name="Rectangle: Single Corner Snipped 18">
               <a:extLst>
                 <a:ext uri="{FF2B5EF4-FFF2-40B4-BE49-F238E27FC236}">
-                  <a16:creationId xmlns="" xmlns:a16="http://schemas.microsoft.com/office/drawing/2014/main" id="{5D638788-DD47-45E7-939A-FA108A818173}"/>
+                  <a16:creationId xmlns:a16="http://schemas.microsoft.com/office/drawing/2014/main" xmlns="" id="{5D638788-DD47-45E7-939A-FA108A818173}"/>
                 </a:ext>
               </a:extLst>
             </p:cNvPr>
@@ -11020,7 +11021,7 @@
             <p:cNvPr id="3" name="Rectangle: Single Corner Snipped 2">
               <a:extLst>
                 <a:ext uri="{FF2B5EF4-FFF2-40B4-BE49-F238E27FC236}">
-                  <a16:creationId xmlns="" xmlns:a16="http://schemas.microsoft.com/office/drawing/2014/main" id="{74BDECEF-EEFE-4332-B3B2-BDE4F82C10FC}"/>
+                  <a16:creationId xmlns:a16="http://schemas.microsoft.com/office/drawing/2014/main" xmlns="" id="{74BDECEF-EEFE-4332-B3B2-BDE4F82C10FC}"/>
                 </a:ext>
               </a:extLst>
             </p:cNvPr>
@@ -11077,7 +11078,7 @@
           <p:cNvPr id="35" name="Freeform: Shape 34">
             <a:extLst>
               <a:ext uri="{FF2B5EF4-FFF2-40B4-BE49-F238E27FC236}">
-                <a16:creationId xmlns="" xmlns:a16="http://schemas.microsoft.com/office/drawing/2014/main" id="{62EEBF51-DCAD-4335-85E9-52801031A1BF}"/>
+                <a16:creationId xmlns:a16="http://schemas.microsoft.com/office/drawing/2014/main" xmlns="" id="{62EEBF51-DCAD-4335-85E9-52801031A1BF}"/>
               </a:ext>
             </a:extLst>
           </p:cNvPr>
@@ -11172,7 +11173,7 @@
           <p:cNvPr id="5" name="Slide Number Placeholder 4">
             <a:extLst>
               <a:ext uri="{FF2B5EF4-FFF2-40B4-BE49-F238E27FC236}">
-                <a16:creationId xmlns="" xmlns:a16="http://schemas.microsoft.com/office/drawing/2014/main" id="{87B51822-97FF-47A7-8E4E-A0F79B4EB237}"/>
+                <a16:creationId xmlns:a16="http://schemas.microsoft.com/office/drawing/2014/main" xmlns="" id="{87B51822-97FF-47A7-8E4E-A0F79B4EB237}"/>
               </a:ext>
             </a:extLst>
           </p:cNvPr>
@@ -11216,7 +11217,7 @@
           <p:cNvPr id="21" name="Text Placeholder 3">
             <a:extLst>
               <a:ext uri="{FF2B5EF4-FFF2-40B4-BE49-F238E27FC236}">
-                <a16:creationId xmlns="" xmlns:a16="http://schemas.microsoft.com/office/drawing/2014/main" id="{912B51EA-3E6F-4BF6-BE48-62128AF32B85}"/>
+                <a16:creationId xmlns:a16="http://schemas.microsoft.com/office/drawing/2014/main" xmlns="" id="{912B51EA-3E6F-4BF6-BE48-62128AF32B85}"/>
               </a:ext>
             </a:extLst>
           </p:cNvPr>
@@ -11292,7 +11293,7 @@
           <p:cNvPr id="22" name="Content Placeholder 2">
             <a:extLst>
               <a:ext uri="{FF2B5EF4-FFF2-40B4-BE49-F238E27FC236}">
-                <a16:creationId xmlns="" xmlns:a16="http://schemas.microsoft.com/office/drawing/2014/main" id="{A015C605-1D30-48BC-A0D6-3B11AF56CC53}"/>
+                <a16:creationId xmlns:a16="http://schemas.microsoft.com/office/drawing/2014/main" xmlns="" id="{A015C605-1D30-48BC-A0D6-3B11AF56CC53}"/>
               </a:ext>
             </a:extLst>
           </p:cNvPr>
@@ -11410,11 +11411,11 @@
   <p:clrMapOvr>
     <a:masterClrMapping/>
   </p:clrMapOvr>
-  <mc:AlternateContent xmlns:mc="http://schemas.openxmlformats.org/markup-compatibility/2006">
-    <mc:Choice xmlns:p14="http://schemas.microsoft.com/office/powerpoint/2010/main" Requires="p14">
+  <mc:AlternateContent xmlns:mc="http://schemas.openxmlformats.org/markup-compatibility/2006" xmlns:p14="http://schemas.microsoft.com/office/powerpoint/2010/main">
+    <mc:Choice Requires="p14">
       <p:transition p14:dur="0"/>
     </mc:Choice>
-    <mc:Fallback>
+    <mc:Fallback xmlns="">
       <p:transition/>
     </mc:Fallback>
   </mc:AlternateContent>
@@ -11443,7 +11444,7 @@
           <p:cNvPr id="18" name="Rectangle 17">
             <a:extLst>
               <a:ext uri="{FF2B5EF4-FFF2-40B4-BE49-F238E27FC236}">
-                <a16:creationId xmlns="" xmlns:a16="http://schemas.microsoft.com/office/drawing/2014/main" id="{D4494CD2-CCDD-0248-96F8-741002C44255}"/>
+                <a16:creationId xmlns:a16="http://schemas.microsoft.com/office/drawing/2014/main" xmlns="" id="{D4494CD2-CCDD-0248-96F8-741002C44255}"/>
               </a:ext>
             </a:extLst>
           </p:cNvPr>
@@ -11497,7 +11498,7 @@
           <p:cNvPr id="19" name="Freeform: Shape 9">
             <a:extLst>
               <a:ext uri="{FF2B5EF4-FFF2-40B4-BE49-F238E27FC236}">
-                <a16:creationId xmlns="" xmlns:a16="http://schemas.microsoft.com/office/drawing/2014/main" id="{07077B00-C1EE-7241-B441-7814F92A7EDF}"/>
+                <a16:creationId xmlns:a16="http://schemas.microsoft.com/office/drawing/2014/main" xmlns="" id="{07077B00-C1EE-7241-B441-7814F92A7EDF}"/>
               </a:ext>
             </a:extLst>
           </p:cNvPr>
@@ -11620,7 +11621,7 @@
           <p:cNvPr id="20" name="Freeform: Shape 17">
             <a:extLst>
               <a:ext uri="{FF2B5EF4-FFF2-40B4-BE49-F238E27FC236}">
-                <a16:creationId xmlns="" xmlns:a16="http://schemas.microsoft.com/office/drawing/2014/main" id="{3A1AEBC4-637E-F64C-9192-69AC4BB26D0C}"/>
+                <a16:creationId xmlns:a16="http://schemas.microsoft.com/office/drawing/2014/main" xmlns="" id="{3A1AEBC4-637E-F64C-9192-69AC4BB26D0C}"/>
               </a:ext>
             </a:extLst>
           </p:cNvPr>
@@ -11772,7 +11773,7 @@
           <p:cNvPr id="21" name="Freeform: Shape 11">
             <a:extLst>
               <a:ext uri="{FF2B5EF4-FFF2-40B4-BE49-F238E27FC236}">
-                <a16:creationId xmlns="" xmlns:a16="http://schemas.microsoft.com/office/drawing/2014/main" id="{669A7039-C54C-8E46-9A8B-DDB2547D989C}"/>
+                <a16:creationId xmlns:a16="http://schemas.microsoft.com/office/drawing/2014/main" xmlns="" id="{669A7039-C54C-8E46-9A8B-DDB2547D989C}"/>
               </a:ext>
             </a:extLst>
           </p:cNvPr>
@@ -11922,7 +11923,7 @@
           <p:cNvPr id="22" name="Freeform: Shape 7">
             <a:extLst>
               <a:ext uri="{FF2B5EF4-FFF2-40B4-BE49-F238E27FC236}">
-                <a16:creationId xmlns="" xmlns:a16="http://schemas.microsoft.com/office/drawing/2014/main" id="{4F173B32-87BB-9A40-8C91-4C1EED2B7ABF}"/>
+                <a16:creationId xmlns:a16="http://schemas.microsoft.com/office/drawing/2014/main" xmlns="" id="{4F173B32-87BB-9A40-8C91-4C1EED2B7ABF}"/>
               </a:ext>
             </a:extLst>
           </p:cNvPr>
@@ -12068,7 +12069,7 @@
           <p:cNvPr id="24" name="Group 23">
             <a:extLst>
               <a:ext uri="{FF2B5EF4-FFF2-40B4-BE49-F238E27FC236}">
-                <a16:creationId xmlns="" xmlns:a16="http://schemas.microsoft.com/office/drawing/2014/main" id="{4AC87F4E-12B5-1B42-AFD2-4DB39B7645C9}"/>
+                <a16:creationId xmlns:a16="http://schemas.microsoft.com/office/drawing/2014/main" xmlns="" id="{4AC87F4E-12B5-1B42-AFD2-4DB39B7645C9}"/>
               </a:ext>
             </a:extLst>
           </p:cNvPr>
@@ -12088,7 +12089,7 @@
             <p:cNvPr id="25" name="Freeform: Shape 15">
               <a:extLst>
                 <a:ext uri="{FF2B5EF4-FFF2-40B4-BE49-F238E27FC236}">
-                  <a16:creationId xmlns="" xmlns:a16="http://schemas.microsoft.com/office/drawing/2014/main" id="{03DD8765-59DF-A045-ADB5-E39FAEE153A0}"/>
+                  <a16:creationId xmlns:a16="http://schemas.microsoft.com/office/drawing/2014/main" xmlns="" id="{03DD8765-59DF-A045-ADB5-E39FAEE153A0}"/>
                 </a:ext>
               </a:extLst>
             </p:cNvPr>
@@ -12178,7 +12179,7 @@
             <p:cNvPr id="26" name="Freeform: Shape 16">
               <a:extLst>
                 <a:ext uri="{FF2B5EF4-FFF2-40B4-BE49-F238E27FC236}">
-                  <a16:creationId xmlns="" xmlns:a16="http://schemas.microsoft.com/office/drawing/2014/main" id="{B34B796C-A407-7B4D-B4F0-E58A44FE8DB4}"/>
+                  <a16:creationId xmlns:a16="http://schemas.microsoft.com/office/drawing/2014/main" xmlns="" id="{B34B796C-A407-7B4D-B4F0-E58A44FE8DB4}"/>
                 </a:ext>
               </a:extLst>
             </p:cNvPr>
@@ -12277,7 +12278,7 @@
           <p:cNvPr id="30" name="Freeform: Shape 23">
             <a:extLst>
               <a:ext uri="{FF2B5EF4-FFF2-40B4-BE49-F238E27FC236}">
-                <a16:creationId xmlns="" xmlns:a16="http://schemas.microsoft.com/office/drawing/2014/main" id="{CBE3FDC9-67CB-FA42-B127-A36BFF4678BB}"/>
+                <a16:creationId xmlns:a16="http://schemas.microsoft.com/office/drawing/2014/main" xmlns="" id="{CBE3FDC9-67CB-FA42-B127-A36BFF4678BB}"/>
               </a:ext>
             </a:extLst>
           </p:cNvPr>
@@ -12372,7 +12373,7 @@
           <p:cNvPr id="31" name="Slide Number Placeholder 4">
             <a:extLst>
               <a:ext uri="{FF2B5EF4-FFF2-40B4-BE49-F238E27FC236}">
-                <a16:creationId xmlns="" xmlns:a16="http://schemas.microsoft.com/office/drawing/2014/main" id="{1E902BFF-CA8F-D745-A819-A7BB38B30ED9}"/>
+                <a16:creationId xmlns:a16="http://schemas.microsoft.com/office/drawing/2014/main" xmlns="" id="{1E902BFF-CA8F-D745-A819-A7BB38B30ED9}"/>
               </a:ext>
             </a:extLst>
           </p:cNvPr>
@@ -12421,11 +12422,11 @@
   <p:clrMapOvr>
     <a:masterClrMapping/>
   </p:clrMapOvr>
-  <mc:AlternateContent xmlns:mc="http://schemas.openxmlformats.org/markup-compatibility/2006">
-    <mc:Choice xmlns:p14="http://schemas.microsoft.com/office/powerpoint/2010/main" Requires="p14">
+  <mc:AlternateContent xmlns:mc="http://schemas.openxmlformats.org/markup-compatibility/2006" xmlns:p14="http://schemas.microsoft.com/office/powerpoint/2010/main">
+    <mc:Choice Requires="p14">
       <p:transition p14:dur="0"/>
     </mc:Choice>
-    <mc:Fallback>
+    <mc:Fallback xmlns="">
       <p:transition/>
     </mc:Fallback>
   </mc:AlternateContent>
@@ -12454,7 +12455,7 @@
           <p:cNvPr id="21" name="Rectangle 20">
             <a:extLst>
               <a:ext uri="{FF2B5EF4-FFF2-40B4-BE49-F238E27FC236}">
-                <a16:creationId xmlns="" xmlns:a16="http://schemas.microsoft.com/office/drawing/2014/main" id="{6E739168-A5E8-443A-B392-7AD4CF8977AD}"/>
+                <a16:creationId xmlns:a16="http://schemas.microsoft.com/office/drawing/2014/main" xmlns="" id="{6E739168-A5E8-443A-B392-7AD4CF8977AD}"/>
               </a:ext>
             </a:extLst>
           </p:cNvPr>
@@ -12506,7 +12507,7 @@
           <p:cNvPr id="15" name="Freeform: Shape 14">
             <a:extLst>
               <a:ext uri="{FF2B5EF4-FFF2-40B4-BE49-F238E27FC236}">
-                <a16:creationId xmlns="" xmlns:a16="http://schemas.microsoft.com/office/drawing/2014/main" id="{41E10E1E-5268-4F03-BA64-07E19DE26739}"/>
+                <a16:creationId xmlns:a16="http://schemas.microsoft.com/office/drawing/2014/main" xmlns="" id="{41E10E1E-5268-4F03-BA64-07E19DE26739}"/>
               </a:ext>
             </a:extLst>
           </p:cNvPr>
@@ -12643,7 +12644,7 @@
           <p:cNvPr id="16" name="Freeform: Shape 15">
             <a:extLst>
               <a:ext uri="{FF2B5EF4-FFF2-40B4-BE49-F238E27FC236}">
-                <a16:creationId xmlns="" xmlns:a16="http://schemas.microsoft.com/office/drawing/2014/main" id="{B989C45D-BDFF-418F-BE79-03FF70015770}"/>
+                <a16:creationId xmlns:a16="http://schemas.microsoft.com/office/drawing/2014/main" xmlns="" id="{B989C45D-BDFF-418F-BE79-03FF70015770}"/>
               </a:ext>
             </a:extLst>
           </p:cNvPr>
@@ -12807,7 +12808,7 @@
           <p:cNvPr id="20" name="Freeform: Shape 19">
             <a:extLst>
               <a:ext uri="{FF2B5EF4-FFF2-40B4-BE49-F238E27FC236}">
-                <a16:creationId xmlns="" xmlns:a16="http://schemas.microsoft.com/office/drawing/2014/main" id="{0027A677-9ACB-4264-B148-4806678FB83F}"/>
+                <a16:creationId xmlns:a16="http://schemas.microsoft.com/office/drawing/2014/main" xmlns="" id="{0027A677-9ACB-4264-B148-4806678FB83F}"/>
               </a:ext>
             </a:extLst>
           </p:cNvPr>
@@ -12969,7 +12970,7 @@
           <p:cNvPr id="6" name="Group 5">
             <a:extLst>
               <a:ext uri="{FF2B5EF4-FFF2-40B4-BE49-F238E27FC236}">
-                <a16:creationId xmlns="" xmlns:a16="http://schemas.microsoft.com/office/drawing/2014/main" id="{EA7FF9D7-8545-4547-AC77-A0421EEB9B99}"/>
+                <a16:creationId xmlns:a16="http://schemas.microsoft.com/office/drawing/2014/main" xmlns="" id="{EA7FF9D7-8545-4547-AC77-A0421EEB9B99}"/>
               </a:ext>
             </a:extLst>
           </p:cNvPr>
@@ -12989,7 +12990,7 @@
             <p:cNvPr id="17" name="Right Triangle 16">
               <a:extLst>
                 <a:ext uri="{FF2B5EF4-FFF2-40B4-BE49-F238E27FC236}">
-                  <a16:creationId xmlns="" xmlns:a16="http://schemas.microsoft.com/office/drawing/2014/main" id="{8DCD5806-2A2F-4ABF-8057-245681C498E6}"/>
+                  <a16:creationId xmlns:a16="http://schemas.microsoft.com/office/drawing/2014/main" xmlns="" id="{8DCD5806-2A2F-4ABF-8057-245681C498E6}"/>
                 </a:ext>
               </a:extLst>
             </p:cNvPr>
@@ -13043,7 +13044,7 @@
             <p:cNvPr id="18" name="Right Triangle 17">
               <a:extLst>
                 <a:ext uri="{FF2B5EF4-FFF2-40B4-BE49-F238E27FC236}">
-                  <a16:creationId xmlns="" xmlns:a16="http://schemas.microsoft.com/office/drawing/2014/main" id="{3A93038F-E9E4-4FFD-B3DF-28DB7C2C1490}"/>
+                  <a16:creationId xmlns:a16="http://schemas.microsoft.com/office/drawing/2014/main" xmlns="" id="{3A93038F-E9E4-4FFD-B3DF-28DB7C2C1490}"/>
                 </a:ext>
               </a:extLst>
             </p:cNvPr>
@@ -13100,7 +13101,7 @@
             <p:cNvPr id="19" name="Right Triangle 18">
               <a:extLst>
                 <a:ext uri="{FF2B5EF4-FFF2-40B4-BE49-F238E27FC236}">
-                  <a16:creationId xmlns="" xmlns:a16="http://schemas.microsoft.com/office/drawing/2014/main" id="{5DEA1E02-BBD0-4AE3-AF22-433B90272178}"/>
+                  <a16:creationId xmlns:a16="http://schemas.microsoft.com/office/drawing/2014/main" xmlns="" id="{5DEA1E02-BBD0-4AE3-AF22-433B90272178}"/>
                 </a:ext>
               </a:extLst>
             </p:cNvPr>
@@ -13155,7 +13156,7 @@
           <p:cNvPr id="2" name="Title 1">
             <a:extLst>
               <a:ext uri="{FF2B5EF4-FFF2-40B4-BE49-F238E27FC236}">
-                <a16:creationId xmlns="" xmlns:a16="http://schemas.microsoft.com/office/drawing/2014/main" id="{9E597736-C478-4C26-9BAF-205FE31E977C}"/>
+                <a16:creationId xmlns:a16="http://schemas.microsoft.com/office/drawing/2014/main" xmlns="" id="{9E597736-C478-4C26-9BAF-205FE31E977C}"/>
               </a:ext>
             </a:extLst>
           </p:cNvPr>
@@ -13207,11 +13208,11 @@
   <p:clrMapOvr>
     <a:masterClrMapping/>
   </p:clrMapOvr>
-  <mc:AlternateContent xmlns:mc="http://schemas.openxmlformats.org/markup-compatibility/2006">
-    <mc:Choice xmlns:p14="http://schemas.microsoft.com/office/powerpoint/2010/main" Requires="p14">
+  <mc:AlternateContent xmlns:mc="http://schemas.openxmlformats.org/markup-compatibility/2006" xmlns:p14="http://schemas.microsoft.com/office/powerpoint/2010/main">
+    <mc:Choice Requires="p14">
       <p:transition p14:dur="0"/>
     </mc:Choice>
-    <mc:Fallback>
+    <mc:Fallback xmlns="">
       <p:transition/>
     </mc:Fallback>
   </mc:AlternateContent>
@@ -13240,7 +13241,7 @@
           <p:cNvPr id="21" name="Rectangle 20">
             <a:extLst>
               <a:ext uri="{FF2B5EF4-FFF2-40B4-BE49-F238E27FC236}">
-                <a16:creationId xmlns="" xmlns:a16="http://schemas.microsoft.com/office/drawing/2014/main" id="{6E739168-A5E8-443A-B392-7AD4CF8977AD}"/>
+                <a16:creationId xmlns:a16="http://schemas.microsoft.com/office/drawing/2014/main" xmlns="" id="{6E739168-A5E8-443A-B392-7AD4CF8977AD}"/>
               </a:ext>
             </a:extLst>
           </p:cNvPr>
@@ -13292,7 +13293,7 @@
           <p:cNvPr id="15" name="Freeform: Shape 14">
             <a:extLst>
               <a:ext uri="{FF2B5EF4-FFF2-40B4-BE49-F238E27FC236}">
-                <a16:creationId xmlns="" xmlns:a16="http://schemas.microsoft.com/office/drawing/2014/main" id="{41E10E1E-5268-4F03-BA64-07E19DE26739}"/>
+                <a16:creationId xmlns:a16="http://schemas.microsoft.com/office/drawing/2014/main" xmlns="" id="{41E10E1E-5268-4F03-BA64-07E19DE26739}"/>
               </a:ext>
             </a:extLst>
           </p:cNvPr>
@@ -13429,7 +13430,7 @@
           <p:cNvPr id="16" name="Freeform: Shape 15">
             <a:extLst>
               <a:ext uri="{FF2B5EF4-FFF2-40B4-BE49-F238E27FC236}">
-                <a16:creationId xmlns="" xmlns:a16="http://schemas.microsoft.com/office/drawing/2014/main" id="{B989C45D-BDFF-418F-BE79-03FF70015770}"/>
+                <a16:creationId xmlns:a16="http://schemas.microsoft.com/office/drawing/2014/main" xmlns="" id="{B989C45D-BDFF-418F-BE79-03FF70015770}"/>
               </a:ext>
             </a:extLst>
           </p:cNvPr>
@@ -13593,7 +13594,7 @@
           <p:cNvPr id="20" name="Freeform: Shape 19">
             <a:extLst>
               <a:ext uri="{FF2B5EF4-FFF2-40B4-BE49-F238E27FC236}">
-                <a16:creationId xmlns="" xmlns:a16="http://schemas.microsoft.com/office/drawing/2014/main" id="{0027A677-9ACB-4264-B148-4806678FB83F}"/>
+                <a16:creationId xmlns:a16="http://schemas.microsoft.com/office/drawing/2014/main" xmlns="" id="{0027A677-9ACB-4264-B148-4806678FB83F}"/>
               </a:ext>
             </a:extLst>
           </p:cNvPr>
@@ -13755,7 +13756,7 @@
           <p:cNvPr id="2" name="Title 1">
             <a:extLst>
               <a:ext uri="{FF2B5EF4-FFF2-40B4-BE49-F238E27FC236}">
-                <a16:creationId xmlns="" xmlns:a16="http://schemas.microsoft.com/office/drawing/2014/main" id="{9E597736-C478-4C26-9BAF-205FE31E977C}"/>
+                <a16:creationId xmlns:a16="http://schemas.microsoft.com/office/drawing/2014/main" xmlns="" id="{9E597736-C478-4C26-9BAF-205FE31E977C}"/>
               </a:ext>
             </a:extLst>
           </p:cNvPr>
@@ -13802,7 +13803,7 @@
           <p:cNvPr id="35" name="Freeform: Shape 34">
             <a:extLst>
               <a:ext uri="{FF2B5EF4-FFF2-40B4-BE49-F238E27FC236}">
-                <a16:creationId xmlns="" xmlns:a16="http://schemas.microsoft.com/office/drawing/2014/main" id="{C024DCDB-C6BF-455E-AAB8-EAF9DAB302A1}"/>
+                <a16:creationId xmlns:a16="http://schemas.microsoft.com/office/drawing/2014/main" xmlns="" id="{C024DCDB-C6BF-455E-AAB8-EAF9DAB302A1}"/>
               </a:ext>
             </a:extLst>
           </p:cNvPr>
@@ -13910,7 +13911,7 @@
           <p:cNvPr id="32" name="Freeform: Shape 31">
             <a:extLst>
               <a:ext uri="{FF2B5EF4-FFF2-40B4-BE49-F238E27FC236}">
-                <a16:creationId xmlns="" xmlns:a16="http://schemas.microsoft.com/office/drawing/2014/main" id="{26AFB47A-5D51-4F9C-B01B-977CE5E3C093}"/>
+                <a16:creationId xmlns:a16="http://schemas.microsoft.com/office/drawing/2014/main" xmlns="" id="{26AFB47A-5D51-4F9C-B01B-977CE5E3C093}"/>
               </a:ext>
             </a:extLst>
           </p:cNvPr>
@@ -14026,7 +14027,7 @@
           <p:cNvPr id="30" name="Freeform: Shape 29">
             <a:extLst>
               <a:ext uri="{FF2B5EF4-FFF2-40B4-BE49-F238E27FC236}">
-                <a16:creationId xmlns="" xmlns:a16="http://schemas.microsoft.com/office/drawing/2014/main" id="{6997A4FF-7390-4173-8ACD-6CF7145AACEC}"/>
+                <a16:creationId xmlns:a16="http://schemas.microsoft.com/office/drawing/2014/main" xmlns="" id="{6997A4FF-7390-4173-8ACD-6CF7145AACEC}"/>
               </a:ext>
             </a:extLst>
           </p:cNvPr>
@@ -14140,11 +14141,11 @@
   <p:clrMapOvr>
     <a:masterClrMapping/>
   </p:clrMapOvr>
-  <mc:AlternateContent xmlns:mc="http://schemas.openxmlformats.org/markup-compatibility/2006">
-    <mc:Choice xmlns:p14="http://schemas.microsoft.com/office/powerpoint/2010/main" Requires="p14">
+  <mc:AlternateContent xmlns:mc="http://schemas.openxmlformats.org/markup-compatibility/2006" xmlns:p14="http://schemas.microsoft.com/office/powerpoint/2010/main">
+    <mc:Choice Requires="p14">
       <p:transition p14:dur="0"/>
     </mc:Choice>
-    <mc:Fallback>
+    <mc:Fallback xmlns="">
       <p:transition/>
     </mc:Fallback>
   </mc:AlternateContent>
@@ -14173,7 +14174,7 @@
           <p:cNvPr id="7" name="Rectangle 6">
             <a:extLst>
               <a:ext uri="{FF2B5EF4-FFF2-40B4-BE49-F238E27FC236}">
-                <a16:creationId xmlns="" xmlns:a16="http://schemas.microsoft.com/office/drawing/2014/main" id="{B2838D16-809E-4EB1-8C0C-0E63D8139112}"/>
+                <a16:creationId xmlns:a16="http://schemas.microsoft.com/office/drawing/2014/main" xmlns="" id="{B2838D16-809E-4EB1-8C0C-0E63D8139112}"/>
               </a:ext>
             </a:extLst>
           </p:cNvPr>
@@ -14225,7 +14226,7 @@
           <p:cNvPr id="8" name="Freeform: Shape 7">
             <a:extLst>
               <a:ext uri="{FF2B5EF4-FFF2-40B4-BE49-F238E27FC236}">
-                <a16:creationId xmlns="" xmlns:a16="http://schemas.microsoft.com/office/drawing/2014/main" id="{01FEB333-94B4-4E53-9019-D584810903BB}"/>
+                <a16:creationId xmlns:a16="http://schemas.microsoft.com/office/drawing/2014/main" xmlns="" id="{01FEB333-94B4-4E53-9019-D584810903BB}"/>
               </a:ext>
             </a:extLst>
           </p:cNvPr>
@@ -14346,7 +14347,7 @@
           <p:cNvPr id="9" name="Freeform: Shape 8">
             <a:extLst>
               <a:ext uri="{FF2B5EF4-FFF2-40B4-BE49-F238E27FC236}">
-                <a16:creationId xmlns="" xmlns:a16="http://schemas.microsoft.com/office/drawing/2014/main" id="{A59B9489-0CD9-4DB7-AC82-6E7867F91403}"/>
+                <a16:creationId xmlns:a16="http://schemas.microsoft.com/office/drawing/2014/main" xmlns="" id="{A59B9489-0CD9-4DB7-AC82-6E7867F91403}"/>
               </a:ext>
             </a:extLst>
           </p:cNvPr>
@@ -14486,7 +14487,7 @@
           <p:cNvPr id="10" name="Right Triangle 9">
             <a:extLst>
               <a:ext uri="{FF2B5EF4-FFF2-40B4-BE49-F238E27FC236}">
-                <a16:creationId xmlns="" xmlns:a16="http://schemas.microsoft.com/office/drawing/2014/main" id="{A55D1C76-C591-4FA5-9780-87AB6B37C0FA}"/>
+                <a16:creationId xmlns:a16="http://schemas.microsoft.com/office/drawing/2014/main" xmlns="" id="{A55D1C76-C591-4FA5-9780-87AB6B37C0FA}"/>
               </a:ext>
             </a:extLst>
           </p:cNvPr>
@@ -14540,7 +14541,7 @@
           <p:cNvPr id="11" name="Freeform: Shape 10">
             <a:extLst>
               <a:ext uri="{FF2B5EF4-FFF2-40B4-BE49-F238E27FC236}">
-                <a16:creationId xmlns="" xmlns:a16="http://schemas.microsoft.com/office/drawing/2014/main" id="{A7DC1D12-670F-4235-8791-FA8C2B330871}"/>
+                <a16:creationId xmlns:a16="http://schemas.microsoft.com/office/drawing/2014/main" xmlns="" id="{A7DC1D12-670F-4235-8791-FA8C2B330871}"/>
               </a:ext>
             </a:extLst>
           </p:cNvPr>
@@ -14686,7 +14687,7 @@
           <p:cNvPr id="12" name="Freeform: Shape 11">
             <a:extLst>
               <a:ext uri="{FF2B5EF4-FFF2-40B4-BE49-F238E27FC236}">
-                <a16:creationId xmlns="" xmlns:a16="http://schemas.microsoft.com/office/drawing/2014/main" id="{859569CF-FDAC-47C4-A0F5-296F7117C398}"/>
+                <a16:creationId xmlns:a16="http://schemas.microsoft.com/office/drawing/2014/main" xmlns="" id="{859569CF-FDAC-47C4-A0F5-296F7117C398}"/>
               </a:ext>
             </a:extLst>
           </p:cNvPr>
@@ -14786,7 +14787,7 @@
           <p:cNvPr id="13" name="Freeform: Shape 12">
             <a:extLst>
               <a:ext uri="{FF2B5EF4-FFF2-40B4-BE49-F238E27FC236}">
-                <a16:creationId xmlns="" xmlns:a16="http://schemas.microsoft.com/office/drawing/2014/main" id="{D68D0C72-2B2C-4C85-A091-157853C71784}"/>
+                <a16:creationId xmlns:a16="http://schemas.microsoft.com/office/drawing/2014/main" xmlns="" id="{D68D0C72-2B2C-4C85-A091-157853C71784}"/>
               </a:ext>
             </a:extLst>
           </p:cNvPr>
@@ -14894,7 +14895,7 @@
           <p:cNvPr id="14" name="Freeform: Shape 13">
             <a:extLst>
               <a:ext uri="{FF2B5EF4-FFF2-40B4-BE49-F238E27FC236}">
-                <a16:creationId xmlns="" xmlns:a16="http://schemas.microsoft.com/office/drawing/2014/main" id="{8E25334A-5FE3-4DDA-8D32-4796CCFCAA74}"/>
+                <a16:creationId xmlns:a16="http://schemas.microsoft.com/office/drawing/2014/main" xmlns="" id="{8E25334A-5FE3-4DDA-8D32-4796CCFCAA74}"/>
               </a:ext>
             </a:extLst>
           </p:cNvPr>
@@ -14986,7 +14987,7 @@
           <p:cNvPr id="15" name="Freeform: Shape 14">
             <a:extLst>
               <a:ext uri="{FF2B5EF4-FFF2-40B4-BE49-F238E27FC236}">
-                <a16:creationId xmlns="" xmlns:a16="http://schemas.microsoft.com/office/drawing/2014/main" id="{18818DF1-D7FD-4C0F-875D-7A07E8F75C06}"/>
+                <a16:creationId xmlns:a16="http://schemas.microsoft.com/office/drawing/2014/main" xmlns="" id="{18818DF1-D7FD-4C0F-875D-7A07E8F75C06}"/>
               </a:ext>
             </a:extLst>
           </p:cNvPr>
@@ -15086,7 +15087,7 @@
           <p:cNvPr id="16" name="Group 15">
             <a:extLst>
               <a:ext uri="{FF2B5EF4-FFF2-40B4-BE49-F238E27FC236}">
-                <a16:creationId xmlns="" xmlns:a16="http://schemas.microsoft.com/office/drawing/2014/main" id="{8F9BB384-9E14-4CEA-82C1-21837229D3EF}"/>
+                <a16:creationId xmlns:a16="http://schemas.microsoft.com/office/drawing/2014/main" xmlns="" id="{8F9BB384-9E14-4CEA-82C1-21837229D3EF}"/>
               </a:ext>
             </a:extLst>
           </p:cNvPr>
@@ -15106,7 +15107,7 @@
             <p:cNvPr id="17" name="Freeform: Shape 16">
               <a:extLst>
                 <a:ext uri="{FF2B5EF4-FFF2-40B4-BE49-F238E27FC236}">
-                  <a16:creationId xmlns="" xmlns:a16="http://schemas.microsoft.com/office/drawing/2014/main" id="{0862A81A-959D-4EAB-90ED-DB20759BB397}"/>
+                  <a16:creationId xmlns:a16="http://schemas.microsoft.com/office/drawing/2014/main" xmlns="" id="{0862A81A-959D-4EAB-90ED-DB20759BB397}"/>
                 </a:ext>
               </a:extLst>
             </p:cNvPr>
@@ -15196,7 +15197,7 @@
             <p:cNvPr id="18" name="Freeform: Shape 17">
               <a:extLst>
                 <a:ext uri="{FF2B5EF4-FFF2-40B4-BE49-F238E27FC236}">
-                  <a16:creationId xmlns="" xmlns:a16="http://schemas.microsoft.com/office/drawing/2014/main" id="{AAB9E28C-9422-42BD-AECE-29B44B5D63E2}"/>
+                  <a16:creationId xmlns:a16="http://schemas.microsoft.com/office/drawing/2014/main" xmlns="" id="{AAB9E28C-9422-42BD-AECE-29B44B5D63E2}"/>
                 </a:ext>
               </a:extLst>
             </p:cNvPr>
@@ -15295,7 +15296,7 @@
           <p:cNvPr id="19" name="Group 18">
             <a:extLst>
               <a:ext uri="{FF2B5EF4-FFF2-40B4-BE49-F238E27FC236}">
-                <a16:creationId xmlns="" xmlns:a16="http://schemas.microsoft.com/office/drawing/2014/main" id="{2772239B-C46D-4458-BB4B-DDB12FAB0172}"/>
+                <a16:creationId xmlns:a16="http://schemas.microsoft.com/office/drawing/2014/main" xmlns="" id="{2772239B-C46D-4458-BB4B-DDB12FAB0172}"/>
               </a:ext>
             </a:extLst>
           </p:cNvPr>
@@ -15315,7 +15316,7 @@
             <p:cNvPr id="20" name="Freeform: Shape 19">
               <a:extLst>
                 <a:ext uri="{FF2B5EF4-FFF2-40B4-BE49-F238E27FC236}">
-                  <a16:creationId xmlns="" xmlns:a16="http://schemas.microsoft.com/office/drawing/2014/main" id="{3C8A2A1A-1FB9-4CA1-B74E-B293187E51AA}"/>
+                  <a16:creationId xmlns:a16="http://schemas.microsoft.com/office/drawing/2014/main" xmlns="" id="{3C8A2A1A-1FB9-4CA1-B74E-B293187E51AA}"/>
                 </a:ext>
               </a:extLst>
             </p:cNvPr>
@@ -15405,7 +15406,7 @@
             <p:cNvPr id="21" name="Freeform: Shape 20">
               <a:extLst>
                 <a:ext uri="{FF2B5EF4-FFF2-40B4-BE49-F238E27FC236}">
-                  <a16:creationId xmlns="" xmlns:a16="http://schemas.microsoft.com/office/drawing/2014/main" id="{DF2B18BA-6B43-40FA-A23B-D894D6AB468B}"/>
+                  <a16:creationId xmlns:a16="http://schemas.microsoft.com/office/drawing/2014/main" xmlns="" id="{DF2B18BA-6B43-40FA-A23B-D894D6AB468B}"/>
                 </a:ext>
               </a:extLst>
             </p:cNvPr>
@@ -15504,7 +15505,7 @@
           <p:cNvPr id="3" name="Text Placeholder 2">
             <a:extLst>
               <a:ext uri="{FF2B5EF4-FFF2-40B4-BE49-F238E27FC236}">
-                <a16:creationId xmlns="" xmlns:a16="http://schemas.microsoft.com/office/drawing/2014/main" id="{5E194264-A3F5-42E2-9A63-DCCED0457E1B}"/>
+                <a16:creationId xmlns:a16="http://schemas.microsoft.com/office/drawing/2014/main" xmlns="" id="{5E194264-A3F5-42E2-9A63-DCCED0457E1B}"/>
               </a:ext>
             </a:extLst>
           </p:cNvPr>
@@ -15554,7 +15555,7 @@
           <p:cNvPr id="22" name="Slide Number Placeholder 4">
             <a:extLst>
               <a:ext uri="{FF2B5EF4-FFF2-40B4-BE49-F238E27FC236}">
-                <a16:creationId xmlns="" xmlns:a16="http://schemas.microsoft.com/office/drawing/2014/main" id="{0F332671-6296-47C8-BF26-B2D962F5D03D}"/>
+                <a16:creationId xmlns:a16="http://schemas.microsoft.com/office/drawing/2014/main" xmlns="" id="{0F332671-6296-47C8-BF26-B2D962F5D03D}"/>
               </a:ext>
             </a:extLst>
           </p:cNvPr>
@@ -15598,7 +15599,7 @@
           <p:cNvPr id="23" name="Title 1">
             <a:extLst>
               <a:ext uri="{FF2B5EF4-FFF2-40B4-BE49-F238E27FC236}">
-                <a16:creationId xmlns="" xmlns:a16="http://schemas.microsoft.com/office/drawing/2014/main" id="{7772A652-7229-2B42-B87B-298C31D6F0CB}"/>
+                <a16:creationId xmlns:a16="http://schemas.microsoft.com/office/drawing/2014/main" xmlns="" id="{7772A652-7229-2B42-B87B-298C31D6F0CB}"/>
               </a:ext>
             </a:extLst>
           </p:cNvPr>
@@ -15648,11 +15649,11 @@
   <p:clrMapOvr>
     <a:masterClrMapping/>
   </p:clrMapOvr>
-  <mc:AlternateContent xmlns:mc="http://schemas.openxmlformats.org/markup-compatibility/2006">
-    <mc:Choice xmlns:p14="http://schemas.microsoft.com/office/powerpoint/2010/main" Requires="p14">
+  <mc:AlternateContent xmlns:mc="http://schemas.openxmlformats.org/markup-compatibility/2006" xmlns:p14="http://schemas.microsoft.com/office/powerpoint/2010/main">
+    <mc:Choice Requires="p14">
       <p:transition p14:dur="0"/>
     </mc:Choice>
-    <mc:Fallback>
+    <mc:Fallback xmlns="">
       <p:transition/>
     </mc:Fallback>
   </mc:AlternateContent>
@@ -15681,7 +15682,7 @@
           <p:cNvPr id="22" name="Rectangle 21">
             <a:extLst>
               <a:ext uri="{FF2B5EF4-FFF2-40B4-BE49-F238E27FC236}">
-                <a16:creationId xmlns="" xmlns:a16="http://schemas.microsoft.com/office/drawing/2014/main" id="{2CDBB6E5-B91E-4946-9390-E8693855103A}"/>
+                <a16:creationId xmlns:a16="http://schemas.microsoft.com/office/drawing/2014/main" xmlns="" id="{2CDBB6E5-B91E-4946-9390-E8693855103A}"/>
               </a:ext>
             </a:extLst>
           </p:cNvPr>
@@ -15735,7 +15736,7 @@
           <p:cNvPr id="34" name="Freeform: Shape 33">
             <a:extLst>
               <a:ext uri="{FF2B5EF4-FFF2-40B4-BE49-F238E27FC236}">
-                <a16:creationId xmlns="" xmlns:a16="http://schemas.microsoft.com/office/drawing/2014/main" id="{0C3CC1C9-1FA0-4FE4-8984-4A8B3728D674}"/>
+                <a16:creationId xmlns:a16="http://schemas.microsoft.com/office/drawing/2014/main" xmlns="" id="{0C3CC1C9-1FA0-4FE4-8984-4A8B3728D674}"/>
               </a:ext>
             </a:extLst>
           </p:cNvPr>
@@ -15880,7 +15881,7 @@
           <p:cNvPr id="24" name="Freeform: Shape 23">
             <a:extLst>
               <a:ext uri="{FF2B5EF4-FFF2-40B4-BE49-F238E27FC236}">
-                <a16:creationId xmlns="" xmlns:a16="http://schemas.microsoft.com/office/drawing/2014/main" id="{8E049265-431E-48DE-B7F7-4959930171DC}"/>
+                <a16:creationId xmlns:a16="http://schemas.microsoft.com/office/drawing/2014/main" xmlns="" id="{8E049265-431E-48DE-B7F7-4959930171DC}"/>
               </a:ext>
             </a:extLst>
           </p:cNvPr>
@@ -16020,7 +16021,7 @@
           <p:cNvPr id="25" name="Freeform: Shape 24">
             <a:extLst>
               <a:ext uri="{FF2B5EF4-FFF2-40B4-BE49-F238E27FC236}">
-                <a16:creationId xmlns="" xmlns:a16="http://schemas.microsoft.com/office/drawing/2014/main" id="{173E5F2D-1F8E-4DCC-857F-932C6C6539BB}"/>
+                <a16:creationId xmlns:a16="http://schemas.microsoft.com/office/drawing/2014/main" xmlns="" id="{173E5F2D-1F8E-4DCC-857F-932C6C6539BB}"/>
               </a:ext>
             </a:extLst>
           </p:cNvPr>
@@ -16166,7 +16167,7 @@
           <p:cNvPr id="26" name="Group 25">
             <a:extLst>
               <a:ext uri="{FF2B5EF4-FFF2-40B4-BE49-F238E27FC236}">
-                <a16:creationId xmlns="" xmlns:a16="http://schemas.microsoft.com/office/drawing/2014/main" id="{E9318B2B-E019-4078-9EF0-C9D6281AE31B}"/>
+                <a16:creationId xmlns:a16="http://schemas.microsoft.com/office/drawing/2014/main" xmlns="" id="{E9318B2B-E019-4078-9EF0-C9D6281AE31B}"/>
               </a:ext>
             </a:extLst>
           </p:cNvPr>
@@ -16186,7 +16187,7 @@
             <p:cNvPr id="27" name="Freeform: Shape 26">
               <a:extLst>
                 <a:ext uri="{FF2B5EF4-FFF2-40B4-BE49-F238E27FC236}">
-                  <a16:creationId xmlns="" xmlns:a16="http://schemas.microsoft.com/office/drawing/2014/main" id="{D3E625C0-9656-421F-861F-67C8F93362ED}"/>
+                  <a16:creationId xmlns:a16="http://schemas.microsoft.com/office/drawing/2014/main" xmlns="" id="{D3E625C0-9656-421F-861F-67C8F93362ED}"/>
                 </a:ext>
               </a:extLst>
             </p:cNvPr>
@@ -16286,7 +16287,7 @@
             <p:cNvPr id="28" name="Freeform: Shape 27">
               <a:extLst>
                 <a:ext uri="{FF2B5EF4-FFF2-40B4-BE49-F238E27FC236}">
-                  <a16:creationId xmlns="" xmlns:a16="http://schemas.microsoft.com/office/drawing/2014/main" id="{49F8E490-C6E3-4D00-866F-CD85DD88996E}"/>
+                  <a16:creationId xmlns:a16="http://schemas.microsoft.com/office/drawing/2014/main" xmlns="" id="{49F8E490-C6E3-4D00-866F-CD85DD88996E}"/>
                 </a:ext>
               </a:extLst>
             </p:cNvPr>
@@ -16395,7 +16396,7 @@
           <p:cNvPr id="29" name="Freeform: Shape 28">
             <a:extLst>
               <a:ext uri="{FF2B5EF4-FFF2-40B4-BE49-F238E27FC236}">
-                <a16:creationId xmlns="" xmlns:a16="http://schemas.microsoft.com/office/drawing/2014/main" id="{EE8F5B31-1523-46AE-9455-C33DFC1BDDE0}"/>
+                <a16:creationId xmlns:a16="http://schemas.microsoft.com/office/drawing/2014/main" xmlns="" id="{EE8F5B31-1523-46AE-9455-C33DFC1BDDE0}"/>
               </a:ext>
             </a:extLst>
           </p:cNvPr>
@@ -16487,7 +16488,7 @@
           <p:cNvPr id="30" name="Freeform: Shape 29">
             <a:extLst>
               <a:ext uri="{FF2B5EF4-FFF2-40B4-BE49-F238E27FC236}">
-                <a16:creationId xmlns="" xmlns:a16="http://schemas.microsoft.com/office/drawing/2014/main" id="{5D17048F-C2E1-4775-BC32-50BD6219F89D}"/>
+                <a16:creationId xmlns:a16="http://schemas.microsoft.com/office/drawing/2014/main" xmlns="" id="{5D17048F-C2E1-4775-BC32-50BD6219F89D}"/>
               </a:ext>
             </a:extLst>
           </p:cNvPr>
@@ -16587,7 +16588,7 @@
           <p:cNvPr id="31" name="Group 30">
             <a:extLst>
               <a:ext uri="{FF2B5EF4-FFF2-40B4-BE49-F238E27FC236}">
-                <a16:creationId xmlns="" xmlns:a16="http://schemas.microsoft.com/office/drawing/2014/main" id="{EAB002AA-4848-49C8-A834-036F860C79A3}"/>
+                <a16:creationId xmlns:a16="http://schemas.microsoft.com/office/drawing/2014/main" xmlns="" id="{EAB002AA-4848-49C8-A834-036F860C79A3}"/>
               </a:ext>
             </a:extLst>
           </p:cNvPr>
@@ -16607,7 +16608,7 @@
             <p:cNvPr id="32" name="Freeform: Shape 31">
               <a:extLst>
                 <a:ext uri="{FF2B5EF4-FFF2-40B4-BE49-F238E27FC236}">
-                  <a16:creationId xmlns="" xmlns:a16="http://schemas.microsoft.com/office/drawing/2014/main" id="{14B187A8-7F8D-469D-A03B-4F835A5746DE}"/>
+                  <a16:creationId xmlns:a16="http://schemas.microsoft.com/office/drawing/2014/main" xmlns="" id="{14B187A8-7F8D-469D-A03B-4F835A5746DE}"/>
                 </a:ext>
               </a:extLst>
             </p:cNvPr>
@@ -16697,7 +16698,7 @@
             <p:cNvPr id="33" name="Freeform: Shape 32">
               <a:extLst>
                 <a:ext uri="{FF2B5EF4-FFF2-40B4-BE49-F238E27FC236}">
-                  <a16:creationId xmlns="" xmlns:a16="http://schemas.microsoft.com/office/drawing/2014/main" id="{03D871D1-A11A-48FB-82A8-8D61AB5CB85C}"/>
+                  <a16:creationId xmlns:a16="http://schemas.microsoft.com/office/drawing/2014/main" xmlns="" id="{03D871D1-A11A-48FB-82A8-8D61AB5CB85C}"/>
                 </a:ext>
               </a:extLst>
             </p:cNvPr>
@@ -16796,7 +16797,7 @@
           <p:cNvPr id="2" name="Title 1">
             <a:extLst>
               <a:ext uri="{FF2B5EF4-FFF2-40B4-BE49-F238E27FC236}">
-                <a16:creationId xmlns="" xmlns:a16="http://schemas.microsoft.com/office/drawing/2014/main" id="{42374B20-3E42-44AF-BEF1-8AB33067395C}"/>
+                <a16:creationId xmlns:a16="http://schemas.microsoft.com/office/drawing/2014/main" xmlns="" id="{42374B20-3E42-44AF-BEF1-8AB33067395C}"/>
               </a:ext>
             </a:extLst>
           </p:cNvPr>
@@ -16841,7 +16842,7 @@
           <p:cNvPr id="3" name="Text Placeholder 2">
             <a:extLst>
               <a:ext uri="{FF2B5EF4-FFF2-40B4-BE49-F238E27FC236}">
-                <a16:creationId xmlns="" xmlns:a16="http://schemas.microsoft.com/office/drawing/2014/main" id="{5E194264-A3F5-42E2-9A63-DCCED0457E1B}"/>
+                <a16:creationId xmlns:a16="http://schemas.microsoft.com/office/drawing/2014/main" xmlns="" id="{5E194264-A3F5-42E2-9A63-DCCED0457E1B}"/>
               </a:ext>
             </a:extLst>
           </p:cNvPr>
@@ -16891,7 +16892,7 @@
           <p:cNvPr id="35" name="Slide Number Placeholder 4">
             <a:extLst>
               <a:ext uri="{FF2B5EF4-FFF2-40B4-BE49-F238E27FC236}">
-                <a16:creationId xmlns="" xmlns:a16="http://schemas.microsoft.com/office/drawing/2014/main" id="{6F73F836-940E-4B65-A29C-D0869263C935}"/>
+                <a16:creationId xmlns:a16="http://schemas.microsoft.com/office/drawing/2014/main" xmlns="" id="{6F73F836-940E-4B65-A29C-D0869263C935}"/>
               </a:ext>
             </a:extLst>
           </p:cNvPr>
@@ -16940,11 +16941,11 @@
   <p:clrMapOvr>
     <a:masterClrMapping/>
   </p:clrMapOvr>
-  <mc:AlternateContent xmlns:mc="http://schemas.openxmlformats.org/markup-compatibility/2006">
-    <mc:Choice xmlns:p14="http://schemas.microsoft.com/office/powerpoint/2010/main" Requires="p14">
+  <mc:AlternateContent xmlns:mc="http://schemas.openxmlformats.org/markup-compatibility/2006" xmlns:p14="http://schemas.microsoft.com/office/powerpoint/2010/main">
+    <mc:Choice Requires="p14">
       <p:transition p14:dur="0"/>
     </mc:Choice>
-    <mc:Fallback>
+    <mc:Fallback xmlns="">
       <p:transition/>
     </mc:Fallback>
   </mc:AlternateContent>
@@ -16973,7 +16974,7 @@
           <p:cNvPr id="22" name="Rectangle 21">
             <a:extLst>
               <a:ext uri="{FF2B5EF4-FFF2-40B4-BE49-F238E27FC236}">
-                <a16:creationId xmlns="" xmlns:a16="http://schemas.microsoft.com/office/drawing/2014/main" id="{2CDBB6E5-B91E-4946-9390-E8693855103A}"/>
+                <a16:creationId xmlns:a16="http://schemas.microsoft.com/office/drawing/2014/main" xmlns="" id="{2CDBB6E5-B91E-4946-9390-E8693855103A}"/>
               </a:ext>
             </a:extLst>
           </p:cNvPr>
@@ -17027,7 +17028,7 @@
           <p:cNvPr id="34" name="Freeform: Shape 33">
             <a:extLst>
               <a:ext uri="{FF2B5EF4-FFF2-40B4-BE49-F238E27FC236}">
-                <a16:creationId xmlns="" xmlns:a16="http://schemas.microsoft.com/office/drawing/2014/main" id="{0C3CC1C9-1FA0-4FE4-8984-4A8B3728D674}"/>
+                <a16:creationId xmlns:a16="http://schemas.microsoft.com/office/drawing/2014/main" xmlns="" id="{0C3CC1C9-1FA0-4FE4-8984-4A8B3728D674}"/>
               </a:ext>
             </a:extLst>
           </p:cNvPr>
@@ -17172,7 +17173,7 @@
           <p:cNvPr id="24" name="Freeform: Shape 23">
             <a:extLst>
               <a:ext uri="{FF2B5EF4-FFF2-40B4-BE49-F238E27FC236}">
-                <a16:creationId xmlns="" xmlns:a16="http://schemas.microsoft.com/office/drawing/2014/main" id="{8E049265-431E-48DE-B7F7-4959930171DC}"/>
+                <a16:creationId xmlns:a16="http://schemas.microsoft.com/office/drawing/2014/main" xmlns="" id="{8E049265-431E-48DE-B7F7-4959930171DC}"/>
               </a:ext>
             </a:extLst>
           </p:cNvPr>
@@ -17312,7 +17313,7 @@
           <p:cNvPr id="25" name="Freeform: Shape 24">
             <a:extLst>
               <a:ext uri="{FF2B5EF4-FFF2-40B4-BE49-F238E27FC236}">
-                <a16:creationId xmlns="" xmlns:a16="http://schemas.microsoft.com/office/drawing/2014/main" id="{173E5F2D-1F8E-4DCC-857F-932C6C6539BB}"/>
+                <a16:creationId xmlns:a16="http://schemas.microsoft.com/office/drawing/2014/main" xmlns="" id="{173E5F2D-1F8E-4DCC-857F-932C6C6539BB}"/>
               </a:ext>
             </a:extLst>
           </p:cNvPr>
@@ -17458,7 +17459,7 @@
           <p:cNvPr id="4" name="Oval 3">
             <a:extLst>
               <a:ext uri="{FF2B5EF4-FFF2-40B4-BE49-F238E27FC236}">
-                <a16:creationId xmlns="" xmlns:a16="http://schemas.microsoft.com/office/drawing/2014/main" id="{ECB4C115-EFF9-405C-98BE-F4077B9730D0}"/>
+                <a16:creationId xmlns:a16="http://schemas.microsoft.com/office/drawing/2014/main" xmlns="" id="{ECB4C115-EFF9-405C-98BE-F4077B9730D0}"/>
               </a:ext>
             </a:extLst>
           </p:cNvPr>
@@ -17516,7 +17517,7 @@
           <p:cNvPr id="18" name="Title 1">
             <a:extLst>
               <a:ext uri="{FF2B5EF4-FFF2-40B4-BE49-F238E27FC236}">
-                <a16:creationId xmlns="" xmlns:a16="http://schemas.microsoft.com/office/drawing/2014/main" id="{C9A300DD-BB54-44ED-A7E4-01CD41EC930F}"/>
+                <a16:creationId xmlns:a16="http://schemas.microsoft.com/office/drawing/2014/main" xmlns="" id="{C9A300DD-BB54-44ED-A7E4-01CD41EC930F}"/>
               </a:ext>
             </a:extLst>
           </p:cNvPr>
@@ -17579,7 +17580,7 @@
           <p:cNvPr id="2" name="Title 1">
             <a:extLst>
               <a:ext uri="{FF2B5EF4-FFF2-40B4-BE49-F238E27FC236}">
-                <a16:creationId xmlns="" xmlns:a16="http://schemas.microsoft.com/office/drawing/2014/main" id="{42374B20-3E42-44AF-BEF1-8AB33067395C}"/>
+                <a16:creationId xmlns:a16="http://schemas.microsoft.com/office/drawing/2014/main" xmlns="" id="{42374B20-3E42-44AF-BEF1-8AB33067395C}"/>
               </a:ext>
             </a:extLst>
           </p:cNvPr>
@@ -17627,7 +17628,7 @@
           <p:cNvPr id="19" name="Slide Number Placeholder 4">
             <a:extLst>
               <a:ext uri="{FF2B5EF4-FFF2-40B4-BE49-F238E27FC236}">
-                <a16:creationId xmlns="" xmlns:a16="http://schemas.microsoft.com/office/drawing/2014/main" id="{A4E6C1FF-5925-42B3-B7F9-0A0031BDAD30}"/>
+                <a16:creationId xmlns:a16="http://schemas.microsoft.com/office/drawing/2014/main" xmlns="" id="{A4E6C1FF-5925-42B3-B7F9-0A0031BDAD30}"/>
               </a:ext>
             </a:extLst>
           </p:cNvPr>
@@ -17676,11 +17677,11 @@
   <p:clrMapOvr>
     <a:masterClrMapping/>
   </p:clrMapOvr>
-  <mc:AlternateContent xmlns:mc="http://schemas.openxmlformats.org/markup-compatibility/2006">
-    <mc:Choice xmlns:p14="http://schemas.microsoft.com/office/powerpoint/2010/main" Requires="p14">
+  <mc:AlternateContent xmlns:mc="http://schemas.openxmlformats.org/markup-compatibility/2006" xmlns:p14="http://schemas.microsoft.com/office/powerpoint/2010/main">
+    <mc:Choice Requires="p14">
       <p:transition p14:dur="0"/>
     </mc:Choice>
-    <mc:Fallback>
+    <mc:Fallback xmlns="">
       <p:transition/>
     </mc:Fallback>
   </mc:AlternateContent>
@@ -17717,7 +17718,7 @@
           <p:cNvPr id="11" name="Rectangle 10">
             <a:extLst>
               <a:ext uri="{FF2B5EF4-FFF2-40B4-BE49-F238E27FC236}">
-                <a16:creationId xmlns="" xmlns:a16="http://schemas.microsoft.com/office/drawing/2014/main" id="{EB3E033F-4449-40FA-BC85-BD2712D313DD}"/>
+                <a16:creationId xmlns:a16="http://schemas.microsoft.com/office/drawing/2014/main" xmlns="" id="{EB3E033F-4449-40FA-BC85-BD2712D313DD}"/>
               </a:ext>
             </a:extLst>
           </p:cNvPr>
@@ -17771,7 +17772,7 @@
           <p:cNvPr id="10" name="Freeform: Shape 9">
             <a:extLst>
               <a:ext uri="{FF2B5EF4-FFF2-40B4-BE49-F238E27FC236}">
-                <a16:creationId xmlns="" xmlns:a16="http://schemas.microsoft.com/office/drawing/2014/main" id="{63D26743-0505-444C-80B3-E88EE87DF72B}"/>
+                <a16:creationId xmlns:a16="http://schemas.microsoft.com/office/drawing/2014/main" xmlns="" id="{63D26743-0505-444C-80B3-E88EE87DF72B}"/>
               </a:ext>
             </a:extLst>
           </p:cNvPr>
@@ -17894,7 +17895,7 @@
           <p:cNvPr id="8" name="Freeform: Shape 7">
             <a:extLst>
               <a:ext uri="{FF2B5EF4-FFF2-40B4-BE49-F238E27FC236}">
-                <a16:creationId xmlns="" xmlns:a16="http://schemas.microsoft.com/office/drawing/2014/main" id="{1599AF7E-3E34-4597-AA72-9373A7FDB020}"/>
+                <a16:creationId xmlns:a16="http://schemas.microsoft.com/office/drawing/2014/main" xmlns="" id="{1599AF7E-3E34-4597-AA72-9373A7FDB020}"/>
               </a:ext>
             </a:extLst>
           </p:cNvPr>
@@ -18040,7 +18041,7 @@
           <p:cNvPr id="2" name="Title 1">
             <a:extLst>
               <a:ext uri="{FF2B5EF4-FFF2-40B4-BE49-F238E27FC236}">
-                <a16:creationId xmlns="" xmlns:a16="http://schemas.microsoft.com/office/drawing/2014/main" id="{4A2DF563-7FAC-46B3-B24C-7E45CD89DA2B}"/>
+                <a16:creationId xmlns:a16="http://schemas.microsoft.com/office/drawing/2014/main" xmlns="" id="{4A2DF563-7FAC-46B3-B24C-7E45CD89DA2B}"/>
               </a:ext>
             </a:extLst>
           </p:cNvPr>
@@ -18086,7 +18087,7 @@
           <p:cNvPr id="5" name="Slide Number Placeholder 4">
             <a:extLst>
               <a:ext uri="{FF2B5EF4-FFF2-40B4-BE49-F238E27FC236}">
-                <a16:creationId xmlns="" xmlns:a16="http://schemas.microsoft.com/office/drawing/2014/main" id="{87B51822-97FF-47A7-8E4E-A0F79B4EB237}"/>
+                <a16:creationId xmlns:a16="http://schemas.microsoft.com/office/drawing/2014/main" xmlns="" id="{87B51822-97FF-47A7-8E4E-A0F79B4EB237}"/>
               </a:ext>
             </a:extLst>
           </p:cNvPr>
@@ -18130,7 +18131,7 @@
           <p:cNvPr id="15" name="Group 14">
             <a:extLst>
               <a:ext uri="{FF2B5EF4-FFF2-40B4-BE49-F238E27FC236}">
-                <a16:creationId xmlns="" xmlns:a16="http://schemas.microsoft.com/office/drawing/2014/main" id="{7732E1E7-45E3-4264-8F26-66758696DD1E}"/>
+                <a16:creationId xmlns:a16="http://schemas.microsoft.com/office/drawing/2014/main" xmlns="" id="{7732E1E7-45E3-4264-8F26-66758696DD1E}"/>
               </a:ext>
             </a:extLst>
           </p:cNvPr>
@@ -18150,7 +18151,7 @@
             <p:cNvPr id="16" name="Freeform: Shape 15">
               <a:extLst>
                 <a:ext uri="{FF2B5EF4-FFF2-40B4-BE49-F238E27FC236}">
-                  <a16:creationId xmlns="" xmlns:a16="http://schemas.microsoft.com/office/drawing/2014/main" id="{2E3DF883-8093-49FA-81E1-E5D77F086A25}"/>
+                  <a16:creationId xmlns:a16="http://schemas.microsoft.com/office/drawing/2014/main" xmlns="" id="{2E3DF883-8093-49FA-81E1-E5D77F086A25}"/>
                 </a:ext>
               </a:extLst>
             </p:cNvPr>
@@ -18240,7 +18241,7 @@
             <p:cNvPr id="17" name="Freeform: Shape 16">
               <a:extLst>
                 <a:ext uri="{FF2B5EF4-FFF2-40B4-BE49-F238E27FC236}">
-                  <a16:creationId xmlns="" xmlns:a16="http://schemas.microsoft.com/office/drawing/2014/main" id="{18944C90-37E5-4BBE-89FF-060627168050}"/>
+                  <a16:creationId xmlns:a16="http://schemas.microsoft.com/office/drawing/2014/main" xmlns="" id="{18944C90-37E5-4BBE-89FF-060627168050}"/>
                 </a:ext>
               </a:extLst>
             </p:cNvPr>
@@ -18339,7 +18340,7 @@
           <p:cNvPr id="23" name="Text Placeholder 22">
             <a:extLst>
               <a:ext uri="{FF2B5EF4-FFF2-40B4-BE49-F238E27FC236}">
-                <a16:creationId xmlns="" xmlns:a16="http://schemas.microsoft.com/office/drawing/2014/main" id="{03618670-D1E4-466C-BDB5-FC890AC31457}"/>
+                <a16:creationId xmlns:a16="http://schemas.microsoft.com/office/drawing/2014/main" xmlns="" id="{03618670-D1E4-466C-BDB5-FC890AC31457}"/>
               </a:ext>
             </a:extLst>
           </p:cNvPr>
@@ -18467,11 +18468,11 @@
   <p:clrMapOvr>
     <a:masterClrMapping/>
   </p:clrMapOvr>
-  <mc:AlternateContent xmlns:mc="http://schemas.openxmlformats.org/markup-compatibility/2006">
-    <mc:Choice xmlns:p14="http://schemas.microsoft.com/office/powerpoint/2010/main" Requires="p14">
+  <mc:AlternateContent xmlns:mc="http://schemas.openxmlformats.org/markup-compatibility/2006" xmlns:p14="http://schemas.microsoft.com/office/powerpoint/2010/main">
+    <mc:Choice Requires="p14">
       <p:transition p14:dur="0"/>
     </mc:Choice>
-    <mc:Fallback>
+    <mc:Fallback xmlns="">
       <p:transition/>
     </mc:Fallback>
   </mc:AlternateContent>
@@ -18508,7 +18509,7 @@
           <p:cNvPr id="11" name="Rectangle 10">
             <a:extLst>
               <a:ext uri="{FF2B5EF4-FFF2-40B4-BE49-F238E27FC236}">
-                <a16:creationId xmlns="" xmlns:a16="http://schemas.microsoft.com/office/drawing/2014/main" id="{EB3E033F-4449-40FA-BC85-BD2712D313DD}"/>
+                <a16:creationId xmlns:a16="http://schemas.microsoft.com/office/drawing/2014/main" xmlns="" id="{EB3E033F-4449-40FA-BC85-BD2712D313DD}"/>
               </a:ext>
             </a:extLst>
           </p:cNvPr>
@@ -18562,7 +18563,7 @@
           <p:cNvPr id="10" name="Freeform: Shape 9">
             <a:extLst>
               <a:ext uri="{FF2B5EF4-FFF2-40B4-BE49-F238E27FC236}">
-                <a16:creationId xmlns="" xmlns:a16="http://schemas.microsoft.com/office/drawing/2014/main" id="{63D26743-0505-444C-80B3-E88EE87DF72B}"/>
+                <a16:creationId xmlns:a16="http://schemas.microsoft.com/office/drawing/2014/main" xmlns="" id="{63D26743-0505-444C-80B3-E88EE87DF72B}"/>
               </a:ext>
             </a:extLst>
           </p:cNvPr>
@@ -18685,7 +18686,7 @@
           <p:cNvPr id="18" name="Freeform: Shape 17">
             <a:extLst>
               <a:ext uri="{FF2B5EF4-FFF2-40B4-BE49-F238E27FC236}">
-                <a16:creationId xmlns="" xmlns:a16="http://schemas.microsoft.com/office/drawing/2014/main" id="{E37145E9-AC61-47D5-9288-8789940F81B6}"/>
+                <a16:creationId xmlns:a16="http://schemas.microsoft.com/office/drawing/2014/main" xmlns="" id="{E37145E9-AC61-47D5-9288-8789940F81B6}"/>
               </a:ext>
             </a:extLst>
           </p:cNvPr>
@@ -18837,7 +18838,7 @@
           <p:cNvPr id="12" name="Freeform: Shape 11">
             <a:extLst>
               <a:ext uri="{FF2B5EF4-FFF2-40B4-BE49-F238E27FC236}">
-                <a16:creationId xmlns="" xmlns:a16="http://schemas.microsoft.com/office/drawing/2014/main" id="{A5E2B3ED-9A49-40A7-B8A3-62595FE513F9}"/>
+                <a16:creationId xmlns:a16="http://schemas.microsoft.com/office/drawing/2014/main" xmlns="" id="{A5E2B3ED-9A49-40A7-B8A3-62595FE513F9}"/>
               </a:ext>
             </a:extLst>
           </p:cNvPr>
@@ -18987,7 +18988,7 @@
           <p:cNvPr id="8" name="Freeform: Shape 7">
             <a:extLst>
               <a:ext uri="{FF2B5EF4-FFF2-40B4-BE49-F238E27FC236}">
-                <a16:creationId xmlns="" xmlns:a16="http://schemas.microsoft.com/office/drawing/2014/main" id="{1599AF7E-3E34-4597-AA72-9373A7FDB020}"/>
+                <a16:creationId xmlns:a16="http://schemas.microsoft.com/office/drawing/2014/main" xmlns="" id="{1599AF7E-3E34-4597-AA72-9373A7FDB020}"/>
               </a:ext>
             </a:extLst>
           </p:cNvPr>
@@ -19133,7 +19134,7 @@
           <p:cNvPr id="2" name="Title 1">
             <a:extLst>
               <a:ext uri="{FF2B5EF4-FFF2-40B4-BE49-F238E27FC236}">
-                <a16:creationId xmlns="" xmlns:a16="http://schemas.microsoft.com/office/drawing/2014/main" id="{4A2DF563-7FAC-46B3-B24C-7E45CD89DA2B}"/>
+                <a16:creationId xmlns:a16="http://schemas.microsoft.com/office/drawing/2014/main" xmlns="" id="{4A2DF563-7FAC-46B3-B24C-7E45CD89DA2B}"/>
               </a:ext>
             </a:extLst>
           </p:cNvPr>
@@ -19179,7 +19180,7 @@
           <p:cNvPr id="15" name="Group 14">
             <a:extLst>
               <a:ext uri="{FF2B5EF4-FFF2-40B4-BE49-F238E27FC236}">
-                <a16:creationId xmlns="" xmlns:a16="http://schemas.microsoft.com/office/drawing/2014/main" id="{7732E1E7-45E3-4264-8F26-66758696DD1E}"/>
+                <a16:creationId xmlns:a16="http://schemas.microsoft.com/office/drawing/2014/main" xmlns="" id="{7732E1E7-45E3-4264-8F26-66758696DD1E}"/>
               </a:ext>
             </a:extLst>
           </p:cNvPr>
@@ -19199,7 +19200,7 @@
             <p:cNvPr id="16" name="Freeform: Shape 15">
               <a:extLst>
                 <a:ext uri="{FF2B5EF4-FFF2-40B4-BE49-F238E27FC236}">
-                  <a16:creationId xmlns="" xmlns:a16="http://schemas.microsoft.com/office/drawing/2014/main" id="{2E3DF883-8093-49FA-81E1-E5D77F086A25}"/>
+                  <a16:creationId xmlns:a16="http://schemas.microsoft.com/office/drawing/2014/main" xmlns="" id="{2E3DF883-8093-49FA-81E1-E5D77F086A25}"/>
                 </a:ext>
               </a:extLst>
             </p:cNvPr>
@@ -19289,7 +19290,7 @@
             <p:cNvPr id="17" name="Freeform: Shape 16">
               <a:extLst>
                 <a:ext uri="{FF2B5EF4-FFF2-40B4-BE49-F238E27FC236}">
-                  <a16:creationId xmlns="" xmlns:a16="http://schemas.microsoft.com/office/drawing/2014/main" id="{18944C90-37E5-4BBE-89FF-060627168050}"/>
+                  <a16:creationId xmlns:a16="http://schemas.microsoft.com/office/drawing/2014/main" xmlns="" id="{18944C90-37E5-4BBE-89FF-060627168050}"/>
                 </a:ext>
               </a:extLst>
             </p:cNvPr>
@@ -19388,7 +19389,7 @@
           <p:cNvPr id="6" name="Group 5">
             <a:extLst>
               <a:ext uri="{FF2B5EF4-FFF2-40B4-BE49-F238E27FC236}">
-                <a16:creationId xmlns="" xmlns:a16="http://schemas.microsoft.com/office/drawing/2014/main" id="{D9EBF8BB-A805-4DDB-B459-082F99815B95}"/>
+                <a16:creationId xmlns:a16="http://schemas.microsoft.com/office/drawing/2014/main" xmlns="" id="{D9EBF8BB-A805-4DDB-B459-082F99815B95}"/>
               </a:ext>
             </a:extLst>
           </p:cNvPr>
@@ -19408,7 +19409,7 @@
             <p:cNvPr id="19" name="Rectangle: Single Corner Snipped 18">
               <a:extLst>
                 <a:ext uri="{FF2B5EF4-FFF2-40B4-BE49-F238E27FC236}">
-                  <a16:creationId xmlns="" xmlns:a16="http://schemas.microsoft.com/office/drawing/2014/main" id="{5D638788-DD47-45E7-939A-FA108A818173}"/>
+                  <a16:creationId xmlns:a16="http://schemas.microsoft.com/office/drawing/2014/main" xmlns="" id="{5D638788-DD47-45E7-939A-FA108A818173}"/>
                 </a:ext>
               </a:extLst>
             </p:cNvPr>
@@ -19474,7 +19475,7 @@
             <p:cNvPr id="3" name="Rectangle: Single Corner Snipped 2">
               <a:extLst>
                 <a:ext uri="{FF2B5EF4-FFF2-40B4-BE49-F238E27FC236}">
-                  <a16:creationId xmlns="" xmlns:a16="http://schemas.microsoft.com/office/drawing/2014/main" id="{74BDECEF-EEFE-4332-B3B2-BDE4F82C10FC}"/>
+                  <a16:creationId xmlns:a16="http://schemas.microsoft.com/office/drawing/2014/main" xmlns="" id="{74BDECEF-EEFE-4332-B3B2-BDE4F82C10FC}"/>
                 </a:ext>
               </a:extLst>
             </p:cNvPr>
@@ -19531,7 +19532,7 @@
           <p:cNvPr id="24" name="Freeform: Shape 23">
             <a:extLst>
               <a:ext uri="{FF2B5EF4-FFF2-40B4-BE49-F238E27FC236}">
-                <a16:creationId xmlns="" xmlns:a16="http://schemas.microsoft.com/office/drawing/2014/main" id="{18103E00-7E4A-44CD-81AC-06433CAE1110}"/>
+                <a16:creationId xmlns:a16="http://schemas.microsoft.com/office/drawing/2014/main" xmlns="" id="{18103E00-7E4A-44CD-81AC-06433CAE1110}"/>
               </a:ext>
             </a:extLst>
           </p:cNvPr>
@@ -19626,7 +19627,7 @@
           <p:cNvPr id="5" name="Slide Number Placeholder 4">
             <a:extLst>
               <a:ext uri="{FF2B5EF4-FFF2-40B4-BE49-F238E27FC236}">
-                <a16:creationId xmlns="" xmlns:a16="http://schemas.microsoft.com/office/drawing/2014/main" id="{87B51822-97FF-47A7-8E4E-A0F79B4EB237}"/>
+                <a16:creationId xmlns:a16="http://schemas.microsoft.com/office/drawing/2014/main" xmlns="" id="{87B51822-97FF-47A7-8E4E-A0F79B4EB237}"/>
               </a:ext>
             </a:extLst>
           </p:cNvPr>
@@ -19675,11 +19676,11 @@
   <p:clrMapOvr>
     <a:masterClrMapping/>
   </p:clrMapOvr>
-  <mc:AlternateContent xmlns:mc="http://schemas.openxmlformats.org/markup-compatibility/2006">
-    <mc:Choice xmlns:p14="http://schemas.microsoft.com/office/powerpoint/2010/main" Requires="p14">
+  <mc:AlternateContent xmlns:mc="http://schemas.openxmlformats.org/markup-compatibility/2006" xmlns:p14="http://schemas.microsoft.com/office/powerpoint/2010/main">
+    <mc:Choice Requires="p14">
       <p:transition p14:dur="0"/>
     </mc:Choice>
-    <mc:Fallback>
+    <mc:Fallback xmlns="">
       <p:transition/>
     </mc:Fallback>
   </mc:AlternateContent>
@@ -19716,7 +19717,7 @@
           <p:cNvPr id="11" name="Rectangle 10">
             <a:extLst>
               <a:ext uri="{FF2B5EF4-FFF2-40B4-BE49-F238E27FC236}">
-                <a16:creationId xmlns="" xmlns:a16="http://schemas.microsoft.com/office/drawing/2014/main" id="{EB3E033F-4449-40FA-BC85-BD2712D313DD}"/>
+                <a16:creationId xmlns:a16="http://schemas.microsoft.com/office/drawing/2014/main" xmlns="" id="{EB3E033F-4449-40FA-BC85-BD2712D313DD}"/>
               </a:ext>
             </a:extLst>
           </p:cNvPr>
@@ -19770,7 +19771,7 @@
           <p:cNvPr id="10" name="Freeform: Shape 9">
             <a:extLst>
               <a:ext uri="{FF2B5EF4-FFF2-40B4-BE49-F238E27FC236}">
-                <a16:creationId xmlns="" xmlns:a16="http://schemas.microsoft.com/office/drawing/2014/main" id="{63D26743-0505-444C-80B3-E88EE87DF72B}"/>
+                <a16:creationId xmlns:a16="http://schemas.microsoft.com/office/drawing/2014/main" xmlns="" id="{63D26743-0505-444C-80B3-E88EE87DF72B}"/>
               </a:ext>
             </a:extLst>
           </p:cNvPr>
@@ -19893,7 +19894,7 @@
           <p:cNvPr id="18" name="Freeform: Shape 17">
             <a:extLst>
               <a:ext uri="{FF2B5EF4-FFF2-40B4-BE49-F238E27FC236}">
-                <a16:creationId xmlns="" xmlns:a16="http://schemas.microsoft.com/office/drawing/2014/main" id="{E37145E9-AC61-47D5-9288-8789940F81B6}"/>
+                <a16:creationId xmlns:a16="http://schemas.microsoft.com/office/drawing/2014/main" xmlns="" id="{E37145E9-AC61-47D5-9288-8789940F81B6}"/>
               </a:ext>
             </a:extLst>
           </p:cNvPr>
@@ -20045,7 +20046,7 @@
           <p:cNvPr id="12" name="Freeform: Shape 11">
             <a:extLst>
               <a:ext uri="{FF2B5EF4-FFF2-40B4-BE49-F238E27FC236}">
-                <a16:creationId xmlns="" xmlns:a16="http://schemas.microsoft.com/office/drawing/2014/main" id="{A5E2B3ED-9A49-40A7-B8A3-62595FE513F9}"/>
+                <a16:creationId xmlns:a16="http://schemas.microsoft.com/office/drawing/2014/main" xmlns="" id="{A5E2B3ED-9A49-40A7-B8A3-62595FE513F9}"/>
               </a:ext>
             </a:extLst>
           </p:cNvPr>
@@ -20195,7 +20196,7 @@
           <p:cNvPr id="8" name="Freeform: Shape 7">
             <a:extLst>
               <a:ext uri="{FF2B5EF4-FFF2-40B4-BE49-F238E27FC236}">
-                <a16:creationId xmlns="" xmlns:a16="http://schemas.microsoft.com/office/drawing/2014/main" id="{1599AF7E-3E34-4597-AA72-9373A7FDB020}"/>
+                <a16:creationId xmlns:a16="http://schemas.microsoft.com/office/drawing/2014/main" xmlns="" id="{1599AF7E-3E34-4597-AA72-9373A7FDB020}"/>
               </a:ext>
             </a:extLst>
           </p:cNvPr>
@@ -20341,7 +20342,7 @@
           <p:cNvPr id="2" name="Title 1">
             <a:extLst>
               <a:ext uri="{FF2B5EF4-FFF2-40B4-BE49-F238E27FC236}">
-                <a16:creationId xmlns="" xmlns:a16="http://schemas.microsoft.com/office/drawing/2014/main" id="{4A2DF563-7FAC-46B3-B24C-7E45CD89DA2B}"/>
+                <a16:creationId xmlns:a16="http://schemas.microsoft.com/office/drawing/2014/main" xmlns="" id="{4A2DF563-7FAC-46B3-B24C-7E45CD89DA2B}"/>
               </a:ext>
             </a:extLst>
           </p:cNvPr>
@@ -20387,7 +20388,7 @@
           <p:cNvPr id="15" name="Group 14">
             <a:extLst>
               <a:ext uri="{FF2B5EF4-FFF2-40B4-BE49-F238E27FC236}">
-                <a16:creationId xmlns="" xmlns:a16="http://schemas.microsoft.com/office/drawing/2014/main" id="{7732E1E7-45E3-4264-8F26-66758696DD1E}"/>
+                <a16:creationId xmlns:a16="http://schemas.microsoft.com/office/drawing/2014/main" xmlns="" id="{7732E1E7-45E3-4264-8F26-66758696DD1E}"/>
               </a:ext>
             </a:extLst>
           </p:cNvPr>
@@ -20407,7 +20408,7 @@
             <p:cNvPr id="16" name="Freeform: Shape 15">
               <a:extLst>
                 <a:ext uri="{FF2B5EF4-FFF2-40B4-BE49-F238E27FC236}">
-                  <a16:creationId xmlns="" xmlns:a16="http://schemas.microsoft.com/office/drawing/2014/main" id="{2E3DF883-8093-49FA-81E1-E5D77F086A25}"/>
+                  <a16:creationId xmlns:a16="http://schemas.microsoft.com/office/drawing/2014/main" xmlns="" id="{2E3DF883-8093-49FA-81E1-E5D77F086A25}"/>
                 </a:ext>
               </a:extLst>
             </p:cNvPr>
@@ -20497,7 +20498,7 @@
             <p:cNvPr id="17" name="Freeform: Shape 16">
               <a:extLst>
                 <a:ext uri="{FF2B5EF4-FFF2-40B4-BE49-F238E27FC236}">
-                  <a16:creationId xmlns="" xmlns:a16="http://schemas.microsoft.com/office/drawing/2014/main" id="{18944C90-37E5-4BBE-89FF-060627168050}"/>
+                  <a16:creationId xmlns:a16="http://schemas.microsoft.com/office/drawing/2014/main" xmlns="" id="{18944C90-37E5-4BBE-89FF-060627168050}"/>
                 </a:ext>
               </a:extLst>
             </p:cNvPr>
@@ -20596,7 +20597,7 @@
           <p:cNvPr id="6" name="Group 5">
             <a:extLst>
               <a:ext uri="{FF2B5EF4-FFF2-40B4-BE49-F238E27FC236}">
-                <a16:creationId xmlns="" xmlns:a16="http://schemas.microsoft.com/office/drawing/2014/main" id="{D9EBF8BB-A805-4DDB-B459-082F99815B95}"/>
+                <a16:creationId xmlns:a16="http://schemas.microsoft.com/office/drawing/2014/main" xmlns="" id="{D9EBF8BB-A805-4DDB-B459-082F99815B95}"/>
               </a:ext>
             </a:extLst>
           </p:cNvPr>
@@ -20616,7 +20617,7 @@
             <p:cNvPr id="19" name="Rectangle: Single Corner Snipped 18">
               <a:extLst>
                 <a:ext uri="{FF2B5EF4-FFF2-40B4-BE49-F238E27FC236}">
-                  <a16:creationId xmlns="" xmlns:a16="http://schemas.microsoft.com/office/drawing/2014/main" id="{5D638788-DD47-45E7-939A-FA108A818173}"/>
+                  <a16:creationId xmlns:a16="http://schemas.microsoft.com/office/drawing/2014/main" xmlns="" id="{5D638788-DD47-45E7-939A-FA108A818173}"/>
                 </a:ext>
               </a:extLst>
             </p:cNvPr>
@@ -20682,7 +20683,7 @@
             <p:cNvPr id="3" name="Rectangle: Single Corner Snipped 2">
               <a:extLst>
                 <a:ext uri="{FF2B5EF4-FFF2-40B4-BE49-F238E27FC236}">
-                  <a16:creationId xmlns="" xmlns:a16="http://schemas.microsoft.com/office/drawing/2014/main" id="{74BDECEF-EEFE-4332-B3B2-BDE4F82C10FC}"/>
+                  <a16:creationId xmlns:a16="http://schemas.microsoft.com/office/drawing/2014/main" xmlns="" id="{74BDECEF-EEFE-4332-B3B2-BDE4F82C10FC}"/>
                 </a:ext>
               </a:extLst>
             </p:cNvPr>
@@ -20739,7 +20740,7 @@
           <p:cNvPr id="24" name="Freeform: Shape 23">
             <a:extLst>
               <a:ext uri="{FF2B5EF4-FFF2-40B4-BE49-F238E27FC236}">
-                <a16:creationId xmlns="" xmlns:a16="http://schemas.microsoft.com/office/drawing/2014/main" id="{18103E00-7E4A-44CD-81AC-06433CAE1110}"/>
+                <a16:creationId xmlns:a16="http://schemas.microsoft.com/office/drawing/2014/main" xmlns="" id="{18103E00-7E4A-44CD-81AC-06433CAE1110}"/>
               </a:ext>
             </a:extLst>
           </p:cNvPr>
@@ -20834,7 +20835,7 @@
           <p:cNvPr id="5" name="Slide Number Placeholder 4">
             <a:extLst>
               <a:ext uri="{FF2B5EF4-FFF2-40B4-BE49-F238E27FC236}">
-                <a16:creationId xmlns="" xmlns:a16="http://schemas.microsoft.com/office/drawing/2014/main" id="{87B51822-97FF-47A7-8E4E-A0F79B4EB237}"/>
+                <a16:creationId xmlns:a16="http://schemas.microsoft.com/office/drawing/2014/main" xmlns="" id="{87B51822-97FF-47A7-8E4E-A0F79B4EB237}"/>
               </a:ext>
             </a:extLst>
           </p:cNvPr>
@@ -20878,7 +20879,7 @@
           <p:cNvPr id="7" name="Text Placeholder 6">
             <a:extLst>
               <a:ext uri="{FF2B5EF4-FFF2-40B4-BE49-F238E27FC236}">
-                <a16:creationId xmlns="" xmlns:a16="http://schemas.microsoft.com/office/drawing/2014/main" id="{7E0C167E-2626-40DB-AACF-D02543E29BB3}"/>
+                <a16:creationId xmlns:a16="http://schemas.microsoft.com/office/drawing/2014/main" xmlns="" id="{7E0C167E-2626-40DB-AACF-D02543E29BB3}"/>
               </a:ext>
             </a:extLst>
           </p:cNvPr>
@@ -20928,11 +20929,11 @@
   <p:clrMapOvr>
     <a:masterClrMapping/>
   </p:clrMapOvr>
-  <mc:AlternateContent xmlns:mc="http://schemas.openxmlformats.org/markup-compatibility/2006">
-    <mc:Choice xmlns:p14="http://schemas.microsoft.com/office/powerpoint/2010/main" Requires="p14">
+  <mc:AlternateContent xmlns:mc="http://schemas.openxmlformats.org/markup-compatibility/2006" xmlns:p14="http://schemas.microsoft.com/office/powerpoint/2010/main">
+    <mc:Choice Requires="p14">
       <p:transition p14:dur="0"/>
     </mc:Choice>
-    <mc:Fallback>
+    <mc:Fallback xmlns="">
       <p:transition/>
     </mc:Fallback>
   </mc:AlternateContent>
@@ -20969,7 +20970,7 @@
           <p:cNvPr id="11" name="Rectangle 10">
             <a:extLst>
               <a:ext uri="{FF2B5EF4-FFF2-40B4-BE49-F238E27FC236}">
-                <a16:creationId xmlns="" xmlns:a16="http://schemas.microsoft.com/office/drawing/2014/main" id="{EB3E033F-4449-40FA-BC85-BD2712D313DD}"/>
+                <a16:creationId xmlns:a16="http://schemas.microsoft.com/office/drawing/2014/main" xmlns="" id="{EB3E033F-4449-40FA-BC85-BD2712D313DD}"/>
               </a:ext>
             </a:extLst>
           </p:cNvPr>
@@ -21023,7 +21024,7 @@
           <p:cNvPr id="10" name="Freeform: Shape 9">
             <a:extLst>
               <a:ext uri="{FF2B5EF4-FFF2-40B4-BE49-F238E27FC236}">
-                <a16:creationId xmlns="" xmlns:a16="http://schemas.microsoft.com/office/drawing/2014/main" id="{63D26743-0505-444C-80B3-E88EE87DF72B}"/>
+                <a16:creationId xmlns:a16="http://schemas.microsoft.com/office/drawing/2014/main" xmlns="" id="{63D26743-0505-444C-80B3-E88EE87DF72B}"/>
               </a:ext>
             </a:extLst>
           </p:cNvPr>
@@ -21146,7 +21147,7 @@
           <p:cNvPr id="18" name="Freeform: Shape 17">
             <a:extLst>
               <a:ext uri="{FF2B5EF4-FFF2-40B4-BE49-F238E27FC236}">
-                <a16:creationId xmlns="" xmlns:a16="http://schemas.microsoft.com/office/drawing/2014/main" id="{E37145E9-AC61-47D5-9288-8789940F81B6}"/>
+                <a16:creationId xmlns:a16="http://schemas.microsoft.com/office/drawing/2014/main" xmlns="" id="{E37145E9-AC61-47D5-9288-8789940F81B6}"/>
               </a:ext>
             </a:extLst>
           </p:cNvPr>
@@ -21298,7 +21299,7 @@
           <p:cNvPr id="12" name="Freeform: Shape 11">
             <a:extLst>
               <a:ext uri="{FF2B5EF4-FFF2-40B4-BE49-F238E27FC236}">
-                <a16:creationId xmlns="" xmlns:a16="http://schemas.microsoft.com/office/drawing/2014/main" id="{A5E2B3ED-9A49-40A7-B8A3-62595FE513F9}"/>
+                <a16:creationId xmlns:a16="http://schemas.microsoft.com/office/drawing/2014/main" xmlns="" id="{A5E2B3ED-9A49-40A7-B8A3-62595FE513F9}"/>
               </a:ext>
             </a:extLst>
           </p:cNvPr>
@@ -21448,7 +21449,7 @@
           <p:cNvPr id="8" name="Freeform: Shape 7">
             <a:extLst>
               <a:ext uri="{FF2B5EF4-FFF2-40B4-BE49-F238E27FC236}">
-                <a16:creationId xmlns="" xmlns:a16="http://schemas.microsoft.com/office/drawing/2014/main" id="{1599AF7E-3E34-4597-AA72-9373A7FDB020}"/>
+                <a16:creationId xmlns:a16="http://schemas.microsoft.com/office/drawing/2014/main" xmlns="" id="{1599AF7E-3E34-4597-AA72-9373A7FDB020}"/>
               </a:ext>
             </a:extLst>
           </p:cNvPr>
@@ -21594,7 +21595,7 @@
           <p:cNvPr id="2" name="Title 1">
             <a:extLst>
               <a:ext uri="{FF2B5EF4-FFF2-40B4-BE49-F238E27FC236}">
-                <a16:creationId xmlns="" xmlns:a16="http://schemas.microsoft.com/office/drawing/2014/main" id="{4A2DF563-7FAC-46B3-B24C-7E45CD89DA2B}"/>
+                <a16:creationId xmlns:a16="http://schemas.microsoft.com/office/drawing/2014/main" xmlns="" id="{4A2DF563-7FAC-46B3-B24C-7E45CD89DA2B}"/>
               </a:ext>
             </a:extLst>
           </p:cNvPr>
@@ -21640,7 +21641,7 @@
           <p:cNvPr id="15" name="Group 14">
             <a:extLst>
               <a:ext uri="{FF2B5EF4-FFF2-40B4-BE49-F238E27FC236}">
-                <a16:creationId xmlns="" xmlns:a16="http://schemas.microsoft.com/office/drawing/2014/main" id="{7732E1E7-45E3-4264-8F26-66758696DD1E}"/>
+                <a16:creationId xmlns:a16="http://schemas.microsoft.com/office/drawing/2014/main" xmlns="" id="{7732E1E7-45E3-4264-8F26-66758696DD1E}"/>
               </a:ext>
             </a:extLst>
           </p:cNvPr>
@@ -21660,7 +21661,7 @@
             <p:cNvPr id="16" name="Freeform: Shape 15">
               <a:extLst>
                 <a:ext uri="{FF2B5EF4-FFF2-40B4-BE49-F238E27FC236}">
-                  <a16:creationId xmlns="" xmlns:a16="http://schemas.microsoft.com/office/drawing/2014/main" id="{2E3DF883-8093-49FA-81E1-E5D77F086A25}"/>
+                  <a16:creationId xmlns:a16="http://schemas.microsoft.com/office/drawing/2014/main" xmlns="" id="{2E3DF883-8093-49FA-81E1-E5D77F086A25}"/>
                 </a:ext>
               </a:extLst>
             </p:cNvPr>
@@ -21750,7 +21751,7 @@
             <p:cNvPr id="17" name="Freeform: Shape 16">
               <a:extLst>
                 <a:ext uri="{FF2B5EF4-FFF2-40B4-BE49-F238E27FC236}">
-                  <a16:creationId xmlns="" xmlns:a16="http://schemas.microsoft.com/office/drawing/2014/main" id="{18944C90-37E5-4BBE-89FF-060627168050}"/>
+                  <a16:creationId xmlns:a16="http://schemas.microsoft.com/office/drawing/2014/main" xmlns="" id="{18944C90-37E5-4BBE-89FF-060627168050}"/>
                 </a:ext>
               </a:extLst>
             </p:cNvPr>
@@ -21849,7 +21850,7 @@
           <p:cNvPr id="6" name="Group 5">
             <a:extLst>
               <a:ext uri="{FF2B5EF4-FFF2-40B4-BE49-F238E27FC236}">
-                <a16:creationId xmlns="" xmlns:a16="http://schemas.microsoft.com/office/drawing/2014/main" id="{D9EBF8BB-A805-4DDB-B459-082F99815B95}"/>
+                <a16:creationId xmlns:a16="http://schemas.microsoft.com/office/drawing/2014/main" xmlns="" id="{D9EBF8BB-A805-4DDB-B459-082F99815B95}"/>
               </a:ext>
             </a:extLst>
           </p:cNvPr>
@@ -21869,7 +21870,7 @@
             <p:cNvPr id="19" name="Rectangle: Single Corner Snipped 18">
               <a:extLst>
                 <a:ext uri="{FF2B5EF4-FFF2-40B4-BE49-F238E27FC236}">
-                  <a16:creationId xmlns="" xmlns:a16="http://schemas.microsoft.com/office/drawing/2014/main" id="{5D638788-DD47-45E7-939A-FA108A818173}"/>
+                  <a16:creationId xmlns:a16="http://schemas.microsoft.com/office/drawing/2014/main" xmlns="" id="{5D638788-DD47-45E7-939A-FA108A818173}"/>
                 </a:ext>
               </a:extLst>
             </p:cNvPr>
@@ -21935,7 +21936,7 @@
             <p:cNvPr id="3" name="Rectangle: Single Corner Snipped 2">
               <a:extLst>
                 <a:ext uri="{FF2B5EF4-FFF2-40B4-BE49-F238E27FC236}">
-                  <a16:creationId xmlns="" xmlns:a16="http://schemas.microsoft.com/office/drawing/2014/main" id="{74BDECEF-EEFE-4332-B3B2-BDE4F82C10FC}"/>
+                  <a16:creationId xmlns:a16="http://schemas.microsoft.com/office/drawing/2014/main" xmlns="" id="{74BDECEF-EEFE-4332-B3B2-BDE4F82C10FC}"/>
                 </a:ext>
               </a:extLst>
             </p:cNvPr>
@@ -21992,7 +21993,7 @@
           <p:cNvPr id="24" name="Freeform: Shape 23">
             <a:extLst>
               <a:ext uri="{FF2B5EF4-FFF2-40B4-BE49-F238E27FC236}">
-                <a16:creationId xmlns="" xmlns:a16="http://schemas.microsoft.com/office/drawing/2014/main" id="{18103E00-7E4A-44CD-81AC-06433CAE1110}"/>
+                <a16:creationId xmlns:a16="http://schemas.microsoft.com/office/drawing/2014/main" xmlns="" id="{18103E00-7E4A-44CD-81AC-06433CAE1110}"/>
               </a:ext>
             </a:extLst>
           </p:cNvPr>
@@ -22087,7 +22088,7 @@
           <p:cNvPr id="5" name="Slide Number Placeholder 4">
             <a:extLst>
               <a:ext uri="{FF2B5EF4-FFF2-40B4-BE49-F238E27FC236}">
-                <a16:creationId xmlns="" xmlns:a16="http://schemas.microsoft.com/office/drawing/2014/main" id="{87B51822-97FF-47A7-8E4E-A0F79B4EB237}"/>
+                <a16:creationId xmlns:a16="http://schemas.microsoft.com/office/drawing/2014/main" xmlns="" id="{87B51822-97FF-47A7-8E4E-A0F79B4EB237}"/>
               </a:ext>
             </a:extLst>
           </p:cNvPr>
@@ -22131,7 +22132,7 @@
           <p:cNvPr id="20" name="Content Placeholder 2">
             <a:extLst>
               <a:ext uri="{FF2B5EF4-FFF2-40B4-BE49-F238E27FC236}">
-                <a16:creationId xmlns="" xmlns:a16="http://schemas.microsoft.com/office/drawing/2014/main" id="{0103A49C-32FF-49E6-86F3-FC2E19517BD5}"/>
+                <a16:creationId xmlns:a16="http://schemas.microsoft.com/office/drawing/2014/main" xmlns="" id="{0103A49C-32FF-49E6-86F3-FC2E19517BD5}"/>
               </a:ext>
             </a:extLst>
           </p:cNvPr>
@@ -22235,11 +22236,11 @@
   <p:clrMapOvr>
     <a:masterClrMapping/>
   </p:clrMapOvr>
-  <mc:AlternateContent xmlns:mc="http://schemas.openxmlformats.org/markup-compatibility/2006">
-    <mc:Choice xmlns:p14="http://schemas.microsoft.com/office/powerpoint/2010/main" Requires="p14">
+  <mc:AlternateContent xmlns:mc="http://schemas.openxmlformats.org/markup-compatibility/2006" xmlns:p14="http://schemas.microsoft.com/office/powerpoint/2010/main">
+    <mc:Choice Requires="p14">
       <p:transition p14:dur="0"/>
     </mc:Choice>
-    <mc:Fallback>
+    <mc:Fallback xmlns="">
       <p:transition/>
     </mc:Fallback>
   </mc:AlternateContent>
@@ -22276,7 +22277,7 @@
           <p:cNvPr id="11" name="Rectangle 10">
             <a:extLst>
               <a:ext uri="{FF2B5EF4-FFF2-40B4-BE49-F238E27FC236}">
-                <a16:creationId xmlns="" xmlns:a16="http://schemas.microsoft.com/office/drawing/2014/main" id="{EB3E033F-4449-40FA-BC85-BD2712D313DD}"/>
+                <a16:creationId xmlns:a16="http://schemas.microsoft.com/office/drawing/2014/main" xmlns="" id="{EB3E033F-4449-40FA-BC85-BD2712D313DD}"/>
               </a:ext>
             </a:extLst>
           </p:cNvPr>
@@ -22330,7 +22331,7 @@
           <p:cNvPr id="10" name="Freeform: Shape 9">
             <a:extLst>
               <a:ext uri="{FF2B5EF4-FFF2-40B4-BE49-F238E27FC236}">
-                <a16:creationId xmlns="" xmlns:a16="http://schemas.microsoft.com/office/drawing/2014/main" id="{63D26743-0505-444C-80B3-E88EE87DF72B}"/>
+                <a16:creationId xmlns:a16="http://schemas.microsoft.com/office/drawing/2014/main" xmlns="" id="{63D26743-0505-444C-80B3-E88EE87DF72B}"/>
               </a:ext>
             </a:extLst>
           </p:cNvPr>
@@ -22453,7 +22454,7 @@
           <p:cNvPr id="18" name="Freeform: Shape 17">
             <a:extLst>
               <a:ext uri="{FF2B5EF4-FFF2-40B4-BE49-F238E27FC236}">
-                <a16:creationId xmlns="" xmlns:a16="http://schemas.microsoft.com/office/drawing/2014/main" id="{E37145E9-AC61-47D5-9288-8789940F81B6}"/>
+                <a16:creationId xmlns:a16="http://schemas.microsoft.com/office/drawing/2014/main" xmlns="" id="{E37145E9-AC61-47D5-9288-8789940F81B6}"/>
               </a:ext>
             </a:extLst>
           </p:cNvPr>
@@ -22605,7 +22606,7 @@
           <p:cNvPr id="12" name="Freeform: Shape 11">
             <a:extLst>
               <a:ext uri="{FF2B5EF4-FFF2-40B4-BE49-F238E27FC236}">
-                <a16:creationId xmlns="" xmlns:a16="http://schemas.microsoft.com/office/drawing/2014/main" id="{A5E2B3ED-9A49-40A7-B8A3-62595FE513F9}"/>
+                <a16:creationId xmlns:a16="http://schemas.microsoft.com/office/drawing/2014/main" xmlns="" id="{A5E2B3ED-9A49-40A7-B8A3-62595FE513F9}"/>
               </a:ext>
             </a:extLst>
           </p:cNvPr>
@@ -22755,7 +22756,7 @@
           <p:cNvPr id="8" name="Freeform: Shape 7">
             <a:extLst>
               <a:ext uri="{FF2B5EF4-FFF2-40B4-BE49-F238E27FC236}">
-                <a16:creationId xmlns="" xmlns:a16="http://schemas.microsoft.com/office/drawing/2014/main" id="{1599AF7E-3E34-4597-AA72-9373A7FDB020}"/>
+                <a16:creationId xmlns:a16="http://schemas.microsoft.com/office/drawing/2014/main" xmlns="" id="{1599AF7E-3E34-4597-AA72-9373A7FDB020}"/>
               </a:ext>
             </a:extLst>
           </p:cNvPr>
@@ -22901,7 +22902,7 @@
           <p:cNvPr id="2" name="Title 1">
             <a:extLst>
               <a:ext uri="{FF2B5EF4-FFF2-40B4-BE49-F238E27FC236}">
-                <a16:creationId xmlns="" xmlns:a16="http://schemas.microsoft.com/office/drawing/2014/main" id="{4A2DF563-7FAC-46B3-B24C-7E45CD89DA2B}"/>
+                <a16:creationId xmlns:a16="http://schemas.microsoft.com/office/drawing/2014/main" xmlns="" id="{4A2DF563-7FAC-46B3-B24C-7E45CD89DA2B}"/>
               </a:ext>
             </a:extLst>
           </p:cNvPr>
@@ -22947,7 +22948,7 @@
           <p:cNvPr id="15" name="Group 14">
             <a:extLst>
               <a:ext uri="{FF2B5EF4-FFF2-40B4-BE49-F238E27FC236}">
-                <a16:creationId xmlns="" xmlns:a16="http://schemas.microsoft.com/office/drawing/2014/main" id="{7732E1E7-45E3-4264-8F26-66758696DD1E}"/>
+                <a16:creationId xmlns:a16="http://schemas.microsoft.com/office/drawing/2014/main" xmlns="" id="{7732E1E7-45E3-4264-8F26-66758696DD1E}"/>
               </a:ext>
             </a:extLst>
           </p:cNvPr>
@@ -22967,7 +22968,7 @@
             <p:cNvPr id="16" name="Freeform: Shape 15">
               <a:extLst>
                 <a:ext uri="{FF2B5EF4-FFF2-40B4-BE49-F238E27FC236}">
-                  <a16:creationId xmlns="" xmlns:a16="http://schemas.microsoft.com/office/drawing/2014/main" id="{2E3DF883-8093-49FA-81E1-E5D77F086A25}"/>
+                  <a16:creationId xmlns:a16="http://schemas.microsoft.com/office/drawing/2014/main" xmlns="" id="{2E3DF883-8093-49FA-81E1-E5D77F086A25}"/>
                 </a:ext>
               </a:extLst>
             </p:cNvPr>
@@ -23057,7 +23058,7 @@
             <p:cNvPr id="17" name="Freeform: Shape 16">
               <a:extLst>
                 <a:ext uri="{FF2B5EF4-FFF2-40B4-BE49-F238E27FC236}">
-                  <a16:creationId xmlns="" xmlns:a16="http://schemas.microsoft.com/office/drawing/2014/main" id="{18944C90-37E5-4BBE-89FF-060627168050}"/>
+                  <a16:creationId xmlns:a16="http://schemas.microsoft.com/office/drawing/2014/main" xmlns="" id="{18944C90-37E5-4BBE-89FF-060627168050}"/>
                 </a:ext>
               </a:extLst>
             </p:cNvPr>
@@ -23156,7 +23157,7 @@
           <p:cNvPr id="6" name="Group 5">
             <a:extLst>
               <a:ext uri="{FF2B5EF4-FFF2-40B4-BE49-F238E27FC236}">
-                <a16:creationId xmlns="" xmlns:a16="http://schemas.microsoft.com/office/drawing/2014/main" id="{D9EBF8BB-A805-4DDB-B459-082F99815B95}"/>
+                <a16:creationId xmlns:a16="http://schemas.microsoft.com/office/drawing/2014/main" xmlns="" id="{D9EBF8BB-A805-4DDB-B459-082F99815B95}"/>
               </a:ext>
             </a:extLst>
           </p:cNvPr>
@@ -23176,7 +23177,7 @@
             <p:cNvPr id="19" name="Rectangle: Single Corner Snipped 18">
               <a:extLst>
                 <a:ext uri="{FF2B5EF4-FFF2-40B4-BE49-F238E27FC236}">
-                  <a16:creationId xmlns="" xmlns:a16="http://schemas.microsoft.com/office/drawing/2014/main" id="{5D638788-DD47-45E7-939A-FA108A818173}"/>
+                  <a16:creationId xmlns:a16="http://schemas.microsoft.com/office/drawing/2014/main" xmlns="" id="{5D638788-DD47-45E7-939A-FA108A818173}"/>
                 </a:ext>
               </a:extLst>
             </p:cNvPr>
@@ -23242,7 +23243,7 @@
             <p:cNvPr id="3" name="Rectangle: Single Corner Snipped 2">
               <a:extLst>
                 <a:ext uri="{FF2B5EF4-FFF2-40B4-BE49-F238E27FC236}">
-                  <a16:creationId xmlns="" xmlns:a16="http://schemas.microsoft.com/office/drawing/2014/main" id="{74BDECEF-EEFE-4332-B3B2-BDE4F82C10FC}"/>
+                  <a16:creationId xmlns:a16="http://schemas.microsoft.com/office/drawing/2014/main" xmlns="" id="{74BDECEF-EEFE-4332-B3B2-BDE4F82C10FC}"/>
                 </a:ext>
               </a:extLst>
             </p:cNvPr>
@@ -23299,7 +23300,7 @@
           <p:cNvPr id="24" name="Freeform: Shape 23">
             <a:extLst>
               <a:ext uri="{FF2B5EF4-FFF2-40B4-BE49-F238E27FC236}">
-                <a16:creationId xmlns="" xmlns:a16="http://schemas.microsoft.com/office/drawing/2014/main" id="{18103E00-7E4A-44CD-81AC-06433CAE1110}"/>
+                <a16:creationId xmlns:a16="http://schemas.microsoft.com/office/drawing/2014/main" xmlns="" id="{18103E00-7E4A-44CD-81AC-06433CAE1110}"/>
               </a:ext>
             </a:extLst>
           </p:cNvPr>
@@ -23394,7 +23395,7 @@
           <p:cNvPr id="5" name="Slide Number Placeholder 4">
             <a:extLst>
               <a:ext uri="{FF2B5EF4-FFF2-40B4-BE49-F238E27FC236}">
-                <a16:creationId xmlns="" xmlns:a16="http://schemas.microsoft.com/office/drawing/2014/main" id="{87B51822-97FF-47A7-8E4E-A0F79B4EB237}"/>
+                <a16:creationId xmlns:a16="http://schemas.microsoft.com/office/drawing/2014/main" xmlns="" id="{87B51822-97FF-47A7-8E4E-A0F79B4EB237}"/>
               </a:ext>
             </a:extLst>
           </p:cNvPr>
@@ -23438,7 +23439,7 @@
           <p:cNvPr id="25" name="Text Placeholder 2">
             <a:extLst>
               <a:ext uri="{FF2B5EF4-FFF2-40B4-BE49-F238E27FC236}">
-                <a16:creationId xmlns="" xmlns:a16="http://schemas.microsoft.com/office/drawing/2014/main" id="{7FA80A70-18DE-4DB9-9982-BA75BE54CF93}"/>
+                <a16:creationId xmlns:a16="http://schemas.microsoft.com/office/drawing/2014/main" xmlns="" id="{7FA80A70-18DE-4DB9-9982-BA75BE54CF93}"/>
               </a:ext>
             </a:extLst>
           </p:cNvPr>
@@ -23516,7 +23517,7 @@
           <p:cNvPr id="26" name="Text Placeholder 4">
             <a:extLst>
               <a:ext uri="{FF2B5EF4-FFF2-40B4-BE49-F238E27FC236}">
-                <a16:creationId xmlns="" xmlns:a16="http://schemas.microsoft.com/office/drawing/2014/main" id="{2801C0EF-C078-44B0-AD01-4850E9A65EE0}"/>
+                <a16:creationId xmlns:a16="http://schemas.microsoft.com/office/drawing/2014/main" xmlns="" id="{2801C0EF-C078-44B0-AD01-4850E9A65EE0}"/>
               </a:ext>
             </a:extLst>
           </p:cNvPr>
@@ -23594,7 +23595,7 @@
           <p:cNvPr id="27" name="Content Placeholder 3">
             <a:extLst>
               <a:ext uri="{FF2B5EF4-FFF2-40B4-BE49-F238E27FC236}">
-                <a16:creationId xmlns="" xmlns:a16="http://schemas.microsoft.com/office/drawing/2014/main" id="{7C9DED91-45F6-4308-A085-1EFACA6468CF}"/>
+                <a16:creationId xmlns:a16="http://schemas.microsoft.com/office/drawing/2014/main" xmlns="" id="{7C9DED91-45F6-4308-A085-1EFACA6468CF}"/>
               </a:ext>
             </a:extLst>
           </p:cNvPr>
@@ -23695,7 +23696,7 @@
           <p:cNvPr id="28" name="Content Placeholder 5">
             <a:extLst>
               <a:ext uri="{FF2B5EF4-FFF2-40B4-BE49-F238E27FC236}">
-                <a16:creationId xmlns="" xmlns:a16="http://schemas.microsoft.com/office/drawing/2014/main" id="{0574B5E7-B666-439B-9278-67BE1EA6EBC5}"/>
+                <a16:creationId xmlns:a16="http://schemas.microsoft.com/office/drawing/2014/main" xmlns="" id="{0574B5E7-B666-439B-9278-67BE1EA6EBC5}"/>
               </a:ext>
             </a:extLst>
           </p:cNvPr>
@@ -23801,11 +23802,11 @@
   <p:clrMapOvr>
     <a:masterClrMapping/>
   </p:clrMapOvr>
-  <mc:AlternateContent xmlns:mc="http://schemas.openxmlformats.org/markup-compatibility/2006">
-    <mc:Choice xmlns:p14="http://schemas.microsoft.com/office/powerpoint/2010/main" Requires="p14">
+  <mc:AlternateContent xmlns:mc="http://schemas.openxmlformats.org/markup-compatibility/2006" xmlns:p14="http://schemas.microsoft.com/office/powerpoint/2010/main">
+    <mc:Choice Requires="p14">
       <p:transition p14:dur="0"/>
     </mc:Choice>
-    <mc:Fallback>
+    <mc:Fallback xmlns="">
       <p:transition/>
     </mc:Fallback>
   </mc:AlternateContent>
@@ -23839,7 +23840,7 @@
           <p:cNvPr id="2" name="Title Placeholder 1">
             <a:extLst>
               <a:ext uri="{FF2B5EF4-FFF2-40B4-BE49-F238E27FC236}">
-                <a16:creationId xmlns="" xmlns:a16="http://schemas.microsoft.com/office/drawing/2014/main" id="{761B0E15-6FC5-434E-8780-B186D9DB0CD0}"/>
+                <a16:creationId xmlns:a16="http://schemas.microsoft.com/office/drawing/2014/main" xmlns="" id="{761B0E15-6FC5-434E-8780-B186D9DB0CD0}"/>
               </a:ext>
             </a:extLst>
           </p:cNvPr>
@@ -23878,7 +23879,7 @@
           <p:cNvPr id="3" name="Text Placeholder 2">
             <a:extLst>
               <a:ext uri="{FF2B5EF4-FFF2-40B4-BE49-F238E27FC236}">
-                <a16:creationId xmlns="" xmlns:a16="http://schemas.microsoft.com/office/drawing/2014/main" id="{A9C7B128-34F3-405C-B601-8BAFDB43499C}"/>
+                <a16:creationId xmlns:a16="http://schemas.microsoft.com/office/drawing/2014/main" xmlns="" id="{A9C7B128-34F3-405C-B601-8BAFDB43499C}"/>
               </a:ext>
             </a:extLst>
           </p:cNvPr>
@@ -23946,7 +23947,7 @@
           <p:cNvPr id="6" name="Slide Number Placeholder 5">
             <a:extLst>
               <a:ext uri="{FF2B5EF4-FFF2-40B4-BE49-F238E27FC236}">
-                <a16:creationId xmlns="" xmlns:a16="http://schemas.microsoft.com/office/drawing/2014/main" id="{9F5A7754-E8C7-438B-922D-9027C6CF58E2}"/>
+                <a16:creationId xmlns:a16="http://schemas.microsoft.com/office/drawing/2014/main" xmlns="" id="{9F5A7754-E8C7-438B-922D-9027C6CF58E2}"/>
               </a:ext>
             </a:extLst>
           </p:cNvPr>
@@ -23993,7 +23994,7 @@
           <p:cNvPr id="5" name="Rectangle 4">
             <a:extLst>
               <a:ext uri="{FF2B5EF4-FFF2-40B4-BE49-F238E27FC236}">
-                <a16:creationId xmlns="" xmlns:a16="http://schemas.microsoft.com/office/drawing/2014/main" id="{7CDDDB7D-9189-9548-A2B9-81DC62C3C1A3}"/>
+                <a16:creationId xmlns:a16="http://schemas.microsoft.com/office/drawing/2014/main" xmlns="" id="{7CDDDB7D-9189-9548-A2B9-81DC62C3C1A3}"/>
               </a:ext>
             </a:extLst>
           </p:cNvPr>
@@ -24047,7 +24048,7 @@
           <p:cNvPr id="7" name="Freeform: Shape 9">
             <a:extLst>
               <a:ext uri="{FF2B5EF4-FFF2-40B4-BE49-F238E27FC236}">
-                <a16:creationId xmlns="" xmlns:a16="http://schemas.microsoft.com/office/drawing/2014/main" id="{096D8877-6B4A-4540-8927-767DD7401718}"/>
+                <a16:creationId xmlns:a16="http://schemas.microsoft.com/office/drawing/2014/main" xmlns="" id="{096D8877-6B4A-4540-8927-767DD7401718}"/>
               </a:ext>
             </a:extLst>
           </p:cNvPr>
@@ -24170,7 +24171,7 @@
           <p:cNvPr id="8" name="Freeform: Shape 17">
             <a:extLst>
               <a:ext uri="{FF2B5EF4-FFF2-40B4-BE49-F238E27FC236}">
-                <a16:creationId xmlns="" xmlns:a16="http://schemas.microsoft.com/office/drawing/2014/main" id="{5AF2E123-FE0F-8541-8E36-5030C450AA7E}"/>
+                <a16:creationId xmlns:a16="http://schemas.microsoft.com/office/drawing/2014/main" xmlns="" id="{5AF2E123-FE0F-8541-8E36-5030C450AA7E}"/>
               </a:ext>
             </a:extLst>
           </p:cNvPr>
@@ -24322,7 +24323,7 @@
           <p:cNvPr id="9" name="Freeform: Shape 11">
             <a:extLst>
               <a:ext uri="{FF2B5EF4-FFF2-40B4-BE49-F238E27FC236}">
-                <a16:creationId xmlns="" xmlns:a16="http://schemas.microsoft.com/office/drawing/2014/main" id="{E5519D99-3B68-924A-9CD0-14B911711CA8}"/>
+                <a16:creationId xmlns:a16="http://schemas.microsoft.com/office/drawing/2014/main" xmlns="" id="{E5519D99-3B68-924A-9CD0-14B911711CA8}"/>
               </a:ext>
             </a:extLst>
           </p:cNvPr>
@@ -24472,7 +24473,7 @@
           <p:cNvPr id="10" name="Freeform: Shape 7">
             <a:extLst>
               <a:ext uri="{FF2B5EF4-FFF2-40B4-BE49-F238E27FC236}">
-                <a16:creationId xmlns="" xmlns:a16="http://schemas.microsoft.com/office/drawing/2014/main" id="{A09E21A9-FBEF-144C-A152-FE484F3C55C1}"/>
+                <a16:creationId xmlns:a16="http://schemas.microsoft.com/office/drawing/2014/main" xmlns="" id="{A09E21A9-FBEF-144C-A152-FE484F3C55C1}"/>
               </a:ext>
             </a:extLst>
           </p:cNvPr>
@@ -24618,7 +24619,7 @@
           <p:cNvPr id="11" name="Title 1">
             <a:extLst>
               <a:ext uri="{FF2B5EF4-FFF2-40B4-BE49-F238E27FC236}">
-                <a16:creationId xmlns="" xmlns:a16="http://schemas.microsoft.com/office/drawing/2014/main" id="{70C7F2CB-A8CE-1545-A08D-93592C4BAEEA}"/>
+                <a16:creationId xmlns:a16="http://schemas.microsoft.com/office/drawing/2014/main" xmlns="" id="{70C7F2CB-A8CE-1545-A08D-93592C4BAEEA}"/>
               </a:ext>
             </a:extLst>
           </p:cNvPr>
@@ -24674,7 +24675,7 @@
           <p:cNvPr id="12" name="Group 11">
             <a:extLst>
               <a:ext uri="{FF2B5EF4-FFF2-40B4-BE49-F238E27FC236}">
-                <a16:creationId xmlns="" xmlns:a16="http://schemas.microsoft.com/office/drawing/2014/main" id="{7068FCE4-1B47-3C4B-B091-013120A97D09}"/>
+                <a16:creationId xmlns:a16="http://schemas.microsoft.com/office/drawing/2014/main" xmlns="" id="{7068FCE4-1B47-3C4B-B091-013120A97D09}"/>
               </a:ext>
             </a:extLst>
           </p:cNvPr>
@@ -24694,7 +24695,7 @@
             <p:cNvPr id="13" name="Freeform: Shape 15">
               <a:extLst>
                 <a:ext uri="{FF2B5EF4-FFF2-40B4-BE49-F238E27FC236}">
-                  <a16:creationId xmlns="" xmlns:a16="http://schemas.microsoft.com/office/drawing/2014/main" id="{FEC3FDE7-F27E-5E4E-8752-287CAB7792D4}"/>
+                  <a16:creationId xmlns:a16="http://schemas.microsoft.com/office/drawing/2014/main" xmlns="" id="{FEC3FDE7-F27E-5E4E-8752-287CAB7792D4}"/>
                 </a:ext>
               </a:extLst>
             </p:cNvPr>
@@ -24784,7 +24785,7 @@
             <p:cNvPr id="14" name="Freeform: Shape 16">
               <a:extLst>
                 <a:ext uri="{FF2B5EF4-FFF2-40B4-BE49-F238E27FC236}">
-                  <a16:creationId xmlns="" xmlns:a16="http://schemas.microsoft.com/office/drawing/2014/main" id="{81C902DB-0D21-5044-82B6-9E7A70A1BF62}"/>
+                  <a16:creationId xmlns:a16="http://schemas.microsoft.com/office/drawing/2014/main" xmlns="" id="{81C902DB-0D21-5044-82B6-9E7A70A1BF62}"/>
                 </a:ext>
               </a:extLst>
             </p:cNvPr>
@@ -24883,7 +24884,7 @@
           <p:cNvPr id="15" name="Group 14">
             <a:extLst>
               <a:ext uri="{FF2B5EF4-FFF2-40B4-BE49-F238E27FC236}">
-                <a16:creationId xmlns="" xmlns:a16="http://schemas.microsoft.com/office/drawing/2014/main" id="{BE1E08A0-195D-694F-947B-986A76FBB93E}"/>
+                <a16:creationId xmlns:a16="http://schemas.microsoft.com/office/drawing/2014/main" xmlns="" id="{BE1E08A0-195D-694F-947B-986A76FBB93E}"/>
               </a:ext>
             </a:extLst>
           </p:cNvPr>
@@ -24903,7 +24904,7 @@
             <p:cNvPr id="16" name="Rectangle: Single Corner Snipped 18">
               <a:extLst>
                 <a:ext uri="{FF2B5EF4-FFF2-40B4-BE49-F238E27FC236}">
-                  <a16:creationId xmlns="" xmlns:a16="http://schemas.microsoft.com/office/drawing/2014/main" id="{ED5DFFCD-1EE3-E64E-B51F-BD7D72413E0B}"/>
+                  <a16:creationId xmlns:a16="http://schemas.microsoft.com/office/drawing/2014/main" xmlns="" id="{ED5DFFCD-1EE3-E64E-B51F-BD7D72413E0B}"/>
                 </a:ext>
               </a:extLst>
             </p:cNvPr>
@@ -24969,7 +24970,7 @@
             <p:cNvPr id="17" name="Rectangle: Single Corner Snipped 2">
               <a:extLst>
                 <a:ext uri="{FF2B5EF4-FFF2-40B4-BE49-F238E27FC236}">
-                  <a16:creationId xmlns="" xmlns:a16="http://schemas.microsoft.com/office/drawing/2014/main" id="{C12DB3CA-8E64-AA43-BFBE-A2CA9A816DBE}"/>
+                  <a16:creationId xmlns:a16="http://schemas.microsoft.com/office/drawing/2014/main" xmlns="" id="{C12DB3CA-8E64-AA43-BFBE-A2CA9A816DBE}"/>
                 </a:ext>
               </a:extLst>
             </p:cNvPr>
@@ -25026,7 +25027,7 @@
           <p:cNvPr id="18" name="Freeform: Shape 23">
             <a:extLst>
               <a:ext uri="{FF2B5EF4-FFF2-40B4-BE49-F238E27FC236}">
-                <a16:creationId xmlns="" xmlns:a16="http://schemas.microsoft.com/office/drawing/2014/main" id="{A587DEFD-D470-4142-8E0D-A71DDB147C92}"/>
+                <a16:creationId xmlns:a16="http://schemas.microsoft.com/office/drawing/2014/main" xmlns="" id="{A587DEFD-D470-4142-8E0D-A71DDB147C92}"/>
               </a:ext>
             </a:extLst>
           </p:cNvPr>
@@ -25121,7 +25122,7 @@
           <p:cNvPr id="19" name="Slide Number Placeholder 4">
             <a:extLst>
               <a:ext uri="{FF2B5EF4-FFF2-40B4-BE49-F238E27FC236}">
-                <a16:creationId xmlns="" xmlns:a16="http://schemas.microsoft.com/office/drawing/2014/main" id="{7D9BF857-7910-734D-A217-5E3344220AA2}"/>
+                <a16:creationId xmlns:a16="http://schemas.microsoft.com/office/drawing/2014/main" xmlns="" id="{7D9BF857-7910-734D-A217-5E3344220AA2}"/>
               </a:ext>
             </a:extLst>
           </p:cNvPr>
@@ -25274,11 +25275,11 @@
     <p:sldLayoutId id="2147483667" r:id="rId17"/>
     <p:sldLayoutId id="2147483668" r:id="rId18"/>
   </p:sldLayoutIdLst>
-  <mc:AlternateContent xmlns:mc="http://schemas.openxmlformats.org/markup-compatibility/2006">
-    <mc:Choice xmlns:p14="http://schemas.microsoft.com/office/powerpoint/2010/main" Requires="p14">
+  <mc:AlternateContent xmlns:mc="http://schemas.openxmlformats.org/markup-compatibility/2006" xmlns:p14="http://schemas.microsoft.com/office/powerpoint/2010/main">
+    <mc:Choice Requires="p14">
       <p:transition p14:dur="0"/>
     </mc:Choice>
-    <mc:Fallback>
+    <mc:Fallback xmlns="">
       <p:transition/>
     </mc:Fallback>
   </mc:AlternateContent>
@@ -25647,7 +25648,7 @@
           <p:cNvPr id="2" name="Title 1">
             <a:extLst>
               <a:ext uri="{FF2B5EF4-FFF2-40B4-BE49-F238E27FC236}">
-                <a16:creationId xmlns="" xmlns:a16="http://schemas.microsoft.com/office/drawing/2014/main" id="{632BE5BF-9922-45FB-8F3F-4446D40A051B}"/>
+                <a16:creationId xmlns:a16="http://schemas.microsoft.com/office/drawing/2014/main" xmlns="" id="{632BE5BF-9922-45FB-8F3F-4446D40A051B}"/>
               </a:ext>
             </a:extLst>
           </p:cNvPr>
@@ -25689,7 +25690,7 @@
           <p:cNvPr id="3" name="Subtitle 2">
             <a:extLst>
               <a:ext uri="{FF2B5EF4-FFF2-40B4-BE49-F238E27FC236}">
-                <a16:creationId xmlns="" xmlns:a16="http://schemas.microsoft.com/office/drawing/2014/main" id="{0D537F64-4C96-4AA8-BB21-E8053A3186DD}"/>
+                <a16:creationId xmlns:a16="http://schemas.microsoft.com/office/drawing/2014/main" xmlns="" id="{0D537F64-4C96-4AA8-BB21-E8053A3186DD}"/>
               </a:ext>
             </a:extLst>
           </p:cNvPr>
@@ -25775,11 +25776,11 @@
   <p:clrMapOvr>
     <a:masterClrMapping/>
   </p:clrMapOvr>
-  <mc:AlternateContent xmlns:mc="http://schemas.openxmlformats.org/markup-compatibility/2006">
-    <mc:Choice xmlns:p14="http://schemas.microsoft.com/office/powerpoint/2010/main" Requires="p14">
+  <mc:AlternateContent xmlns:mc="http://schemas.openxmlformats.org/markup-compatibility/2006" xmlns:p14="http://schemas.microsoft.com/office/powerpoint/2010/main">
+    <mc:Choice Requires="p14">
       <p:transition p14:dur="0"/>
     </mc:Choice>
-    <mc:Fallback>
+    <mc:Fallback xmlns="">
       <p:transition/>
     </mc:Fallback>
   </mc:AlternateContent>
@@ -25815,7 +25816,7 @@
           <p:cNvPr id="4" name="Title 3">
             <a:extLst>
               <a:ext uri="{FF2B5EF4-FFF2-40B4-BE49-F238E27FC236}">
-                <a16:creationId xmlns="" xmlns:a16="http://schemas.microsoft.com/office/drawing/2014/main" id="{E3BD8413-C238-49D7-A4E1-E8FEF1811A0E}"/>
+                <a16:creationId xmlns:a16="http://schemas.microsoft.com/office/drawing/2014/main" xmlns="" id="{E3BD8413-C238-49D7-A4E1-E8FEF1811A0E}"/>
               </a:ext>
             </a:extLst>
           </p:cNvPr>
@@ -25846,7 +25847,7 @@
           <p:cNvPr id="2" name="Slide Number Placeholder 1">
             <a:extLst>
               <a:ext uri="{FF2B5EF4-FFF2-40B4-BE49-F238E27FC236}">
-                <a16:creationId xmlns="" xmlns:a16="http://schemas.microsoft.com/office/drawing/2014/main" id="{0B24BF10-2B55-43AB-9F77-F1A1410384A9}"/>
+                <a16:creationId xmlns:a16="http://schemas.microsoft.com/office/drawing/2014/main" xmlns="" id="{0B24BF10-2B55-43AB-9F77-F1A1410384A9}"/>
               </a:ext>
             </a:extLst>
           </p:cNvPr>
@@ -25900,11 +25901,11 @@
   <p:clrMapOvr>
     <a:masterClrMapping/>
   </p:clrMapOvr>
-  <mc:AlternateContent xmlns:mc="http://schemas.openxmlformats.org/markup-compatibility/2006">
-    <mc:Choice xmlns:p14="http://schemas.microsoft.com/office/powerpoint/2010/main" Requires="p14">
+  <mc:AlternateContent xmlns:mc="http://schemas.openxmlformats.org/markup-compatibility/2006" xmlns:p14="http://schemas.microsoft.com/office/powerpoint/2010/main">
+    <mc:Choice Requires="p14">
       <p:transition p14:dur="0"/>
     </mc:Choice>
-    <mc:Fallback>
+    <mc:Fallback xmlns="">
       <p:transition/>
     </mc:Fallback>
   </mc:AlternateContent>
@@ -25940,7 +25941,7 @@
           <p:cNvPr id="4" name="Title 3">
             <a:extLst>
               <a:ext uri="{FF2B5EF4-FFF2-40B4-BE49-F238E27FC236}">
-                <a16:creationId xmlns="" xmlns:a16="http://schemas.microsoft.com/office/drawing/2014/main" id="{315E3981-F0D7-482C-A8E0-6A57700BECA7}"/>
+                <a16:creationId xmlns:a16="http://schemas.microsoft.com/office/drawing/2014/main" xmlns="" id="{315E3981-F0D7-482C-A8E0-6A57700BECA7}"/>
               </a:ext>
             </a:extLst>
           </p:cNvPr>
@@ -25969,7 +25970,7 @@
           <p:cNvPr id="21" name="Text Placeholder 20">
             <a:extLst>
               <a:ext uri="{FF2B5EF4-FFF2-40B4-BE49-F238E27FC236}">
-                <a16:creationId xmlns="" xmlns:a16="http://schemas.microsoft.com/office/drawing/2014/main" id="{1B8F0371-4F69-4131-91BF-9AB99E6EE89B}"/>
+                <a16:creationId xmlns:a16="http://schemas.microsoft.com/office/drawing/2014/main" xmlns="" id="{1B8F0371-4F69-4131-91BF-9AB99E6EE89B}"/>
               </a:ext>
             </a:extLst>
           </p:cNvPr>
@@ -25997,7 +25998,7 @@
           <p:cNvPr id="22" name="Text Placeholder 21">
             <a:extLst>
               <a:ext uri="{FF2B5EF4-FFF2-40B4-BE49-F238E27FC236}">
-                <a16:creationId xmlns="" xmlns:a16="http://schemas.microsoft.com/office/drawing/2014/main" id="{78CACAF1-61EA-4605-A8FE-2EEE752B49FF}"/>
+                <a16:creationId xmlns:a16="http://schemas.microsoft.com/office/drawing/2014/main" xmlns="" id="{78CACAF1-61EA-4605-A8FE-2EEE752B49FF}"/>
               </a:ext>
             </a:extLst>
           </p:cNvPr>
@@ -26025,7 +26026,7 @@
           <p:cNvPr id="2" name="Slide Number Placeholder 1">
             <a:extLst>
               <a:ext uri="{FF2B5EF4-FFF2-40B4-BE49-F238E27FC236}">
-                <a16:creationId xmlns="" xmlns:a16="http://schemas.microsoft.com/office/drawing/2014/main" id="{2F478C69-0A1D-45FF-8600-ED903803FFE1}"/>
+                <a16:creationId xmlns:a16="http://schemas.microsoft.com/office/drawing/2014/main" xmlns="" id="{2F478C69-0A1D-45FF-8600-ED903803FFE1}"/>
               </a:ext>
             </a:extLst>
           </p:cNvPr>
@@ -26060,11 +26061,11 @@
   <p:clrMapOvr>
     <a:masterClrMapping/>
   </p:clrMapOvr>
-  <mc:AlternateContent xmlns:mc="http://schemas.openxmlformats.org/markup-compatibility/2006">
-    <mc:Choice xmlns:p14="http://schemas.microsoft.com/office/powerpoint/2010/main" Requires="p14">
+  <mc:AlternateContent xmlns:mc="http://schemas.openxmlformats.org/markup-compatibility/2006" xmlns:p14="http://schemas.microsoft.com/office/powerpoint/2010/main">
+    <mc:Choice Requires="p14">
       <p:transition p14:dur="0"/>
     </mc:Choice>
-    <mc:Fallback>
+    <mc:Fallback xmlns="">
       <p:transition/>
     </mc:Fallback>
   </mc:AlternateContent>
@@ -26100,7 +26101,7 @@
           <p:cNvPr id="7" name="Title 6">
             <a:extLst>
               <a:ext uri="{FF2B5EF4-FFF2-40B4-BE49-F238E27FC236}">
-                <a16:creationId xmlns="" xmlns:a16="http://schemas.microsoft.com/office/drawing/2014/main" id="{7875C19A-1AAE-476A-A316-A2CF92D763D3}"/>
+                <a16:creationId xmlns:a16="http://schemas.microsoft.com/office/drawing/2014/main" xmlns="" id="{7875C19A-1AAE-476A-A316-A2CF92D763D3}"/>
               </a:ext>
             </a:extLst>
           </p:cNvPr>
@@ -26129,7 +26130,7 @@
           <p:cNvPr id="2" name="Slide Number Placeholder 1">
             <a:extLst>
               <a:ext uri="{FF2B5EF4-FFF2-40B4-BE49-F238E27FC236}">
-                <a16:creationId xmlns="" xmlns:a16="http://schemas.microsoft.com/office/drawing/2014/main" id="{BE9800F6-D571-48C4-8466-12AA1ADB6599}"/>
+                <a16:creationId xmlns:a16="http://schemas.microsoft.com/office/drawing/2014/main" xmlns="" id="{BE9800F6-D571-48C4-8466-12AA1ADB6599}"/>
               </a:ext>
             </a:extLst>
           </p:cNvPr>
@@ -26164,11 +26165,11 @@
   <p:clrMapOvr>
     <a:masterClrMapping/>
   </p:clrMapOvr>
-  <mc:AlternateContent xmlns:mc="http://schemas.openxmlformats.org/markup-compatibility/2006">
-    <mc:Choice xmlns:p14="http://schemas.microsoft.com/office/powerpoint/2010/main" Requires="p14">
+  <mc:AlternateContent xmlns:mc="http://schemas.openxmlformats.org/markup-compatibility/2006" xmlns:p14="http://schemas.microsoft.com/office/powerpoint/2010/main">
+    <mc:Choice Requires="p14">
       <p:transition p14:dur="0"/>
     </mc:Choice>
-    <mc:Fallback>
+    <mc:Fallback xmlns="">
       <p:transition/>
     </mc:Fallback>
   </mc:AlternateContent>
@@ -26204,7 +26205,7 @@
           <p:cNvPr id="7" name="Title 6">
             <a:extLst>
               <a:ext uri="{FF2B5EF4-FFF2-40B4-BE49-F238E27FC236}">
-                <a16:creationId xmlns="" xmlns:a16="http://schemas.microsoft.com/office/drawing/2014/main" id="{7875C19A-1AAE-476A-A316-A2CF92D763D3}"/>
+                <a16:creationId xmlns:a16="http://schemas.microsoft.com/office/drawing/2014/main" xmlns="" id="{7875C19A-1AAE-476A-A316-A2CF92D763D3}"/>
               </a:ext>
             </a:extLst>
           </p:cNvPr>
@@ -26233,7 +26234,7 @@
           <p:cNvPr id="2" name="Slide Number Placeholder 1">
             <a:extLst>
               <a:ext uri="{FF2B5EF4-FFF2-40B4-BE49-F238E27FC236}">
-                <a16:creationId xmlns="" xmlns:a16="http://schemas.microsoft.com/office/drawing/2014/main" id="{BE9800F6-D571-48C4-8466-12AA1ADB6599}"/>
+                <a16:creationId xmlns:a16="http://schemas.microsoft.com/office/drawing/2014/main" xmlns="" id="{BE9800F6-D571-48C4-8466-12AA1ADB6599}"/>
               </a:ext>
             </a:extLst>
           </p:cNvPr>
@@ -26268,11 +26269,11 @@
   <p:clrMapOvr>
     <a:masterClrMapping/>
   </p:clrMapOvr>
-  <mc:AlternateContent xmlns:mc="http://schemas.openxmlformats.org/markup-compatibility/2006">
-    <mc:Choice xmlns:p14="http://schemas.microsoft.com/office/powerpoint/2010/main" Requires="p14">
+  <mc:AlternateContent xmlns:mc="http://schemas.openxmlformats.org/markup-compatibility/2006" xmlns:p14="http://schemas.microsoft.com/office/powerpoint/2010/main">
+    <mc:Choice Requires="p14">
       <p:transition p14:dur="0"/>
     </mc:Choice>
-    <mc:Fallback>
+    <mc:Fallback xmlns="">
       <p:transition/>
     </mc:Fallback>
   </mc:AlternateContent>
@@ -26308,7 +26309,7 @@
           <p:cNvPr id="5" name="Title 4">
             <a:extLst>
               <a:ext uri="{FF2B5EF4-FFF2-40B4-BE49-F238E27FC236}">
-                <a16:creationId xmlns="" xmlns:a16="http://schemas.microsoft.com/office/drawing/2014/main" id="{201323FB-427E-4A8D-B473-AB0657D8D23B}"/>
+                <a16:creationId xmlns:a16="http://schemas.microsoft.com/office/drawing/2014/main" xmlns="" id="{201323FB-427E-4A8D-B473-AB0657D8D23B}"/>
               </a:ext>
             </a:extLst>
           </p:cNvPr>
@@ -26349,7 +26350,7 @@
           <p:cNvPr id="6" name="Table 5">
             <a:extLst>
               <a:ext uri="{FF2B5EF4-FFF2-40B4-BE49-F238E27FC236}">
-                <a16:creationId xmlns="" xmlns:a16="http://schemas.microsoft.com/office/drawing/2014/main" id="{E8EEB296-8554-4D20-B3B8-C0BBC380A58D}"/>
+                <a16:creationId xmlns:a16="http://schemas.microsoft.com/office/drawing/2014/main" xmlns="" id="{E8EEB296-8554-4D20-B3B8-C0BBC380A58D}"/>
               </a:ext>
             </a:extLst>
           </p:cNvPr>
@@ -26359,7 +26360,7 @@
           <p:nvPr>
             <p:extLst>
               <p:ext uri="{D42A27DB-BD31-4B8C-83A1-F6EECF244321}">
-                <p14:modId xmlns:p14="http://schemas.microsoft.com/office/powerpoint/2010/main" val="2954137347"/>
+                <p14:modId xmlns:p14="http://schemas.microsoft.com/office/powerpoint/2010/main" val="2794092734"/>
               </p:ext>
             </p:extLst>
           </p:nvPr>
@@ -26378,14 +26379,14 @@
                 <a:gridCol w="3015392">
                   <a:extLst>
                     <a:ext uri="{9D8B030D-6E8A-4147-A177-3AD203B41FA5}">
-                      <a16:colId xmlns="" xmlns:a16="http://schemas.microsoft.com/office/drawing/2014/main" val="3559833401"/>
+                      <a16:colId xmlns:a16="http://schemas.microsoft.com/office/drawing/2014/main" xmlns="" val="3559833401"/>
                     </a:ext>
                   </a:extLst>
                 </a:gridCol>
                 <a:gridCol w="6987746">
                   <a:extLst>
                     <a:ext uri="{9D8B030D-6E8A-4147-A177-3AD203B41FA5}">
-                      <a16:colId xmlns="" xmlns:a16="http://schemas.microsoft.com/office/drawing/2014/main" val="82523989"/>
+                      <a16:colId xmlns:a16="http://schemas.microsoft.com/office/drawing/2014/main" xmlns="" val="82523989"/>
                     </a:ext>
                   </a:extLst>
                 </a:gridCol>
@@ -26398,11 +26399,11 @@
                     <a:p>
                       <a:pPr algn="ctr"/>
                       <a:r>
-                        <a:rPr lang="en-US" sz="1600" b="0" dirty="0">
+                        <a:rPr lang="en-US" sz="1600" b="0" dirty="0" err="1" smtClean="0">
                           <a:latin typeface="+mn-lt"/>
                           <a:cs typeface="Arial" panose="020B0604020202020204" pitchFamily="34" charset="0"/>
                         </a:rPr>
-                        <a:t>Title</a:t>
+                        <a:t>Parâmetro</a:t>
                       </a:r>
                       <a:endParaRPr lang="en-GB" sz="1600" b="0" dirty="0">
                         <a:latin typeface="+mn-lt"/>
@@ -26485,11 +26486,11 @@
                         <a:defRPr/>
                       </a:pPr>
                       <a:r>
-                        <a:rPr lang="en-US" sz="1600" b="0" dirty="0">
+                        <a:rPr lang="en-US" sz="1600" b="0" dirty="0" err="1" smtClean="0">
                           <a:latin typeface="+mn-lt"/>
                           <a:cs typeface="Arial" panose="020B0604020202020204" pitchFamily="34" charset="0"/>
                         </a:rPr>
-                        <a:t>Title</a:t>
+                        <a:t>Formato</a:t>
                       </a:r>
                       <a:endParaRPr lang="en-GB" sz="1600" b="0" dirty="0">
                         <a:latin typeface="+mn-lt"/>
@@ -26555,7 +26556,7 @@
                 </a:tc>
                 <a:extLst>
                   <a:ext uri="{0D108BD9-81ED-4DB2-BD59-A6C34878D82A}">
-                    <a16:rowId xmlns="" xmlns:a16="http://schemas.microsoft.com/office/drawing/2014/main" val="3766630617"/>
+                    <a16:rowId xmlns:a16="http://schemas.microsoft.com/office/drawing/2014/main" xmlns="" val="3766630617"/>
                   </a:ext>
                 </a:extLst>
               </a:tr>
@@ -26674,7 +26675,7 @@
                 </a:tc>
                 <a:extLst>
                   <a:ext uri="{0D108BD9-81ED-4DB2-BD59-A6C34878D82A}">
-                    <a16:rowId xmlns="" xmlns:a16="http://schemas.microsoft.com/office/drawing/2014/main" val="3446274366"/>
+                    <a16:rowId xmlns:a16="http://schemas.microsoft.com/office/drawing/2014/main" xmlns="" val="3446274366"/>
                   </a:ext>
                 </a:extLst>
               </a:tr>
@@ -26797,7 +26798,7 @@
                 </a:tc>
                 <a:extLst>
                   <a:ext uri="{0D108BD9-81ED-4DB2-BD59-A6C34878D82A}">
-                    <a16:rowId xmlns="" xmlns:a16="http://schemas.microsoft.com/office/drawing/2014/main" val="1758271508"/>
+                    <a16:rowId xmlns:a16="http://schemas.microsoft.com/office/drawing/2014/main" xmlns="" val="1758271508"/>
                   </a:ext>
                 </a:extLst>
               </a:tr>
@@ -26916,7 +26917,7 @@
                 </a:tc>
                 <a:extLst>
                   <a:ext uri="{0D108BD9-81ED-4DB2-BD59-A6C34878D82A}">
-                    <a16:rowId xmlns="" xmlns:a16="http://schemas.microsoft.com/office/drawing/2014/main" val="3736384641"/>
+                    <a16:rowId xmlns:a16="http://schemas.microsoft.com/office/drawing/2014/main" xmlns="" val="3736384641"/>
                   </a:ext>
                 </a:extLst>
               </a:tr>
@@ -27039,7 +27040,7 @@
                 </a:tc>
                 <a:extLst>
                   <a:ext uri="{0D108BD9-81ED-4DB2-BD59-A6C34878D82A}">
-                    <a16:rowId xmlns="" xmlns:a16="http://schemas.microsoft.com/office/drawing/2014/main" val="3090935587"/>
+                    <a16:rowId xmlns:a16="http://schemas.microsoft.com/office/drawing/2014/main" xmlns="" val="3090935587"/>
                   </a:ext>
                 </a:extLst>
               </a:tr>
@@ -27158,7 +27159,7 @@
                 </a:tc>
                 <a:extLst>
                   <a:ext uri="{0D108BD9-81ED-4DB2-BD59-A6C34878D82A}">
-                    <a16:rowId xmlns="" xmlns:a16="http://schemas.microsoft.com/office/drawing/2014/main" val="446909641"/>
+                    <a16:rowId xmlns:a16="http://schemas.microsoft.com/office/drawing/2014/main" xmlns="" val="446909641"/>
                   </a:ext>
                 </a:extLst>
               </a:tr>
@@ -27281,7 +27282,7 @@
                 </a:tc>
                 <a:extLst>
                   <a:ext uri="{0D108BD9-81ED-4DB2-BD59-A6C34878D82A}">
-                    <a16:rowId xmlns="" xmlns:a16="http://schemas.microsoft.com/office/drawing/2014/main" val="3472044516"/>
+                    <a16:rowId xmlns:a16="http://schemas.microsoft.com/office/drawing/2014/main" xmlns="" val="3472044516"/>
                   </a:ext>
                 </a:extLst>
               </a:tr>
@@ -27294,7 +27295,7 @@
           <p:cNvPr id="2" name="Slide Number Placeholder 1">
             <a:extLst>
               <a:ext uri="{FF2B5EF4-FFF2-40B4-BE49-F238E27FC236}">
-                <a16:creationId xmlns="" xmlns:a16="http://schemas.microsoft.com/office/drawing/2014/main" id="{E4398C1C-6656-4A73-A680-62A81CDC27FD}"/>
+                <a16:creationId xmlns:a16="http://schemas.microsoft.com/office/drawing/2014/main" xmlns="" id="{E4398C1C-6656-4A73-A680-62A81CDC27FD}"/>
               </a:ext>
             </a:extLst>
           </p:cNvPr>
@@ -27329,11 +27330,11 @@
   <p:clrMapOvr>
     <a:masterClrMapping/>
   </p:clrMapOvr>
-  <mc:AlternateContent xmlns:mc="http://schemas.openxmlformats.org/markup-compatibility/2006">
-    <mc:Choice xmlns:p14="http://schemas.microsoft.com/office/powerpoint/2010/main" Requires="p14">
+  <mc:AlternateContent xmlns:mc="http://schemas.openxmlformats.org/markup-compatibility/2006" xmlns:p14="http://schemas.microsoft.com/office/powerpoint/2010/main">
+    <mc:Choice Requires="p14">
       <p:transition p14:dur="0"/>
     </mc:Choice>
-    <mc:Fallback>
+    <mc:Fallback xmlns="">
       <p:transition/>
     </mc:Fallback>
   </mc:AlternateContent>
@@ -27369,7 +27370,7 @@
           <p:cNvPr id="5" name="Title 4">
             <a:extLst>
               <a:ext uri="{FF2B5EF4-FFF2-40B4-BE49-F238E27FC236}">
-                <a16:creationId xmlns="" xmlns:a16="http://schemas.microsoft.com/office/drawing/2014/main" id="{201323FB-427E-4A8D-B473-AB0657D8D23B}"/>
+                <a16:creationId xmlns:a16="http://schemas.microsoft.com/office/drawing/2014/main" xmlns="" id="{201323FB-427E-4A8D-B473-AB0657D8D23B}"/>
               </a:ext>
             </a:extLst>
           </p:cNvPr>
@@ -27410,7 +27411,7 @@
           <p:cNvPr id="6" name="Table 5">
             <a:extLst>
               <a:ext uri="{FF2B5EF4-FFF2-40B4-BE49-F238E27FC236}">
-                <a16:creationId xmlns="" xmlns:a16="http://schemas.microsoft.com/office/drawing/2014/main" id="{E8EEB296-8554-4D20-B3B8-C0BBC380A58D}"/>
+                <a16:creationId xmlns:a16="http://schemas.microsoft.com/office/drawing/2014/main" xmlns="" id="{E8EEB296-8554-4D20-B3B8-C0BBC380A58D}"/>
               </a:ext>
             </a:extLst>
           </p:cNvPr>
@@ -27420,7 +27421,7 @@
           <p:nvPr>
             <p:extLst>
               <p:ext uri="{D42A27DB-BD31-4B8C-83A1-F6EECF244321}">
-                <p14:modId xmlns:p14="http://schemas.microsoft.com/office/powerpoint/2010/main" val="2954137347"/>
+                <p14:modId xmlns:p14="http://schemas.microsoft.com/office/powerpoint/2010/main" val="626844047"/>
               </p:ext>
             </p:extLst>
           </p:nvPr>
@@ -27439,14 +27440,14 @@
                 <a:gridCol w="3015392">
                   <a:extLst>
                     <a:ext uri="{9D8B030D-6E8A-4147-A177-3AD203B41FA5}">
-                      <a16:colId xmlns="" xmlns:a16="http://schemas.microsoft.com/office/drawing/2014/main" val="3559833401"/>
+                      <a16:colId xmlns:a16="http://schemas.microsoft.com/office/drawing/2014/main" xmlns="" val="3559833401"/>
                     </a:ext>
                   </a:extLst>
                 </a:gridCol>
                 <a:gridCol w="6987746">
                   <a:extLst>
                     <a:ext uri="{9D8B030D-6E8A-4147-A177-3AD203B41FA5}">
-                      <a16:colId xmlns="" xmlns:a16="http://schemas.microsoft.com/office/drawing/2014/main" val="82523989"/>
+                      <a16:colId xmlns:a16="http://schemas.microsoft.com/office/drawing/2014/main" xmlns="" val="82523989"/>
                     </a:ext>
                   </a:extLst>
                 </a:gridCol>
@@ -27459,11 +27460,11 @@
                     <a:p>
                       <a:pPr algn="ctr"/>
                       <a:r>
-                        <a:rPr lang="en-US" sz="1600" b="0" dirty="0">
+                        <a:rPr lang="en-US" sz="1600" b="0" dirty="0" err="1" smtClean="0">
                           <a:latin typeface="+mn-lt"/>
                           <a:cs typeface="Arial" panose="020B0604020202020204" pitchFamily="34" charset="0"/>
                         </a:rPr>
-                        <a:t>Title</a:t>
+                        <a:t>Parâmetro</a:t>
                       </a:r>
                       <a:endParaRPr lang="en-GB" sz="1600" b="0" dirty="0">
                         <a:latin typeface="+mn-lt"/>
@@ -27546,11 +27547,11 @@
                         <a:defRPr/>
                       </a:pPr>
                       <a:r>
-                        <a:rPr lang="en-US" sz="1600" b="0" dirty="0">
+                        <a:rPr lang="en-US" sz="1600" b="0" dirty="0" err="1" smtClean="0">
                           <a:latin typeface="+mn-lt"/>
                           <a:cs typeface="Arial" panose="020B0604020202020204" pitchFamily="34" charset="0"/>
                         </a:rPr>
-                        <a:t>Title</a:t>
+                        <a:t>Formato</a:t>
                       </a:r>
                       <a:endParaRPr lang="en-GB" sz="1600" b="0" dirty="0">
                         <a:latin typeface="+mn-lt"/>
@@ -27616,7 +27617,7 @@
                 </a:tc>
                 <a:extLst>
                   <a:ext uri="{0D108BD9-81ED-4DB2-BD59-A6C34878D82A}">
-                    <a16:rowId xmlns="" xmlns:a16="http://schemas.microsoft.com/office/drawing/2014/main" val="3766630617"/>
+                    <a16:rowId xmlns:a16="http://schemas.microsoft.com/office/drawing/2014/main" xmlns="" val="3766630617"/>
                   </a:ext>
                 </a:extLst>
               </a:tr>
@@ -27735,7 +27736,7 @@
                 </a:tc>
                 <a:extLst>
                   <a:ext uri="{0D108BD9-81ED-4DB2-BD59-A6C34878D82A}">
-                    <a16:rowId xmlns="" xmlns:a16="http://schemas.microsoft.com/office/drawing/2014/main" val="3446274366"/>
+                    <a16:rowId xmlns:a16="http://schemas.microsoft.com/office/drawing/2014/main" xmlns="" val="3446274366"/>
                   </a:ext>
                 </a:extLst>
               </a:tr>
@@ -27858,7 +27859,7 @@
                 </a:tc>
                 <a:extLst>
                   <a:ext uri="{0D108BD9-81ED-4DB2-BD59-A6C34878D82A}">
-                    <a16:rowId xmlns="" xmlns:a16="http://schemas.microsoft.com/office/drawing/2014/main" val="1758271508"/>
+                    <a16:rowId xmlns:a16="http://schemas.microsoft.com/office/drawing/2014/main" xmlns="" val="1758271508"/>
                   </a:ext>
                 </a:extLst>
               </a:tr>
@@ -27977,7 +27978,7 @@
                 </a:tc>
                 <a:extLst>
                   <a:ext uri="{0D108BD9-81ED-4DB2-BD59-A6C34878D82A}">
-                    <a16:rowId xmlns="" xmlns:a16="http://schemas.microsoft.com/office/drawing/2014/main" val="3736384641"/>
+                    <a16:rowId xmlns:a16="http://schemas.microsoft.com/office/drawing/2014/main" xmlns="" val="3736384641"/>
                   </a:ext>
                 </a:extLst>
               </a:tr>
@@ -28100,7 +28101,7 @@
                 </a:tc>
                 <a:extLst>
                   <a:ext uri="{0D108BD9-81ED-4DB2-BD59-A6C34878D82A}">
-                    <a16:rowId xmlns="" xmlns:a16="http://schemas.microsoft.com/office/drawing/2014/main" val="3090935587"/>
+                    <a16:rowId xmlns:a16="http://schemas.microsoft.com/office/drawing/2014/main" xmlns="" val="3090935587"/>
                   </a:ext>
                 </a:extLst>
               </a:tr>
@@ -28219,7 +28220,7 @@
                 </a:tc>
                 <a:extLst>
                   <a:ext uri="{0D108BD9-81ED-4DB2-BD59-A6C34878D82A}">
-                    <a16:rowId xmlns="" xmlns:a16="http://schemas.microsoft.com/office/drawing/2014/main" val="446909641"/>
+                    <a16:rowId xmlns:a16="http://schemas.microsoft.com/office/drawing/2014/main" xmlns="" val="446909641"/>
                   </a:ext>
                 </a:extLst>
               </a:tr>
@@ -28342,7 +28343,7 @@
                 </a:tc>
                 <a:extLst>
                   <a:ext uri="{0D108BD9-81ED-4DB2-BD59-A6C34878D82A}">
-                    <a16:rowId xmlns="" xmlns:a16="http://schemas.microsoft.com/office/drawing/2014/main" val="3472044516"/>
+                    <a16:rowId xmlns:a16="http://schemas.microsoft.com/office/drawing/2014/main" xmlns="" val="3472044516"/>
                   </a:ext>
                 </a:extLst>
               </a:tr>
@@ -28355,7 +28356,7 @@
           <p:cNvPr id="2" name="Slide Number Placeholder 1">
             <a:extLst>
               <a:ext uri="{FF2B5EF4-FFF2-40B4-BE49-F238E27FC236}">
-                <a16:creationId xmlns="" xmlns:a16="http://schemas.microsoft.com/office/drawing/2014/main" id="{E4398C1C-6656-4A73-A680-62A81CDC27FD}"/>
+                <a16:creationId xmlns:a16="http://schemas.microsoft.com/office/drawing/2014/main" xmlns="" id="{E4398C1C-6656-4A73-A680-62A81CDC27FD}"/>
               </a:ext>
             </a:extLst>
           </p:cNvPr>
@@ -28390,11 +28391,11 @@
   <p:clrMapOvr>
     <a:masterClrMapping/>
   </p:clrMapOvr>
-  <mc:AlternateContent xmlns:mc="http://schemas.openxmlformats.org/markup-compatibility/2006">
-    <mc:Choice xmlns:p14="http://schemas.microsoft.com/office/powerpoint/2010/main" Requires="p14">
+  <mc:AlternateContent xmlns:mc="http://schemas.openxmlformats.org/markup-compatibility/2006" xmlns:p14="http://schemas.microsoft.com/office/powerpoint/2010/main">
+    <mc:Choice Requires="p14">
       <p:transition p14:dur="0"/>
     </mc:Choice>
-    <mc:Fallback>
+    <mc:Fallback xmlns="">
       <p:transition/>
     </mc:Fallback>
   </mc:AlternateContent>
@@ -28430,7 +28431,7 @@
           <p:cNvPr id="4" name="Title 3">
             <a:extLst>
               <a:ext uri="{FF2B5EF4-FFF2-40B4-BE49-F238E27FC236}">
-                <a16:creationId xmlns="" xmlns:a16="http://schemas.microsoft.com/office/drawing/2014/main" id="{E3BD8413-C238-49D7-A4E1-E8FEF1811A0E}"/>
+                <a16:creationId xmlns:a16="http://schemas.microsoft.com/office/drawing/2014/main" xmlns="" id="{E3BD8413-C238-49D7-A4E1-E8FEF1811A0E}"/>
               </a:ext>
             </a:extLst>
           </p:cNvPr>
@@ -28459,7 +28460,7 @@
           <p:cNvPr id="2" name="Slide Number Placeholder 1">
             <a:extLst>
               <a:ext uri="{FF2B5EF4-FFF2-40B4-BE49-F238E27FC236}">
-                <a16:creationId xmlns="" xmlns:a16="http://schemas.microsoft.com/office/drawing/2014/main" id="{0B24BF10-2B55-43AB-9F77-F1A1410384A9}"/>
+                <a16:creationId xmlns:a16="http://schemas.microsoft.com/office/drawing/2014/main" xmlns="" id="{0B24BF10-2B55-43AB-9F77-F1A1410384A9}"/>
               </a:ext>
             </a:extLst>
           </p:cNvPr>
@@ -28513,11 +28514,11 @@
   <p:clrMapOvr>
     <a:masterClrMapping/>
   </p:clrMapOvr>
-  <mc:AlternateContent xmlns:mc="http://schemas.openxmlformats.org/markup-compatibility/2006">
-    <mc:Choice xmlns:p14="http://schemas.microsoft.com/office/powerpoint/2010/main" Requires="p14">
+  <mc:AlternateContent xmlns:mc="http://schemas.openxmlformats.org/markup-compatibility/2006" xmlns:p14="http://schemas.microsoft.com/office/powerpoint/2010/main">
+    <mc:Choice Requires="p14">
       <p:transition p14:dur="0"/>
     </mc:Choice>
-    <mc:Fallback>
+    <mc:Fallback xmlns="">
       <p:transition/>
     </mc:Fallback>
   </mc:AlternateContent>
@@ -28553,7 +28554,7 @@
           <p:cNvPr id="7" name="Title 6">
             <a:extLst>
               <a:ext uri="{FF2B5EF4-FFF2-40B4-BE49-F238E27FC236}">
-                <a16:creationId xmlns="" xmlns:a16="http://schemas.microsoft.com/office/drawing/2014/main" id="{7875C19A-1AAE-476A-A316-A2CF92D763D3}"/>
+                <a16:creationId xmlns:a16="http://schemas.microsoft.com/office/drawing/2014/main" xmlns="" id="{7875C19A-1AAE-476A-A316-A2CF92D763D3}"/>
               </a:ext>
             </a:extLst>
           </p:cNvPr>
@@ -28582,7 +28583,7 @@
           <p:cNvPr id="10" name="Text Placeholder 9">
             <a:extLst>
               <a:ext uri="{FF2B5EF4-FFF2-40B4-BE49-F238E27FC236}">
-                <a16:creationId xmlns="" xmlns:a16="http://schemas.microsoft.com/office/drawing/2014/main" id="{EF2BC084-E6DB-4DE7-B309-042A85EBA700}"/>
+                <a16:creationId xmlns:a16="http://schemas.microsoft.com/office/drawing/2014/main" xmlns="" id="{EF2BC084-E6DB-4DE7-B309-042A85EBA700}"/>
               </a:ext>
             </a:extLst>
           </p:cNvPr>
@@ -28595,7 +28596,7 @@
         </p:nvSpPr>
         <p:spPr>
           <a:xfrm>
-            <a:off x="444500" y="2014151"/>
+            <a:off x="444500" y="2511241"/>
             <a:ext cx="6718300" cy="3704477"/>
           </a:xfrm>
         </p:spPr>
@@ -28603,36 +28604,65 @@
           <a:bodyPr/>
           <a:lstStyle/>
           <a:p>
+            <a:pPr marL="342900" indent="-342900">
+              <a:buFont typeface="+mj-lt"/>
+              <a:buAutoNum type="arabicPeriod"/>
+            </a:pPr>
             <a:r>
-              <a:rPr lang="en-US" dirty="0" err="1" smtClean="0"/>
-              <a:t>TortoiseSVN</a:t>
+              <a:rPr lang="pt-PT" dirty="0" smtClean="0"/>
+              <a:t>Introdução</a:t>
             </a:r>
-            <a:endParaRPr lang="en-US" dirty="0" smtClean="0"/>
           </a:p>
           <a:p>
-            <a:endParaRPr lang="en-US" dirty="0" smtClean="0"/>
+            <a:pPr marL="342900" indent="-342900">
+              <a:buFont typeface="+mj-lt"/>
+              <a:buAutoNum type="arabicPeriod"/>
+            </a:pPr>
+            <a:r>
+              <a:rPr lang="pt-PT" dirty="0" smtClean="0"/>
+              <a:t>Sumário</a:t>
+            </a:r>
           </a:p>
           <a:p>
-            <a:endParaRPr lang="en-US" dirty="0"/>
+            <a:pPr marL="342900" indent="-342900">
+              <a:buFont typeface="+mj-lt"/>
+              <a:buAutoNum type="arabicPeriod"/>
+            </a:pPr>
+            <a:r>
+              <a:rPr lang="pt-PT" dirty="0" smtClean="0"/>
+              <a:t>Requisitos</a:t>
+            </a:r>
           </a:p>
           <a:p>
-            <a:endParaRPr lang="en-US" dirty="0" smtClean="0"/>
+            <a:pPr marL="342900" indent="-342900">
+              <a:buFont typeface="+mj-lt"/>
+              <a:buAutoNum type="arabicPeriod"/>
+            </a:pPr>
+            <a:r>
+              <a:rPr lang="pt-PT" dirty="0" smtClean="0"/>
+              <a:t>Informação Adicional</a:t>
+            </a:r>
           </a:p>
           <a:p>
-            <a:endParaRPr lang="en-US" dirty="0"/>
+            <a:pPr marL="342900" indent="-342900">
+              <a:buFont typeface="+mj-lt"/>
+              <a:buAutoNum type="arabicPeriod"/>
+            </a:pPr>
+            <a:r>
+              <a:rPr lang="pt-PT" dirty="0" smtClean="0"/>
+              <a:t>Documentos de Referência e Glossário</a:t>
+            </a:r>
           </a:p>
           <a:p>
-            <a:endParaRPr lang="en-US" dirty="0"/>
-          </a:p>
-          <a:p>
-            <a:endParaRPr lang="en-US" dirty="0"/>
-          </a:p>
-          <a:p>
+            <a:pPr marL="342900" indent="-342900">
+              <a:buFont typeface="+mj-lt"/>
+              <a:buAutoNum type="arabicPeriod"/>
+            </a:pPr>
             <a:r>
-              <a:rPr lang="en-US" dirty="0" smtClean="0"/>
-              <a:t>Jenkins</a:t>
+              <a:rPr lang="pt-PT" dirty="0" smtClean="0"/>
+              <a:t>Testes</a:t>
             </a:r>
-            <a:endParaRPr lang="en-US" dirty="0"/>
+            <a:endParaRPr lang="pt-PT" dirty="0"/>
           </a:p>
         </p:txBody>
       </p:sp>
@@ -28641,7 +28671,7 @@
           <p:cNvPr id="2" name="Slide Number Placeholder 1">
             <a:extLst>
               <a:ext uri="{FF2B5EF4-FFF2-40B4-BE49-F238E27FC236}">
-                <a16:creationId xmlns="" xmlns:a16="http://schemas.microsoft.com/office/drawing/2014/main" id="{BE9800F6-D571-48C4-8466-12AA1ADB6599}"/>
+                <a16:creationId xmlns:a16="http://schemas.microsoft.com/office/drawing/2014/main" xmlns="" id="{BE9800F6-D571-48C4-8466-12AA1ADB6599}"/>
               </a:ext>
             </a:extLst>
           </p:cNvPr>
@@ -28676,11 +28706,11 @@
   <p:clrMapOvr>
     <a:masterClrMapping/>
   </p:clrMapOvr>
-  <mc:AlternateContent xmlns:mc="http://schemas.openxmlformats.org/markup-compatibility/2006">
-    <mc:Choice xmlns:p14="http://schemas.microsoft.com/office/powerpoint/2010/main" Requires="p14">
+  <mc:AlternateContent xmlns:mc="http://schemas.openxmlformats.org/markup-compatibility/2006" xmlns:p14="http://schemas.microsoft.com/office/powerpoint/2010/main">
+    <mc:Choice Requires="p14">
       <p:transition p14:dur="0"/>
     </mc:Choice>
-    <mc:Fallback>
+    <mc:Fallback xmlns="">
       <p:transition/>
     </mc:Fallback>
   </mc:AlternateContent>
@@ -28726,25 +28756,10 @@
           <a:bodyPr/>
           <a:lstStyle/>
           <a:p>
-            <a:endParaRPr lang="pt-PT"/>
-          </a:p>
-        </p:txBody>
-      </p:sp>
-      <p:sp>
-        <p:nvSpPr>
-          <p:cNvPr id="3" name="Text Placeholder 2"/>
-          <p:cNvSpPr>
-            <a:spLocks noGrp="1"/>
-          </p:cNvSpPr>
-          <p:nvPr>
-            <p:ph type="body" sz="quarter" idx="18"/>
-          </p:nvPr>
-        </p:nvSpPr>
-        <p:spPr/>
-        <p:txBody>
-          <a:bodyPr/>
-          <a:lstStyle/>
-          <a:p>
+            <a:r>
+              <a:rPr lang="pt-PT" dirty="0" smtClean="0"/>
+              <a:t>Esboço de Interface</a:t>
+            </a:r>
             <a:endParaRPr lang="pt-PT" dirty="0"/>
           </a:p>
         </p:txBody>
@@ -28773,56 +28788,36 @@
           </a:p>
         </p:txBody>
       </p:sp>
-      <p:sp>
-        <p:nvSpPr>
-          <p:cNvPr id="5" name="Picture Placeholder 4"/>
-          <p:cNvSpPr>
-            <a:spLocks noGrp="1"/>
-          </p:cNvSpPr>
-          <p:nvPr>
-            <p:ph type="pic" sz="quarter" idx="19"/>
-          </p:nvPr>
-        </p:nvSpPr>
-        <p:spPr/>
-      </p:sp>
-      <p:sp>
-        <p:nvSpPr>
-          <p:cNvPr id="6" name="Text Placeholder 5"/>
-          <p:cNvSpPr>
-            <a:spLocks noGrp="1"/>
-          </p:cNvSpPr>
-          <p:nvPr>
-            <p:ph type="body" sz="quarter" idx="20"/>
-          </p:nvPr>
-        </p:nvSpPr>
-        <p:spPr/>
-        <p:txBody>
-          <a:bodyPr/>
-          <a:lstStyle/>
-          <a:p>
-            <a:endParaRPr lang="pt-PT"/>
-          </a:p>
-        </p:txBody>
-      </p:sp>
-      <p:sp>
-        <p:nvSpPr>
-          <p:cNvPr id="7" name="Text Placeholder 6"/>
-          <p:cNvSpPr>
-            <a:spLocks noGrp="1"/>
-          </p:cNvSpPr>
-          <p:nvPr>
-            <p:ph type="body" sz="quarter" idx="21"/>
-          </p:nvPr>
-        </p:nvSpPr>
-        <p:spPr/>
-        <p:txBody>
-          <a:bodyPr/>
-          <a:lstStyle/>
-          <a:p>
-            <a:endParaRPr lang="pt-PT"/>
-          </a:p>
-        </p:txBody>
-      </p:sp>
+      <p:pic>
+        <p:nvPicPr>
+          <p:cNvPr id="10" name="Picture 9"/>
+          <p:cNvPicPr>
+            <a:picLocks noChangeAspect="1"/>
+          </p:cNvPicPr>
+          <p:nvPr/>
+        </p:nvPicPr>
+        <p:blipFill>
+          <a:blip r:embed="rId2">
+            <a:extLst>
+              <a:ext uri="{28A0092B-C50C-407E-A947-70E740481C1C}">
+                <a14:useLocalDpi xmlns:a14="http://schemas.microsoft.com/office/drawing/2010/main" val="0"/>
+              </a:ext>
+            </a:extLst>
+          </a:blip>
+          <a:stretch>
+            <a:fillRect/>
+          </a:stretch>
+        </p:blipFill>
+        <p:spPr>
+          <a:xfrm>
+            <a:off x="4155209" y="1963795"/>
+            <a:ext cx="3096057" cy="3600953"/>
+          </a:xfrm>
+          <a:prstGeom prst="rect">
+            <a:avLst/>
+          </a:prstGeom>
+        </p:spPr>
+      </p:pic>
     </p:spTree>
     <p:extLst>
       <p:ext uri="{BB962C8B-B14F-4D97-AF65-F5344CB8AC3E}">
@@ -28833,11 +28828,11 @@
   <p:clrMapOvr>
     <a:masterClrMapping/>
   </p:clrMapOvr>
-  <mc:AlternateContent xmlns:mc="http://schemas.openxmlformats.org/markup-compatibility/2006">
-    <mc:Choice xmlns:p14="http://schemas.microsoft.com/office/powerpoint/2010/main" Requires="p14">
+  <mc:AlternateContent xmlns:mc="http://schemas.openxmlformats.org/markup-compatibility/2006" xmlns:p14="http://schemas.microsoft.com/office/powerpoint/2010/main">
+    <mc:Choice Requires="p14">
       <p:transition p14:dur="0"/>
     </mc:Choice>
-    <mc:Fallback>
+    <mc:Fallback xmlns="">
       <p:transition/>
     </mc:Fallback>
   </mc:AlternateContent>
@@ -28873,7 +28868,7 @@
           <p:cNvPr id="4" name="Title 3">
             <a:extLst>
               <a:ext uri="{FF2B5EF4-FFF2-40B4-BE49-F238E27FC236}">
-                <a16:creationId xmlns="" xmlns:a16="http://schemas.microsoft.com/office/drawing/2014/main" id="{E3BD8413-C238-49D7-A4E1-E8FEF1811A0E}"/>
+                <a16:creationId xmlns:a16="http://schemas.microsoft.com/office/drawing/2014/main" xmlns="" id="{315E3981-F0D7-482C-A8E0-6A57700BECA7}"/>
               </a:ext>
             </a:extLst>
           </p:cNvPr>
@@ -28891,7 +28886,7 @@
           <a:p>
             <a:r>
               <a:rPr lang="pt-PT" dirty="0" smtClean="0"/>
-              <a:t>Trabalho Futuro</a:t>
+              <a:t>Sprints e Testes</a:t>
             </a:r>
             <a:endParaRPr lang="pt-PT" dirty="0"/>
           </a:p>
@@ -28902,7 +28897,7 @@
           <p:cNvPr id="2" name="Slide Number Placeholder 1">
             <a:extLst>
               <a:ext uri="{FF2B5EF4-FFF2-40B4-BE49-F238E27FC236}">
-                <a16:creationId xmlns="" xmlns:a16="http://schemas.microsoft.com/office/drawing/2014/main" id="{0B24BF10-2B55-43AB-9F77-F1A1410384A9}"/>
+                <a16:creationId xmlns:a16="http://schemas.microsoft.com/office/drawing/2014/main" xmlns="" id="{520FC4EE-F318-4344-9E3C-B950ADB63865}"/>
               </a:ext>
             </a:extLst>
           </p:cNvPr>
@@ -28929,12 +28924,52 @@
       </p:sp>
       <p:sp>
         <p:nvSpPr>
-          <p:cNvPr id="3" name="Text Placeholder 2"/>
+          <p:cNvPr id="8" name="Text Placeholder 7">
+            <a:extLst>
+              <a:ext uri="{FF2B5EF4-FFF2-40B4-BE49-F238E27FC236}">
+                <a16:creationId xmlns:a16="http://schemas.microsoft.com/office/drawing/2014/main" xmlns="" id="{47DC4E62-1A34-4F98-A451-214F1808519C}"/>
+              </a:ext>
+            </a:extLst>
+          </p:cNvPr>
           <p:cNvSpPr>
             <a:spLocks noGrp="1"/>
           </p:cNvSpPr>
           <p:nvPr>
-            <p:ph type="body" idx="1"/>
+            <p:ph type="body" sz="quarter" idx="2"/>
+          </p:nvPr>
+        </p:nvSpPr>
+        <p:spPr/>
+        <p:txBody>
+          <a:bodyPr>
+            <a:normAutofit/>
+          </a:bodyPr>
+          <a:lstStyle/>
+          <a:p>
+            <a:r>
+              <a:rPr lang="pt-PT" sz="2400" dirty="0" smtClean="0"/>
+              <a:t>Sprints quinzenais</a:t>
+            </a:r>
+            <a:endParaRPr lang="pt-PT" sz="2400" dirty="0" smtClean="0"/>
+          </a:p>
+          <a:p>
+            <a:endParaRPr lang="pt-PT" sz="2400" dirty="0"/>
+          </a:p>
+        </p:txBody>
+      </p:sp>
+      <p:sp>
+        <p:nvSpPr>
+          <p:cNvPr id="6" name="Text Placeholder 5">
+            <a:extLst>
+              <a:ext uri="{FF2B5EF4-FFF2-40B4-BE49-F238E27FC236}">
+                <a16:creationId xmlns:a16="http://schemas.microsoft.com/office/drawing/2014/main" xmlns="" id="{000A9570-5EF6-4AFB-9FCA-7C8998E3FEB1}"/>
+              </a:ext>
+            </a:extLst>
+          </p:cNvPr>
+          <p:cNvSpPr>
+            <a:spLocks noGrp="1"/>
+          </p:cNvSpPr>
+          <p:nvPr>
+            <p:ph type="body" sz="quarter" idx="4"/>
           </p:nvPr>
         </p:nvSpPr>
         <p:spPr/>
@@ -28942,25 +28977,81 @@
           <a:bodyPr/>
           <a:lstStyle/>
           <a:p>
-            <a:endParaRPr lang="pt-PT"/>
+            <a:r>
+              <a:rPr lang="pt-PT" dirty="0" smtClean="0"/>
+              <a:t>Testes manuais e automatizados</a:t>
+            </a:r>
           </a:p>
         </p:txBody>
       </p:sp>
+      <p:pic>
+        <p:nvPicPr>
+          <p:cNvPr id="3" name="Picture 2"/>
+          <p:cNvPicPr>
+            <a:picLocks noChangeAspect="1"/>
+          </p:cNvPicPr>
+          <p:nvPr/>
+        </p:nvPicPr>
+        <p:blipFill rotWithShape="1">
+          <a:blip r:embed="rId2">
+            <a:extLst>
+              <a:ext uri="{28A0092B-C50C-407E-A947-70E740481C1C}">
+                <a14:useLocalDpi xmlns:a14="http://schemas.microsoft.com/office/drawing/2010/main" val="0"/>
+              </a:ext>
+            </a:extLst>
+          </a:blip>
+          <a:srcRect l="33433" t="19530" r="32751" b="21026"/>
+          <a:stretch/>
+        </p:blipFill>
+        <p:spPr>
+          <a:xfrm>
+            <a:off x="730293" y="3252565"/>
+            <a:ext cx="2651145" cy="2559092"/>
+          </a:xfrm>
+          <a:prstGeom prst="rect">
+            <a:avLst/>
+          </a:prstGeom>
+        </p:spPr>
+      </p:pic>
+      <p:pic>
+        <p:nvPicPr>
+          <p:cNvPr id="5" name="Picture 4"/>
+          <p:cNvPicPr>
+            <a:picLocks noChangeAspect="1"/>
+          </p:cNvPicPr>
+          <p:nvPr/>
+        </p:nvPicPr>
+        <p:blipFill>
+          <a:blip r:embed="rId3"/>
+          <a:stretch>
+            <a:fillRect/>
+          </a:stretch>
+        </p:blipFill>
+        <p:spPr>
+          <a:xfrm>
+            <a:off x="6475412" y="3448180"/>
+            <a:ext cx="3791643" cy="2363477"/>
+          </a:xfrm>
+          <a:prstGeom prst="rect">
+            <a:avLst/>
+          </a:prstGeom>
+        </p:spPr>
+      </p:pic>
     </p:spTree>
     <p:extLst>
       <p:ext uri="{BB962C8B-B14F-4D97-AF65-F5344CB8AC3E}">
-        <p14:creationId xmlns:p14="http://schemas.microsoft.com/office/powerpoint/2010/main" val="3123756521"/>
+        <p14:creationId xmlns:p14="http://schemas.microsoft.com/office/powerpoint/2010/main" val="3330937557"/>
       </p:ext>
     </p:extLst>
   </p:cSld>
   <p:clrMapOvr>
     <a:masterClrMapping/>
   </p:clrMapOvr>
-  <mc:AlternateContent xmlns:mc="http://schemas.openxmlformats.org/markup-compatibility/2006">
-    <mc:Choice xmlns:p14="http://schemas.microsoft.com/office/powerpoint/2010/main" Requires="p14">
+  <mc:AlternateContent xmlns:mc="http://schemas.openxmlformats.org/markup-compatibility/2006" xmlns:p14="http://schemas.microsoft.com/office/powerpoint/2010/main">
+    <mc:Choice Requires="p14">
       <p:transition p14:dur="0"/>
     </mc:Choice>
-    <mc:Fallback>
+    <mc:Fallback xmlns="">
       <p:transition/>
     </mc:Fallback>
   </mc:AlternateContent>
@@ -28996,7 +29087,7 @@
           <p:cNvPr id="4" name="Title 3">
             <a:extLst>
               <a:ext uri="{FF2B5EF4-FFF2-40B4-BE49-F238E27FC236}">
-                <a16:creationId xmlns="" xmlns:a16="http://schemas.microsoft.com/office/drawing/2014/main" id="{315E3981-F0D7-482C-A8E0-6A57700BECA7}"/>
+                <a16:creationId xmlns:a16="http://schemas.microsoft.com/office/drawing/2014/main" xmlns="" id="{315E3981-F0D7-482C-A8E0-6A57700BECA7}"/>
               </a:ext>
             </a:extLst>
           </p:cNvPr>
@@ -29033,7 +29124,7 @@
           <p:cNvPr id="2" name="Slide Number Placeholder 1">
             <a:extLst>
               <a:ext uri="{FF2B5EF4-FFF2-40B4-BE49-F238E27FC236}">
-                <a16:creationId xmlns="" xmlns:a16="http://schemas.microsoft.com/office/drawing/2014/main" id="{520FC4EE-F318-4344-9E3C-B950ADB63865}"/>
+                <a16:creationId xmlns:a16="http://schemas.microsoft.com/office/drawing/2014/main" xmlns="" id="{520FC4EE-F318-4344-9E3C-B950ADB63865}"/>
               </a:ext>
             </a:extLst>
           </p:cNvPr>
@@ -29063,7 +29154,7 @@
           <p:cNvPr id="8" name="Text Placeholder 7">
             <a:extLst>
               <a:ext uri="{FF2B5EF4-FFF2-40B4-BE49-F238E27FC236}">
-                <a16:creationId xmlns="" xmlns:a16="http://schemas.microsoft.com/office/drawing/2014/main" id="{47DC4E62-1A34-4F98-A451-214F1808519C}"/>
+                <a16:creationId xmlns:a16="http://schemas.microsoft.com/office/drawing/2014/main" xmlns="" id="{47DC4E62-1A34-4F98-A451-214F1808519C}"/>
               </a:ext>
             </a:extLst>
           </p:cNvPr>
@@ -29248,7 +29339,7 @@
           <p:cNvPr id="6" name="Text Placeholder 5">
             <a:extLst>
               <a:ext uri="{FF2B5EF4-FFF2-40B4-BE49-F238E27FC236}">
-                <a16:creationId xmlns="" xmlns:a16="http://schemas.microsoft.com/office/drawing/2014/main" id="{000A9570-5EF6-4AFB-9FCA-7C8998E3FEB1}"/>
+                <a16:creationId xmlns:a16="http://schemas.microsoft.com/office/drawing/2014/main" xmlns="" id="{000A9570-5EF6-4AFB-9FCA-7C8998E3FEB1}"/>
               </a:ext>
             </a:extLst>
           </p:cNvPr>
@@ -29290,11 +29381,11 @@
   <p:clrMapOvr>
     <a:masterClrMapping/>
   </p:clrMapOvr>
-  <mc:AlternateContent xmlns:mc="http://schemas.openxmlformats.org/markup-compatibility/2006">
-    <mc:Choice xmlns:p14="http://schemas.microsoft.com/office/powerpoint/2010/main" Requires="p14">
+  <mc:AlternateContent xmlns:mc="http://schemas.openxmlformats.org/markup-compatibility/2006" xmlns:p14="http://schemas.microsoft.com/office/powerpoint/2010/main">
+    <mc:Choice Requires="p14">
       <p:transition p14:dur="0"/>
     </mc:Choice>
-    <mc:Fallback>
+    <mc:Fallback xmlns="">
       <p:transition/>
     </mc:Fallback>
   </mc:AlternateContent>
@@ -29327,10 +29418,133 @@
       </p:grpSpPr>
       <p:sp>
         <p:nvSpPr>
+          <p:cNvPr id="4" name="Title 3">
+            <a:extLst>
+              <a:ext uri="{FF2B5EF4-FFF2-40B4-BE49-F238E27FC236}">
+                <a16:creationId xmlns:a16="http://schemas.microsoft.com/office/drawing/2014/main" xmlns="" id="{E3BD8413-C238-49D7-A4E1-E8FEF1811A0E}"/>
+              </a:ext>
+            </a:extLst>
+          </p:cNvPr>
+          <p:cNvSpPr>
+            <a:spLocks noGrp="1"/>
+          </p:cNvSpPr>
+          <p:nvPr>
+            <p:ph type="title"/>
+          </p:nvPr>
+        </p:nvSpPr>
+        <p:spPr/>
+        <p:txBody>
+          <a:bodyPr/>
+          <a:lstStyle/>
+          <a:p>
+            <a:r>
+              <a:rPr lang="pt-PT" dirty="0" smtClean="0"/>
+              <a:t>Trabalho Futuro</a:t>
+            </a:r>
+            <a:endParaRPr lang="pt-PT" dirty="0"/>
+          </a:p>
+        </p:txBody>
+      </p:sp>
+      <p:sp>
+        <p:nvSpPr>
+          <p:cNvPr id="2" name="Slide Number Placeholder 1">
+            <a:extLst>
+              <a:ext uri="{FF2B5EF4-FFF2-40B4-BE49-F238E27FC236}">
+                <a16:creationId xmlns:a16="http://schemas.microsoft.com/office/drawing/2014/main" xmlns="" id="{0B24BF10-2B55-43AB-9F77-F1A1410384A9}"/>
+              </a:ext>
+            </a:extLst>
+          </p:cNvPr>
+          <p:cNvSpPr>
+            <a:spLocks noGrp="1"/>
+          </p:cNvSpPr>
+          <p:nvPr>
+            <p:ph type="sldNum" sz="quarter" idx="12"/>
+          </p:nvPr>
+        </p:nvSpPr>
+        <p:spPr/>
+        <p:txBody>
+          <a:bodyPr/>
+          <a:lstStyle/>
+          <a:p>
+            <a:fld id="{C263D6C4-4840-40CC-AC84-17E24B3B7BDE}" type="slidenum">
+              <a:rPr lang="en-US" smtClean="0"/>
+              <a:pPr/>
+              <a:t>20</a:t>
+            </a:fld>
+            <a:endParaRPr lang="en-US" dirty="0"/>
+          </a:p>
+        </p:txBody>
+      </p:sp>
+      <p:sp>
+        <p:nvSpPr>
+          <p:cNvPr id="3" name="Text Placeholder 2"/>
+          <p:cNvSpPr>
+            <a:spLocks noGrp="1"/>
+          </p:cNvSpPr>
+          <p:nvPr>
+            <p:ph type="body" idx="1"/>
+          </p:nvPr>
+        </p:nvSpPr>
+        <p:spPr/>
+        <p:txBody>
+          <a:bodyPr/>
+          <a:lstStyle/>
+          <a:p>
+            <a:endParaRPr lang="pt-PT"/>
+          </a:p>
+        </p:txBody>
+      </p:sp>
+    </p:spTree>
+    <p:extLst>
+      <p:ext uri="{BB962C8B-B14F-4D97-AF65-F5344CB8AC3E}">
+        <p14:creationId xmlns:p14="http://schemas.microsoft.com/office/powerpoint/2010/main" val="3123756521"/>
+      </p:ext>
+    </p:extLst>
+  </p:cSld>
+  <p:clrMapOvr>
+    <a:masterClrMapping/>
+  </p:clrMapOvr>
+  <mc:AlternateContent xmlns:mc="http://schemas.openxmlformats.org/markup-compatibility/2006" xmlns:p14="http://schemas.microsoft.com/office/powerpoint/2010/main">
+    <mc:Choice Requires="p14">
+      <p:transition p14:dur="0"/>
+    </mc:Choice>
+    <mc:Fallback xmlns="">
+      <p:transition/>
+    </mc:Fallback>
+  </mc:AlternateContent>
+  <p:timing>
+    <p:tnLst>
+      <p:par>
+        <p:cTn id="1" dur="indefinite" restart="never" nodeType="tmRoot"/>
+      </p:par>
+    </p:tnLst>
+  </p:timing>
+</p:sld>
+</file>
+
+<file path=ppt/slides/slide21.xml><?xml version="1.0" encoding="utf-8"?>
+<p:sld xmlns:a="http://schemas.openxmlformats.org/drawingml/2006/main" xmlns:r="http://schemas.openxmlformats.org/officeDocument/2006/relationships" xmlns:p="http://schemas.openxmlformats.org/presentationml/2006/main">
+  <p:cSld>
+    <p:spTree>
+      <p:nvGrpSpPr>
+        <p:cNvPr id="1" name=""/>
+        <p:cNvGrpSpPr/>
+        <p:nvPr/>
+      </p:nvGrpSpPr>
+      <p:grpSpPr>
+        <a:xfrm>
+          <a:off x="0" y="0"/>
+          <a:ext cx="0" cy="0"/>
+          <a:chOff x="0" y="0"/>
+          <a:chExt cx="0" cy="0"/>
+        </a:xfrm>
+      </p:grpSpPr>
+      <p:sp>
+        <p:nvSpPr>
           <p:cNvPr id="2" name="Title 1">
             <a:extLst>
               <a:ext uri="{FF2B5EF4-FFF2-40B4-BE49-F238E27FC236}">
-                <a16:creationId xmlns="" xmlns:a16="http://schemas.microsoft.com/office/drawing/2014/main" id="{632BE5BF-9922-45FB-8F3F-4446D40A051B}"/>
+                <a16:creationId xmlns:a16="http://schemas.microsoft.com/office/drawing/2014/main" xmlns="" id="{632BE5BF-9922-45FB-8F3F-4446D40A051B}"/>
               </a:ext>
             </a:extLst>
           </p:cNvPr>
@@ -29348,7 +29562,11 @@
           <a:p>
             <a:r>
               <a:rPr lang="en-US" dirty="0"/>
-              <a:t>Thank You 1</a:t>
+              <a:t>Thank </a:t>
+            </a:r>
+            <a:r>
+              <a:rPr lang="en-US" dirty="0" smtClean="0"/>
+              <a:t>You</a:t>
             </a:r>
             <a:endParaRPr lang="en-GB" dirty="0"/>
           </a:p>
@@ -29364,11 +29582,11 @@
   <p:clrMapOvr>
     <a:masterClrMapping/>
   </p:clrMapOvr>
-  <mc:AlternateContent xmlns:mc="http://schemas.openxmlformats.org/markup-compatibility/2006">
-    <mc:Choice xmlns:p14="http://schemas.microsoft.com/office/powerpoint/2010/main" Requires="p14">
+  <mc:AlternateContent xmlns:mc="http://schemas.openxmlformats.org/markup-compatibility/2006" xmlns:p14="http://schemas.microsoft.com/office/powerpoint/2010/main">
+    <mc:Choice Requires="p14">
       <p:transition p14:dur="0"/>
     </mc:Choice>
-    <mc:Fallback>
+    <mc:Fallback xmlns="">
       <p:transition/>
     </mc:Fallback>
   </mc:AlternateContent>
@@ -29404,7 +29622,7 @@
           <p:cNvPr id="7" name="Title 6">
             <a:extLst>
               <a:ext uri="{FF2B5EF4-FFF2-40B4-BE49-F238E27FC236}">
-                <a16:creationId xmlns="" xmlns:a16="http://schemas.microsoft.com/office/drawing/2014/main" id="{7875C19A-1AAE-476A-A316-A2CF92D763D3}"/>
+                <a16:creationId xmlns:a16="http://schemas.microsoft.com/office/drawing/2014/main" xmlns="" id="{7875C19A-1AAE-476A-A316-A2CF92D763D3}"/>
               </a:ext>
             </a:extLst>
           </p:cNvPr>
@@ -29433,7 +29651,7 @@
           <p:cNvPr id="10" name="Text Placeholder 9">
             <a:extLst>
               <a:ext uri="{FF2B5EF4-FFF2-40B4-BE49-F238E27FC236}">
-                <a16:creationId xmlns="" xmlns:a16="http://schemas.microsoft.com/office/drawing/2014/main" id="{EF2BC084-E6DB-4DE7-B309-042A85EBA700}"/>
+                <a16:creationId xmlns:a16="http://schemas.microsoft.com/office/drawing/2014/main" xmlns="" id="{EF2BC084-E6DB-4DE7-B309-042A85EBA700}"/>
               </a:ext>
             </a:extLst>
           </p:cNvPr>
@@ -29446,7 +29664,7 @@
         </p:nvSpPr>
         <p:spPr>
           <a:xfrm>
-            <a:off x="444500" y="2014151"/>
+            <a:off x="444500" y="1658205"/>
             <a:ext cx="6718300" cy="3704477"/>
           </a:xfrm>
         </p:spPr>
@@ -29492,7 +29710,7 @@
           <p:cNvPr id="2" name="Slide Number Placeholder 1">
             <a:extLst>
               <a:ext uri="{FF2B5EF4-FFF2-40B4-BE49-F238E27FC236}">
-                <a16:creationId xmlns="" xmlns:a16="http://schemas.microsoft.com/office/drawing/2014/main" id="{BE9800F6-D571-48C4-8466-12AA1ADB6599}"/>
+                <a16:creationId xmlns:a16="http://schemas.microsoft.com/office/drawing/2014/main" xmlns="" id="{BE9800F6-D571-48C4-8466-12AA1ADB6599}"/>
               </a:ext>
             </a:extLst>
           </p:cNvPr>
@@ -29517,6 +29735,66 @@
           </a:p>
         </p:txBody>
       </p:sp>
+      <p:pic>
+        <p:nvPicPr>
+          <p:cNvPr id="4" name="Picture 3"/>
+          <p:cNvPicPr>
+            <a:picLocks noChangeAspect="1"/>
+          </p:cNvPicPr>
+          <p:nvPr/>
+        </p:nvPicPr>
+        <p:blipFill>
+          <a:blip r:embed="rId2">
+            <a:extLst>
+              <a:ext uri="{28A0092B-C50C-407E-A947-70E740481C1C}">
+                <a14:useLocalDpi xmlns:a14="http://schemas.microsoft.com/office/drawing/2010/main" val="0"/>
+              </a:ext>
+            </a:extLst>
+          </a:blip>
+          <a:stretch>
+            <a:fillRect/>
+          </a:stretch>
+        </p:blipFill>
+        <p:spPr>
+          <a:xfrm>
+            <a:off x="443051" y="2283912"/>
+            <a:ext cx="2683876" cy="1610326"/>
+          </a:xfrm>
+          <a:prstGeom prst="rect">
+            <a:avLst/>
+          </a:prstGeom>
+        </p:spPr>
+      </p:pic>
+      <p:pic>
+        <p:nvPicPr>
+          <p:cNvPr id="5" name="Picture 4"/>
+          <p:cNvPicPr>
+            <a:picLocks noChangeAspect="1"/>
+          </p:cNvPicPr>
+          <p:nvPr/>
+        </p:nvPicPr>
+        <p:blipFill>
+          <a:blip r:embed="rId3">
+            <a:extLst>
+              <a:ext uri="{28A0092B-C50C-407E-A947-70E740481C1C}">
+                <a14:useLocalDpi xmlns:a14="http://schemas.microsoft.com/office/drawing/2010/main" val="0"/>
+              </a:ext>
+            </a:extLst>
+          </a:blip>
+          <a:stretch>
+            <a:fillRect/>
+          </a:stretch>
+        </p:blipFill>
+        <p:spPr>
+          <a:xfrm>
+            <a:off x="443051" y="4779884"/>
+            <a:ext cx="2683876" cy="1660164"/>
+          </a:xfrm>
+          <a:prstGeom prst="rect">
+            <a:avLst/>
+          </a:prstGeom>
+        </p:spPr>
+      </p:pic>
     </p:spTree>
     <p:extLst>
       <p:ext uri="{BB962C8B-B14F-4D97-AF65-F5344CB8AC3E}">
@@ -29527,11 +29805,11 @@
   <p:clrMapOvr>
     <a:masterClrMapping/>
   </p:clrMapOvr>
-  <mc:AlternateContent xmlns:mc="http://schemas.openxmlformats.org/markup-compatibility/2006">
-    <mc:Choice xmlns:p14="http://schemas.microsoft.com/office/powerpoint/2010/main" Requires="p14">
+  <mc:AlternateContent xmlns:mc="http://schemas.openxmlformats.org/markup-compatibility/2006" xmlns:p14="http://schemas.microsoft.com/office/powerpoint/2010/main">
+    <mc:Choice Requires="p14">
       <p:transition p14:dur="0"/>
     </mc:Choice>
-    <mc:Fallback>
+    <mc:Fallback xmlns="">
       <p:transition/>
     </mc:Fallback>
   </mc:AlternateContent>
@@ -29567,7 +29845,7 @@
           <p:cNvPr id="7" name="Title 6">
             <a:extLst>
               <a:ext uri="{FF2B5EF4-FFF2-40B4-BE49-F238E27FC236}">
-                <a16:creationId xmlns="" xmlns:a16="http://schemas.microsoft.com/office/drawing/2014/main" id="{7875C19A-1AAE-476A-A316-A2CF92D763D3}"/>
+                <a16:creationId xmlns:a16="http://schemas.microsoft.com/office/drawing/2014/main" xmlns="" id="{7875C19A-1AAE-476A-A316-A2CF92D763D3}"/>
               </a:ext>
             </a:extLst>
           </p:cNvPr>
@@ -29596,7 +29874,7 @@
           <p:cNvPr id="2" name="Slide Number Placeholder 1">
             <a:extLst>
               <a:ext uri="{FF2B5EF4-FFF2-40B4-BE49-F238E27FC236}">
-                <a16:creationId xmlns="" xmlns:a16="http://schemas.microsoft.com/office/drawing/2014/main" id="{BE9800F6-D571-48C4-8466-12AA1ADB6599}"/>
+                <a16:creationId xmlns:a16="http://schemas.microsoft.com/office/drawing/2014/main" xmlns="" id="{BE9800F6-D571-48C4-8466-12AA1ADB6599}"/>
               </a:ext>
             </a:extLst>
           </p:cNvPr>
@@ -29631,11 +29909,11 @@
   <p:clrMapOvr>
     <a:masterClrMapping/>
   </p:clrMapOvr>
-  <mc:AlternateContent xmlns:mc="http://schemas.openxmlformats.org/markup-compatibility/2006">
-    <mc:Choice xmlns:p14="http://schemas.microsoft.com/office/powerpoint/2010/main" Requires="p14">
+  <mc:AlternateContent xmlns:mc="http://schemas.openxmlformats.org/markup-compatibility/2006" xmlns:p14="http://schemas.microsoft.com/office/powerpoint/2010/main">
+    <mc:Choice Requires="p14">
       <p:transition p14:dur="0"/>
     </mc:Choice>
-    <mc:Fallback>
+    <mc:Fallback xmlns="">
       <p:transition/>
     </mc:Fallback>
   </mc:AlternateContent>
@@ -29671,7 +29949,7 @@
           <p:cNvPr id="7" name="Title 6">
             <a:extLst>
               <a:ext uri="{FF2B5EF4-FFF2-40B4-BE49-F238E27FC236}">
-                <a16:creationId xmlns="" xmlns:a16="http://schemas.microsoft.com/office/drawing/2014/main" id="{7875C19A-1AAE-476A-A316-A2CF92D763D3}"/>
+                <a16:creationId xmlns:a16="http://schemas.microsoft.com/office/drawing/2014/main" xmlns="" id="{7875C19A-1AAE-476A-A316-A2CF92D763D3}"/>
               </a:ext>
             </a:extLst>
           </p:cNvPr>
@@ -29700,7 +29978,7 @@
           <p:cNvPr id="2" name="Slide Number Placeholder 1">
             <a:extLst>
               <a:ext uri="{FF2B5EF4-FFF2-40B4-BE49-F238E27FC236}">
-                <a16:creationId xmlns="" xmlns:a16="http://schemas.microsoft.com/office/drawing/2014/main" id="{BE9800F6-D571-48C4-8466-12AA1ADB6599}"/>
+                <a16:creationId xmlns:a16="http://schemas.microsoft.com/office/drawing/2014/main" xmlns="" id="{BE9800F6-D571-48C4-8466-12AA1ADB6599}"/>
               </a:ext>
             </a:extLst>
           </p:cNvPr>
@@ -29735,11 +30013,11 @@
   <p:clrMapOvr>
     <a:masterClrMapping/>
   </p:clrMapOvr>
-  <mc:AlternateContent xmlns:mc="http://schemas.openxmlformats.org/markup-compatibility/2006">
-    <mc:Choice xmlns:p14="http://schemas.microsoft.com/office/powerpoint/2010/main" Requires="p14">
+  <mc:AlternateContent xmlns:mc="http://schemas.openxmlformats.org/markup-compatibility/2006" xmlns:p14="http://schemas.microsoft.com/office/powerpoint/2010/main">
+    <mc:Choice Requires="p14">
       <p:transition p14:dur="0"/>
     </mc:Choice>
-    <mc:Fallback>
+    <mc:Fallback xmlns="">
       <p:transition/>
     </mc:Fallback>
   </mc:AlternateContent>
@@ -29775,7 +30053,7 @@
           <p:cNvPr id="7" name="Title 6">
             <a:extLst>
               <a:ext uri="{FF2B5EF4-FFF2-40B4-BE49-F238E27FC236}">
-                <a16:creationId xmlns="" xmlns:a16="http://schemas.microsoft.com/office/drawing/2014/main" id="{7875C19A-1AAE-476A-A316-A2CF92D763D3}"/>
+                <a16:creationId xmlns:a16="http://schemas.microsoft.com/office/drawing/2014/main" xmlns="" id="{7875C19A-1AAE-476A-A316-A2CF92D763D3}"/>
               </a:ext>
             </a:extLst>
           </p:cNvPr>
@@ -29804,7 +30082,7 @@
           <p:cNvPr id="2" name="Slide Number Placeholder 1">
             <a:extLst>
               <a:ext uri="{FF2B5EF4-FFF2-40B4-BE49-F238E27FC236}">
-                <a16:creationId xmlns="" xmlns:a16="http://schemas.microsoft.com/office/drawing/2014/main" id="{BE9800F6-D571-48C4-8466-12AA1ADB6599}"/>
+                <a16:creationId xmlns:a16="http://schemas.microsoft.com/office/drawing/2014/main" xmlns="" id="{BE9800F6-D571-48C4-8466-12AA1ADB6599}"/>
               </a:ext>
             </a:extLst>
           </p:cNvPr>
@@ -29839,11 +30117,11 @@
   <p:clrMapOvr>
     <a:masterClrMapping/>
   </p:clrMapOvr>
-  <mc:AlternateContent xmlns:mc="http://schemas.openxmlformats.org/markup-compatibility/2006">
-    <mc:Choice xmlns:p14="http://schemas.microsoft.com/office/powerpoint/2010/main" Requires="p14">
+  <mc:AlternateContent xmlns:mc="http://schemas.openxmlformats.org/markup-compatibility/2006" xmlns:p14="http://schemas.microsoft.com/office/powerpoint/2010/main">
+    <mc:Choice Requires="p14">
       <p:transition p14:dur="0"/>
     </mc:Choice>
-    <mc:Fallback>
+    <mc:Fallback xmlns="">
       <p:transition/>
     </mc:Fallback>
   </mc:AlternateContent>
@@ -29879,7 +30157,7 @@
           <p:cNvPr id="4" name="Title 3">
             <a:extLst>
               <a:ext uri="{FF2B5EF4-FFF2-40B4-BE49-F238E27FC236}">
-                <a16:creationId xmlns="" xmlns:a16="http://schemas.microsoft.com/office/drawing/2014/main" id="{E3BD8413-C238-49D7-A4E1-E8FEF1811A0E}"/>
+                <a16:creationId xmlns:a16="http://schemas.microsoft.com/office/drawing/2014/main" xmlns="" id="{E3BD8413-C238-49D7-A4E1-E8FEF1811A0E}"/>
               </a:ext>
             </a:extLst>
           </p:cNvPr>
@@ -29908,7 +30186,7 @@
           <p:cNvPr id="5" name="Text Placeholder 4">
             <a:extLst>
               <a:ext uri="{FF2B5EF4-FFF2-40B4-BE49-F238E27FC236}">
-                <a16:creationId xmlns="" xmlns:a16="http://schemas.microsoft.com/office/drawing/2014/main" id="{0A95F4DE-39B7-4CE2-BC1E-8B8AE662A895}"/>
+                <a16:creationId xmlns:a16="http://schemas.microsoft.com/office/drawing/2014/main" xmlns="" id="{0A95F4DE-39B7-4CE2-BC1E-8B8AE662A895}"/>
               </a:ext>
             </a:extLst>
           </p:cNvPr>
@@ -29933,7 +30211,7 @@
           <p:cNvPr id="2" name="Slide Number Placeholder 1">
             <a:extLst>
               <a:ext uri="{FF2B5EF4-FFF2-40B4-BE49-F238E27FC236}">
-                <a16:creationId xmlns="" xmlns:a16="http://schemas.microsoft.com/office/drawing/2014/main" id="{0B24BF10-2B55-43AB-9F77-F1A1410384A9}"/>
+                <a16:creationId xmlns:a16="http://schemas.microsoft.com/office/drawing/2014/main" xmlns="" id="{0B24BF10-2B55-43AB-9F77-F1A1410384A9}"/>
               </a:ext>
             </a:extLst>
           </p:cNvPr>
@@ -29968,11 +30246,11 @@
   <p:clrMapOvr>
     <a:masterClrMapping/>
   </p:clrMapOvr>
-  <mc:AlternateContent xmlns:mc="http://schemas.openxmlformats.org/markup-compatibility/2006">
-    <mc:Choice xmlns:p14="http://schemas.microsoft.com/office/powerpoint/2010/main" Requires="p14">
+  <mc:AlternateContent xmlns:mc="http://schemas.openxmlformats.org/markup-compatibility/2006" xmlns:p14="http://schemas.microsoft.com/office/powerpoint/2010/main">
+    <mc:Choice Requires="p14">
       <p:transition p14:dur="0"/>
     </mc:Choice>
-    <mc:Fallback>
+    <mc:Fallback xmlns="">
       <p:transition/>
     </mc:Fallback>
   </mc:AlternateContent>
@@ -30008,7 +30286,7 @@
           <p:cNvPr id="6" name="Title 5">
             <a:extLst>
               <a:ext uri="{FF2B5EF4-FFF2-40B4-BE49-F238E27FC236}">
-                <a16:creationId xmlns="" xmlns:a16="http://schemas.microsoft.com/office/drawing/2014/main" id="{A4CD37D6-FE32-48E3-A3AD-F07BE6A19FA1}"/>
+                <a16:creationId xmlns:a16="http://schemas.microsoft.com/office/drawing/2014/main" xmlns="" id="{A4CD37D6-FE32-48E3-A3AD-F07BE6A19FA1}"/>
               </a:ext>
             </a:extLst>
           </p:cNvPr>
@@ -30068,7 +30346,7 @@
           <p:cNvPr id="2" name="Slide Number Placeholder 1">
             <a:extLst>
               <a:ext uri="{FF2B5EF4-FFF2-40B4-BE49-F238E27FC236}">
-                <a16:creationId xmlns="" xmlns:a16="http://schemas.microsoft.com/office/drawing/2014/main" id="{8EDC7217-2779-44E0-9E6D-3B3879516A1D}"/>
+                <a16:creationId xmlns:a16="http://schemas.microsoft.com/office/drawing/2014/main" xmlns="" id="{8EDC7217-2779-44E0-9E6D-3B3879516A1D}"/>
               </a:ext>
             </a:extLst>
           </p:cNvPr>
@@ -30103,11 +30381,11 @@
   <p:clrMapOvr>
     <a:masterClrMapping/>
   </p:clrMapOvr>
-  <mc:AlternateContent xmlns:mc="http://schemas.openxmlformats.org/markup-compatibility/2006">
-    <mc:Choice xmlns:p14="http://schemas.microsoft.com/office/powerpoint/2010/main" Requires="p14">
+  <mc:AlternateContent xmlns:mc="http://schemas.openxmlformats.org/markup-compatibility/2006" xmlns:p14="http://schemas.microsoft.com/office/powerpoint/2010/main">
+    <mc:Choice Requires="p14">
       <p:transition p14:dur="0"/>
     </mc:Choice>
-    <mc:Fallback>
+    <mc:Fallback xmlns="">
       <p:transition/>
     </mc:Fallback>
   </mc:AlternateContent>
@@ -30143,7 +30421,7 @@
           <p:cNvPr id="6" name="Title 5">
             <a:extLst>
               <a:ext uri="{FF2B5EF4-FFF2-40B4-BE49-F238E27FC236}">
-                <a16:creationId xmlns="" xmlns:a16="http://schemas.microsoft.com/office/drawing/2014/main" id="{A4CD37D6-FE32-48E3-A3AD-F07BE6A19FA1}"/>
+                <a16:creationId xmlns:a16="http://schemas.microsoft.com/office/drawing/2014/main" xmlns="" id="{A4CD37D6-FE32-48E3-A3AD-F07BE6A19FA1}"/>
               </a:ext>
             </a:extLst>
           </p:cNvPr>
@@ -30199,7 +30477,7 @@
           <p:cNvPr id="2" name="Slide Number Placeholder 1">
             <a:extLst>
               <a:ext uri="{FF2B5EF4-FFF2-40B4-BE49-F238E27FC236}">
-                <a16:creationId xmlns="" xmlns:a16="http://schemas.microsoft.com/office/drawing/2014/main" id="{8EDC7217-2779-44E0-9E6D-3B3879516A1D}"/>
+                <a16:creationId xmlns:a16="http://schemas.microsoft.com/office/drawing/2014/main" xmlns="" id="{8EDC7217-2779-44E0-9E6D-3B3879516A1D}"/>
               </a:ext>
             </a:extLst>
           </p:cNvPr>
@@ -30234,11 +30512,11 @@
   <p:clrMapOvr>
     <a:masterClrMapping/>
   </p:clrMapOvr>
-  <mc:AlternateContent xmlns:mc="http://schemas.openxmlformats.org/markup-compatibility/2006">
-    <mc:Choice xmlns:p14="http://schemas.microsoft.com/office/powerpoint/2010/main" Requires="p14">
+  <mc:AlternateContent xmlns:mc="http://schemas.openxmlformats.org/markup-compatibility/2006" xmlns:p14="http://schemas.microsoft.com/office/powerpoint/2010/main">
+    <mc:Choice Requires="p14">
       <p:transition p14:dur="0"/>
     </mc:Choice>
-    <mc:Fallback>
+    <mc:Fallback xmlns="">
       <p:transition/>
     </mc:Fallback>
   </mc:AlternateContent>
@@ -31044,15 +31322,6 @@
 </file>
 
 <file path=customXml/item1.xml><?xml version="1.0" encoding="utf-8"?>
-<?mso-contentType ?>
-<FormTemplates xmlns="http://schemas.microsoft.com/sharepoint/v3/contenttype/forms">
-  <Display>DocumentLibraryForm</Display>
-  <Edit>DocumentLibraryForm</Edit>
-  <New>DocumentLibraryForm</New>
-</FormTemplates>
-</file>
-
-<file path=customXml/item2.xml><?xml version="1.0" encoding="utf-8"?>
 <ct:contentTypeSchema xmlns:ct="http://schemas.microsoft.com/office/2006/metadata/contentType" xmlns:ma="http://schemas.microsoft.com/office/2006/metadata/properties/metaAttributes" ct:_="" ma:_="" ma:contentTypeName="Document" ma:contentTypeID="0x01010079F111ED35F8CC479449609E8A0923A6" ma:contentTypeVersion="11" ma:contentTypeDescription="Create a new document." ma:contentTypeScope="" ma:versionID="96291512c1ee715ab617f4c07df79fc1">
   <xsd:schema xmlns:xsd="http://www.w3.org/2001/XMLSchema" xmlns:xs="http://www.w3.org/2001/XMLSchema" xmlns:p="http://schemas.microsoft.com/office/2006/metadata/properties" xmlns:ns2="71af3243-3dd4-4a8d-8c0d-dd76da1f02a5" xmlns:ns3="16c05727-aa75-4e4a-9b5f-8a80a1165891" targetNamespace="http://schemas.microsoft.com/office/2006/metadata/properties" ma:root="true" ma:fieldsID="8256c27c40ca5c40ce1cf6c44f0205df" ns2:_="" ns3:_="">
     <xsd:import namespace="71af3243-3dd4-4a8d-8c0d-dd76da1f02a5"/>
@@ -31263,6 +31532,15 @@
 </ct:contentTypeSchema>
 </file>
 
+<file path=customXml/item2.xml><?xml version="1.0" encoding="utf-8"?>
+<?mso-contentType ?>
+<FormTemplates xmlns="http://schemas.microsoft.com/sharepoint/v3/contenttype/forms">
+  <Display>DocumentLibraryForm</Display>
+  <Edit>DocumentLibraryForm</Edit>
+  <New>DocumentLibraryForm</New>
+</FormTemplates>
+</file>
+
 <file path=customXml/item3.xml><?xml version="1.0" encoding="utf-8"?>
 <p:properties xmlns:p="http://schemas.microsoft.com/office/2006/metadata/properties" xmlns:xsi="http://www.w3.org/2001/XMLSchema-instance" xmlns:pc="http://schemas.microsoft.com/office/infopath/2007/PartnerControls">
   <documentManagement>
@@ -31272,14 +31550,6 @@
 </file>
 
 <file path=customXml/itemProps1.xml><?xml version="1.0" encoding="utf-8"?>
-<ds:datastoreItem xmlns:ds="http://schemas.openxmlformats.org/officeDocument/2006/customXml" ds:itemID="{5B26E0C9-B2AA-42E6-97B6-E1B7D9EAF129}">
-  <ds:schemaRefs>
-    <ds:schemaRef ds:uri="http://schemas.microsoft.com/sharepoint/v3/contenttype/forms"/>
-  </ds:schemaRefs>
-</ds:datastoreItem>
-</file>
-
-<file path=customXml/itemProps2.xml><?xml version="1.0" encoding="utf-8"?>
 <ds:datastoreItem xmlns:ds="http://schemas.openxmlformats.org/officeDocument/2006/customXml" ds:itemID="{4C103400-4A22-4E35-B588-4C4D42638959}">
   <ds:schemaRefs>
     <ds:schemaRef ds:uri="http://schemas.microsoft.com/office/2006/metadata/contentType"/>
@@ -31298,6 +31568,14 @@
 </ds:datastoreItem>
 </file>
 
+<file path=customXml/itemProps2.xml><?xml version="1.0" encoding="utf-8"?>
+<ds:datastoreItem xmlns:ds="http://schemas.openxmlformats.org/officeDocument/2006/customXml" ds:itemID="{5B26E0C9-B2AA-42E6-97B6-E1B7D9EAF129}">
+  <ds:schemaRefs>
+    <ds:schemaRef ds:uri="http://schemas.microsoft.com/sharepoint/v3/contenttype/forms"/>
+  </ds:schemaRefs>
+</ds:datastoreItem>
+</file>
+
 <file path=customXml/itemProps3.xml><?xml version="1.0" encoding="utf-8"?>
 <ds:datastoreItem xmlns:ds="http://schemas.openxmlformats.org/officeDocument/2006/customXml" ds:itemID="{F5757914-1161-4661-9696-421FD6935CDD}">
   <ds:schemaRefs>

</xml_diff>